<commit_message>
es6 modules an d set/map
</commit_message>
<xml_diff>
--- a/frontend-cursus/ 4 - ECMAScript 6 node-browser.pptx
+++ b/frontend-cursus/ 4 - ECMAScript 6 node-browser.pptx
@@ -5,7 +5,7 @@
     <p:sldMasterId id="2147483660" r:id="rId1"/>
   </p:sldMasterIdLst>
   <p:notesMasterIdLst>
-    <p:notesMasterId r:id="rId43"/>
+    <p:notesMasterId r:id="rId45"/>
   </p:notesMasterIdLst>
   <p:sldIdLst>
     <p:sldId id="256" r:id="rId2"/>
@@ -38,17 +38,19 @@
     <p:sldId id="281" r:id="rId29"/>
     <p:sldId id="282" r:id="rId30"/>
     <p:sldId id="285" r:id="rId31"/>
-    <p:sldId id="286" r:id="rId32"/>
-    <p:sldId id="287" r:id="rId33"/>
-    <p:sldId id="288" r:id="rId34"/>
-    <p:sldId id="289" r:id="rId35"/>
-    <p:sldId id="290" r:id="rId36"/>
-    <p:sldId id="291" r:id="rId37"/>
-    <p:sldId id="292" r:id="rId38"/>
-    <p:sldId id="293" r:id="rId39"/>
-    <p:sldId id="294" r:id="rId40"/>
-    <p:sldId id="295" r:id="rId41"/>
-    <p:sldId id="296" r:id="rId42"/>
+    <p:sldId id="300" r:id="rId32"/>
+    <p:sldId id="299" r:id="rId33"/>
+    <p:sldId id="286" r:id="rId34"/>
+    <p:sldId id="287" r:id="rId35"/>
+    <p:sldId id="288" r:id="rId36"/>
+    <p:sldId id="289" r:id="rId37"/>
+    <p:sldId id="290" r:id="rId38"/>
+    <p:sldId id="291" r:id="rId39"/>
+    <p:sldId id="292" r:id="rId40"/>
+    <p:sldId id="293" r:id="rId41"/>
+    <p:sldId id="294" r:id="rId42"/>
+    <p:sldId id="295" r:id="rId43"/>
+    <p:sldId id="296" r:id="rId44"/>
   </p:sldIdLst>
   <p:sldSz cx="9144000" cy="5143500" type="screen16x9"/>
   <p:notesSz cx="6858000" cy="9144000"/>
@@ -2480,7 +2482,7 @@
               </a:spcBef>
               <a:buNone/>
             </a:pPr>
-            <a:endParaRPr/>
+            <a:endParaRPr dirty="0"/>
           </a:p>
         </p:txBody>
       </p:sp>
@@ -2496,7 +2498,7 @@
         </p:nvSpPr>
         <p:spPr>
           <a:xfrm>
-            <a:off x="380999" y="685800"/>
+            <a:off x="381000" y="685800"/>
             <a:ext cx="6096000" cy="3429000"/>
           </a:xfrm>
           <a:custGeom>
@@ -3530,9 +3532,43 @@
               <a:buNone/>
             </a:pPr>
             <a:r>
-              <a:rPr lang="en-US"/>
-              <a:t>export compare to public in Java .</a:t>
-            </a:r>
+              <a:rPr lang="en-US" dirty="0"/>
+              <a:t>export compare to </a:t>
+            </a:r>
+            <a:r>
+              <a:rPr lang="en-US" dirty="0" smtClean="0"/>
+              <a:t>public </a:t>
+            </a:r>
+            <a:r>
+              <a:rPr lang="en-US" dirty="0"/>
+              <a:t>in Java </a:t>
+            </a:r>
+            <a:r>
+              <a:rPr lang="en-US" dirty="0" smtClean="0"/>
+              <a:t>.</a:t>
+            </a:r>
+          </a:p>
+          <a:p>
+            <a:pPr lvl="0">
+              <a:spcBef>
+                <a:spcPts val="0"/>
+              </a:spcBef>
+              <a:buNone/>
+            </a:pPr>
+            <a:endParaRPr lang="en-US" dirty="0" smtClean="0"/>
+          </a:p>
+          <a:p>
+            <a:pPr lvl="0">
+              <a:spcBef>
+                <a:spcPts val="0"/>
+              </a:spcBef>
+              <a:buNone/>
+            </a:pPr>
+            <a:r>
+              <a:rPr lang="en-US" dirty="0" smtClean="0"/>
+              <a:t>http://2ality.com/2014/09/es6-modules-final.html</a:t>
+            </a:r>
+            <a:endParaRPr lang="en-US" dirty="0"/>
           </a:p>
         </p:txBody>
       </p:sp>
@@ -3548,7 +3584,7 @@
         </p:nvSpPr>
         <p:spPr>
           <a:xfrm>
-            <a:off x="380999" y="685800"/>
+            <a:off x="381000" y="685800"/>
             <a:ext cx="6096000" cy="3429000"/>
           </a:xfrm>
           <a:custGeom>
@@ -3649,7 +3685,7 @@
         </p:nvSpPr>
         <p:spPr>
           <a:xfrm>
-            <a:off x="380999" y="685800"/>
+            <a:off x="381000" y="685800"/>
             <a:ext cx="6096000" cy="3429000"/>
           </a:xfrm>
           <a:custGeom>
@@ -4457,7 +4493,7 @@
         </p:nvSpPr>
         <p:spPr>
           <a:xfrm>
-            <a:off x="380999" y="685800"/>
+            <a:off x="381000" y="685800"/>
             <a:ext cx="6096000" cy="3429000"/>
           </a:xfrm>
           <a:custGeom>
@@ -5672,7 +5708,7 @@
         </p:nvSpPr>
         <p:spPr>
           <a:xfrm>
-            <a:off x="380999" y="685800"/>
+            <a:off x="381000" y="685800"/>
             <a:ext cx="6096000" cy="3429000"/>
           </a:xfrm>
           <a:custGeom>
@@ -17496,7 +17532,7 @@
               <a:buChar char="•"/>
             </a:pPr>
             <a:r>
-              <a:rPr lang="en-US" sz="2400" b="0" i="0" u="none" strike="noStrike" cap="none">
+              <a:rPr lang="en-US" sz="2400" b="0" i="0" u="none" strike="noStrike" cap="none" dirty="0">
                 <a:solidFill>
                   <a:srgbClr val="FFFFFF"/>
                 </a:solidFill>
@@ -17508,7 +17544,7 @@
               <a:t>Work the same as Java 8 lambda’s </a:t>
             </a:r>
             <a:br>
-              <a:rPr lang="en-US" sz="2400" b="0" i="0" u="none" strike="noStrike" cap="none">
+              <a:rPr lang="en-US" sz="2400" b="0" i="0" u="none" strike="noStrike" cap="none" dirty="0">
                 <a:solidFill>
                   <a:srgbClr val="FFFFFF"/>
                 </a:solidFill>
@@ -17519,7 +17555,7 @@
               </a:rPr>
             </a:br>
             <a:r>
-              <a:rPr lang="en-US" sz="2400" b="0" i="0" u="none" strike="noStrike" cap="none">
+              <a:rPr lang="en-US" sz="2400" b="0" i="0" u="none" strike="noStrike" cap="none" dirty="0">
                 <a:solidFill>
                   <a:srgbClr val="FFFFFF"/>
                 </a:solidFill>
@@ -17550,7 +17586,7 @@
               <a:buChar char="•"/>
             </a:pPr>
             <a:r>
-              <a:rPr lang="en-US" sz="2400" b="0" i="0" u="none" strike="noStrike" cap="none">
+              <a:rPr lang="en-US" sz="2400" b="0" i="0" u="none" strike="noStrike" cap="none" dirty="0">
                 <a:solidFill>
                   <a:srgbClr val="FFFFFF"/>
                 </a:solidFill>
@@ -17581,16 +17617,52 @@
               <a:buChar char="•"/>
             </a:pPr>
             <a:r>
-              <a:rPr lang="en-US" sz="2400" b="0" i="0" u="none" strike="noStrike" cap="none">
-                <a:solidFill>
-                  <a:srgbClr val="FFFFFF"/>
-                </a:solidFill>
-                <a:latin typeface="Helvetica Neue"/>
-                <a:ea typeface="Helvetica Neue"/>
-                <a:cs typeface="Helvetica Neue"/>
-                <a:sym typeface="Helvetica Neue"/>
-              </a:rPr>
-              <a:t>Arrow head is    -&gt;   instead of   =&gt;</a:t>
+              <a:rPr lang="en-US" sz="2400" b="0" i="0" u="none" strike="noStrike" cap="none" dirty="0">
+                <a:solidFill>
+                  <a:srgbClr val="FFFFFF"/>
+                </a:solidFill>
+                <a:latin typeface="Helvetica Neue"/>
+                <a:ea typeface="Helvetica Neue"/>
+                <a:cs typeface="Helvetica Neue"/>
+                <a:sym typeface="Helvetica Neue"/>
+              </a:rPr>
+              <a:t>Arrow head is    </a:t>
+            </a:r>
+            <a:r>
+              <a:rPr lang="en-US" sz="2400" b="0" i="0" u="none" strike="noStrike" cap="none" dirty="0">
+                <a:solidFill>
+                  <a:srgbClr val="FF0000"/>
+                </a:solidFill>
+                <a:latin typeface="Helvetica Neue"/>
+                <a:ea typeface="Helvetica Neue"/>
+                <a:cs typeface="Helvetica Neue"/>
+                <a:sym typeface="Helvetica Neue"/>
+              </a:rPr>
+              <a:t>-&gt;</a:t>
+            </a:r>
+            <a:r>
+              <a:rPr lang="en-US" sz="2400" b="0" i="0" u="none" strike="noStrike" cap="none" dirty="0">
+                <a:solidFill>
+                  <a:srgbClr val="FFFFFF"/>
+                </a:solidFill>
+                <a:latin typeface="Helvetica Neue"/>
+                <a:ea typeface="Helvetica Neue"/>
+                <a:cs typeface="Helvetica Neue"/>
+                <a:sym typeface="Helvetica Neue"/>
+              </a:rPr>
+              <a:t>   instead of   </a:t>
+            </a:r>
+            <a:r>
+              <a:rPr lang="en-US" sz="2400" b="0" i="0" u="none" strike="noStrike" cap="none" dirty="0">
+                <a:solidFill>
+                  <a:srgbClr val="FFC000"/>
+                </a:solidFill>
+                <a:latin typeface="Helvetica Neue"/>
+                <a:ea typeface="Helvetica Neue"/>
+                <a:cs typeface="Helvetica Neue"/>
+                <a:sym typeface="Helvetica Neue"/>
+              </a:rPr>
+              <a:t>=&gt;</a:t>
             </a:r>
           </a:p>
         </p:txBody>
@@ -17731,7 +17803,7 @@
               <a:buNone/>
             </a:pPr>
             <a:r>
-              <a:rPr lang="en-US" sz="1900" b="0" i="0" u="none" strike="noStrike" cap="none">
+              <a:rPr lang="en-US" sz="1900" b="0" i="0" u="none" strike="noStrike" cap="none" dirty="0">
                 <a:solidFill>
                   <a:srgbClr val="99CF50"/>
                 </a:solidFill>
@@ -17743,7 +17815,7 @@
               <a:t>function</a:t>
             </a:r>
             <a:r>
-              <a:rPr lang="en-US" sz="1900" b="0" i="0" u="none" strike="noStrike" cap="none">
+              <a:rPr lang="en-US" sz="1900" b="0" i="0" u="none" strike="noStrike" cap="none" dirty="0">
                 <a:solidFill>
                   <a:srgbClr val="F8F8F8"/>
                 </a:solidFill>
@@ -17755,7 +17827,7 @@
               <a:t> </a:t>
             </a:r>
             <a:r>
-              <a:rPr lang="en-US" sz="1900" b="0" i="0" u="none" strike="noStrike" cap="none">
+              <a:rPr lang="en-US" sz="1900" b="0" i="0" u="none" strike="noStrike" cap="none" dirty="0">
                 <a:solidFill>
                   <a:srgbClr val="89BDFF"/>
                 </a:solidFill>
@@ -17767,7 +17839,7 @@
               <a:t>Person</a:t>
             </a:r>
             <a:r>
-              <a:rPr lang="en-US" sz="1900" b="0" i="0" u="none" strike="noStrike" cap="none">
+              <a:rPr lang="en-US" sz="1900" b="0" i="0" u="none" strike="noStrike" cap="none" dirty="0">
                 <a:solidFill>
                   <a:srgbClr val="F8F8F8"/>
                 </a:solidFill>
@@ -17798,7 +17870,7 @@
               <a:buNone/>
             </a:pPr>
             <a:r>
-              <a:rPr lang="en-US" sz="1900" b="0" i="0" u="none" strike="noStrike" cap="none">
+              <a:rPr lang="en-US" sz="1900" b="0" i="0" u="none" strike="noStrike" cap="none" dirty="0">
                 <a:solidFill>
                   <a:srgbClr val="F8F8F8"/>
                 </a:solidFill>
@@ -17810,7 +17882,7 @@
               <a:t>  </a:t>
             </a:r>
             <a:r>
-              <a:rPr lang="en-US" sz="1900" b="0" i="0" u="none" strike="noStrike" cap="none">
+              <a:rPr lang="en-US" sz="1900" b="0" i="0" u="none" strike="noStrike" cap="none" dirty="0" err="1">
                 <a:solidFill>
                   <a:srgbClr val="3E87E3"/>
                 </a:solidFill>
@@ -17822,7 +17894,7 @@
               <a:t>this</a:t>
             </a:r>
             <a:r>
-              <a:rPr lang="en-US" sz="1900" b="0" i="0" u="none" strike="noStrike" cap="none">
+              <a:rPr lang="en-US" sz="1900" b="0" i="0" u="none" strike="noStrike" cap="none" dirty="0" err="1">
                 <a:solidFill>
                   <a:srgbClr val="F8F8F8"/>
                 </a:solidFill>
@@ -17831,10 +17903,22 @@
                 <a:cs typeface="Consolas"/>
                 <a:sym typeface="Consolas"/>
               </a:rPr>
-              <a:t>.age </a:t>
-            </a:r>
-            <a:r>
-              <a:rPr lang="en-US" sz="1900" b="0" i="0" u="none" strike="noStrike" cap="none">
+              <a:t>.age</a:t>
+            </a:r>
+            <a:r>
+              <a:rPr lang="en-US" sz="1900" b="0" i="0" u="none" strike="noStrike" cap="none" dirty="0">
+                <a:solidFill>
+                  <a:srgbClr val="F8F8F8"/>
+                </a:solidFill>
+                <a:latin typeface="Consolas"/>
+                <a:ea typeface="Consolas"/>
+                <a:cs typeface="Consolas"/>
+                <a:sym typeface="Consolas"/>
+              </a:rPr>
+              <a:t> </a:t>
+            </a:r>
+            <a:r>
+              <a:rPr lang="en-US" sz="1900" b="0" i="0" u="none" strike="noStrike" cap="none" dirty="0">
                 <a:solidFill>
                   <a:srgbClr val="E28964"/>
                 </a:solidFill>
@@ -17846,7 +17930,7 @@
               <a:t>=</a:t>
             </a:r>
             <a:r>
-              <a:rPr lang="en-US" sz="1900" b="0" i="0" u="none" strike="noStrike" cap="none">
+              <a:rPr lang="en-US" sz="1900" b="0" i="0" u="none" strike="noStrike" cap="none" dirty="0">
                 <a:solidFill>
                   <a:srgbClr val="F8F8F8"/>
                 </a:solidFill>
@@ -17858,7 +17942,7 @@
               <a:t> </a:t>
             </a:r>
             <a:r>
-              <a:rPr lang="en-US" sz="1900" b="0" i="0" u="none" strike="noStrike" cap="none">
+              <a:rPr lang="en-US" sz="1900" b="0" i="0" u="none" strike="noStrike" cap="none" dirty="0">
                 <a:solidFill>
                   <a:srgbClr val="3387CC"/>
                 </a:solidFill>
@@ -17870,7 +17954,7 @@
               <a:t>0</a:t>
             </a:r>
             <a:r>
-              <a:rPr lang="en-US" sz="1900" b="0" i="0" u="none" strike="noStrike" cap="none">
+              <a:rPr lang="en-US" sz="1900" b="0" i="0" u="none" strike="noStrike" cap="none" dirty="0">
                 <a:solidFill>
                   <a:srgbClr val="F8F8F8"/>
                 </a:solidFill>
@@ -17899,7 +17983,7 @@
               <a:buFont typeface="Consolas"/>
               <a:buNone/>
             </a:pPr>
-            <a:endParaRPr sz="1900" b="0" i="0" u="none" strike="noStrike" cap="none">
+            <a:endParaRPr sz="1900" b="0" i="0" u="none" strike="noStrike" cap="none" dirty="0">
               <a:solidFill>
                 <a:srgbClr val="F8F8F8"/>
               </a:solidFill>
@@ -17928,7 +18012,7 @@
               <a:buNone/>
             </a:pPr>
             <a:r>
-              <a:rPr lang="en-US" sz="1900" b="0" i="0" u="none" strike="noStrike" cap="none">
+              <a:rPr lang="en-US" sz="1900" b="0" i="0" u="none" strike="noStrike" cap="none" dirty="0">
                 <a:solidFill>
                   <a:srgbClr val="F8F8F8"/>
                 </a:solidFill>
@@ -17940,7 +18024,7 @@
               <a:t>  </a:t>
             </a:r>
             <a:r>
-              <a:rPr lang="en-US" sz="1900" b="0" i="0" u="none" strike="noStrike" cap="none">
+              <a:rPr lang="en-US" sz="1900" b="0" i="0" u="none" strike="noStrike" cap="none" dirty="0" err="1">
                 <a:solidFill>
                   <a:srgbClr val="DAD085"/>
                 </a:solidFill>
@@ -17952,7 +18036,7 @@
               <a:t>setInterval</a:t>
             </a:r>
             <a:r>
-              <a:rPr lang="en-US" sz="1900" b="0" i="0" u="none" strike="noStrike" cap="none">
+              <a:rPr lang="en-US" sz="1900" b="0" i="0" u="none" strike="noStrike" cap="none" dirty="0">
                 <a:solidFill>
                   <a:srgbClr val="F8F8F8"/>
                 </a:solidFill>
@@ -17964,7 +18048,7 @@
               <a:t>(() </a:t>
             </a:r>
             <a:r>
-              <a:rPr lang="en-US" sz="1900" b="0" i="0" u="none" strike="noStrike" cap="none">
+              <a:rPr lang="en-US" sz="1900" b="0" i="0" u="none" strike="noStrike" cap="none" dirty="0">
                 <a:solidFill>
                   <a:srgbClr val="E28964"/>
                 </a:solidFill>
@@ -17976,7 +18060,7 @@
               <a:t>=&gt;</a:t>
             </a:r>
             <a:r>
-              <a:rPr lang="en-US" sz="1900" b="0" i="0" u="none" strike="noStrike" cap="none">
+              <a:rPr lang="en-US" sz="1900" b="0" i="0" u="none" strike="noStrike" cap="none" dirty="0">
                 <a:solidFill>
                   <a:srgbClr val="F8F8F8"/>
                 </a:solidFill>
@@ -18007,7 +18091,7 @@
               <a:buNone/>
             </a:pPr>
             <a:r>
-              <a:rPr lang="en-US" sz="1900" b="0" i="0" u="none" strike="noStrike" cap="none">
+              <a:rPr lang="en-US" sz="1900" b="0" i="0" u="none" strike="noStrike" cap="none" dirty="0">
                 <a:solidFill>
                   <a:srgbClr val="F8F8F8"/>
                 </a:solidFill>
@@ -18019,7 +18103,7 @@
               <a:t>    </a:t>
             </a:r>
             <a:r>
-              <a:rPr lang="en-US" sz="1900" b="0" i="0" u="none" strike="noStrike" cap="none">
+              <a:rPr lang="en-US" sz="1900" b="0" i="0" u="none" strike="noStrike" cap="none" dirty="0" err="1">
                 <a:solidFill>
                   <a:srgbClr val="3E87E3"/>
                 </a:solidFill>
@@ -18031,7 +18115,7 @@
               <a:t>this</a:t>
             </a:r>
             <a:r>
-              <a:rPr lang="en-US" sz="1900" b="0" i="0" u="none" strike="noStrike" cap="none">
+              <a:rPr lang="en-US" sz="1900" b="0" i="0" u="none" strike="noStrike" cap="none" dirty="0" err="1">
                 <a:solidFill>
                   <a:srgbClr val="F8F8F8"/>
                 </a:solidFill>
@@ -18043,7 +18127,7 @@
               <a:t>.age</a:t>
             </a:r>
             <a:r>
-              <a:rPr lang="en-US" sz="1900" b="0" i="0" u="none" strike="noStrike" cap="none">
+              <a:rPr lang="en-US" sz="1900" b="0" i="0" u="none" strike="noStrike" cap="none" dirty="0">
                 <a:solidFill>
                   <a:srgbClr val="E28964"/>
                 </a:solidFill>
@@ -18055,7 +18139,7 @@
               <a:t>++</a:t>
             </a:r>
             <a:r>
-              <a:rPr lang="en-US" sz="1900" b="0" i="0" u="none" strike="noStrike" cap="none">
+              <a:rPr lang="en-US" sz="1900" b="0" i="0" u="none" strike="noStrike" cap="none" dirty="0">
                 <a:solidFill>
                   <a:srgbClr val="F8F8F8"/>
                 </a:solidFill>
@@ -18067,7 +18151,7 @@
               <a:t>; </a:t>
             </a:r>
             <a:r>
-              <a:rPr lang="en-US" sz="1900" b="0" i="1" u="none" strike="noStrike" cap="none">
+              <a:rPr lang="en-US" sz="1900" b="0" i="1" u="none" strike="noStrike" cap="none" dirty="0">
                 <a:solidFill>
                   <a:srgbClr val="AEAEAE"/>
                 </a:solidFill>
@@ -18098,7 +18182,7 @@
               <a:buNone/>
             </a:pPr>
             <a:r>
-              <a:rPr lang="en-US" sz="1900" b="0" i="0" u="none" strike="noStrike" cap="none">
+              <a:rPr lang="en-US" sz="1900" b="0" i="0" u="none" strike="noStrike" cap="none" dirty="0">
                 <a:solidFill>
                   <a:srgbClr val="F8F8F8"/>
                 </a:solidFill>
@@ -18110,7 +18194,7 @@
               <a:t>  }, </a:t>
             </a:r>
             <a:r>
-              <a:rPr lang="en-US" sz="1900" b="0" i="0" u="none" strike="noStrike" cap="none">
+              <a:rPr lang="en-US" sz="1900" b="0" i="0" u="none" strike="noStrike" cap="none" dirty="0">
                 <a:solidFill>
                   <a:srgbClr val="3387CC"/>
                 </a:solidFill>
@@ -18122,7 +18206,7 @@
               <a:t>1000</a:t>
             </a:r>
             <a:r>
-              <a:rPr lang="en-US" sz="1900" b="0" i="0" u="none" strike="noStrike" cap="none">
+              <a:rPr lang="en-US" sz="1900" b="0" i="0" u="none" strike="noStrike" cap="none" dirty="0">
                 <a:solidFill>
                   <a:srgbClr val="F8F8F8"/>
                 </a:solidFill>
@@ -18153,7 +18237,7 @@
               <a:buNone/>
             </a:pPr>
             <a:r>
-              <a:rPr lang="en-US" sz="1900" b="0" i="0" u="none" strike="noStrike" cap="none">
+              <a:rPr lang="en-US" sz="1900" b="0" i="0" u="none" strike="noStrike" cap="none" dirty="0">
                 <a:solidFill>
                   <a:srgbClr val="F8F8F8"/>
                 </a:solidFill>
@@ -18182,7 +18266,7 @@
               <a:buFont typeface="Consolas"/>
               <a:buNone/>
             </a:pPr>
-            <a:endParaRPr sz="1900" b="0" i="0" u="none" strike="noStrike" cap="none">
+            <a:endParaRPr sz="1900" b="0" i="0" u="none" strike="noStrike" cap="none" dirty="0">
               <a:solidFill>
                 <a:srgbClr val="F8F8F8"/>
               </a:solidFill>
@@ -18211,7 +18295,7 @@
               <a:buNone/>
             </a:pPr>
             <a:r>
-              <a:rPr lang="en-US" sz="1900" b="0" i="0" u="none" strike="noStrike" cap="none">
+              <a:rPr lang="en-US" sz="1900" b="0" i="0" u="none" strike="noStrike" cap="none" dirty="0" err="1">
                 <a:solidFill>
                   <a:srgbClr val="99CF50"/>
                 </a:solidFill>
@@ -18223,7 +18307,7 @@
               <a:t>var</a:t>
             </a:r>
             <a:r>
-              <a:rPr lang="en-US" sz="1900" b="0" i="0" u="none" strike="noStrike" cap="none">
+              <a:rPr lang="en-US" sz="1900" b="0" i="0" u="none" strike="noStrike" cap="none" dirty="0">
                 <a:solidFill>
                   <a:srgbClr val="F8F8F8"/>
                 </a:solidFill>
@@ -18235,7 +18319,7 @@
               <a:t> p </a:t>
             </a:r>
             <a:r>
-              <a:rPr lang="en-US" sz="1900" b="0" i="0" u="none" strike="noStrike" cap="none">
+              <a:rPr lang="en-US" sz="1900" b="0" i="0" u="none" strike="noStrike" cap="none" dirty="0">
                 <a:solidFill>
                   <a:srgbClr val="E28964"/>
                 </a:solidFill>
@@ -18247,7 +18331,7 @@
               <a:t>=</a:t>
             </a:r>
             <a:r>
-              <a:rPr lang="en-US" sz="1900" b="0" i="0" u="none" strike="noStrike" cap="none">
+              <a:rPr lang="en-US" sz="1900" b="0" i="0" u="none" strike="noStrike" cap="none" dirty="0">
                 <a:solidFill>
                   <a:srgbClr val="F8F8F8"/>
                 </a:solidFill>
@@ -18259,7 +18343,7 @@
               <a:t> </a:t>
             </a:r>
             <a:r>
-              <a:rPr lang="en-US" sz="1900" b="0" i="0" u="none" strike="noStrike" cap="none">
+              <a:rPr lang="en-US" sz="1900" b="0" i="0" u="none" strike="noStrike" cap="none" dirty="0">
                 <a:solidFill>
                   <a:srgbClr val="E28964"/>
                 </a:solidFill>
@@ -18271,7 +18355,7 @@
               <a:t>new</a:t>
             </a:r>
             <a:r>
-              <a:rPr lang="en-US" sz="1900" b="0" i="0" u="none" strike="noStrike" cap="none">
+              <a:rPr lang="en-US" sz="1900" b="0" i="0" u="none" strike="noStrike" cap="none" dirty="0">
                 <a:solidFill>
                   <a:srgbClr val="F8F8F8"/>
                 </a:solidFill>
@@ -18283,7 +18367,7 @@
               <a:t> </a:t>
             </a:r>
             <a:r>
-              <a:rPr lang="en-US" sz="1900" b="0" i="0" u="sng" strike="noStrike" cap="none">
+              <a:rPr lang="en-US" sz="1900" b="0" i="0" u="sng" strike="noStrike" cap="none" dirty="0">
                 <a:solidFill>
                   <a:srgbClr val="F8F8F8"/>
                 </a:solidFill>
@@ -18295,7 +18379,7 @@
               <a:t>Person</a:t>
             </a:r>
             <a:r>
-              <a:rPr lang="en-US" sz="1900" b="0" i="0" u="none" strike="noStrike" cap="none">
+              <a:rPr lang="en-US" sz="1900" b="0" i="0" u="none" strike="noStrike" cap="none" dirty="0">
                 <a:solidFill>
                   <a:srgbClr val="F8F8F8"/>
                 </a:solidFill>
@@ -19104,10 +19188,10 @@
                 <a:cs typeface="Consolas"/>
                 <a:sym typeface="Consolas"/>
               </a:rPr>
-              <a:t>   </a:t>
-            </a:r>
-            <a:r>
-              <a:rPr lang="en-US" sz="2300" b="0" i="0" u="none" strike="noStrike" cap="none" dirty="0" err="1">
+              <a:t> </a:t>
+            </a:r>
+            <a:r>
+              <a:rPr lang="en-US" sz="2300" b="0" i="0" u="none" strike="noStrike" cap="none" dirty="0" err="1" smtClean="0">
                 <a:solidFill>
                   <a:srgbClr val="F8F8F8"/>
                 </a:solidFill>
@@ -19119,7 +19203,7 @@
               <a:t>a.</a:t>
             </a:r>
             <a:r>
-              <a:rPr lang="en-US" sz="2300" b="0" i="0" u="none" strike="noStrike" cap="none" dirty="0" err="1">
+              <a:rPr lang="en-US" sz="2300" b="0" i="0" u="none" strike="noStrike" cap="none" dirty="0" err="1" smtClean="0">
                 <a:solidFill>
                   <a:srgbClr val="CF6A4C"/>
                 </a:solidFill>
@@ -20937,7 +21021,15 @@
                   <a:schemeClr val="bg1"/>
                 </a:solidFill>
               </a:rPr>
-              <a:t> </a:t>
+              <a:t> = '</a:t>
+            </a:r>
+            <a:r>
+              <a:rPr lang="mr-IN" sz="2000" dirty="0" err="1">
+                <a:solidFill>
+                  <a:schemeClr val="bg1"/>
+                </a:solidFill>
+              </a:rPr>
+              <a:t>foo</a:t>
             </a:r>
             <a:r>
               <a:rPr lang="mr-IN" sz="2000" dirty="0">
@@ -20945,47 +21037,7 @@
                   <a:schemeClr val="bg1"/>
                 </a:solidFill>
               </a:rPr>
-              <a:t>=</a:t>
-            </a:r>
-            <a:r>
-              <a:rPr lang="mr-IN" sz="2000" dirty="0">
-                <a:solidFill>
-                  <a:schemeClr val="bg1"/>
-                </a:solidFill>
-              </a:rPr>
-              <a:t> </a:t>
-            </a:r>
-            <a:r>
-              <a:rPr lang="mr-IN" sz="2000" dirty="0">
-                <a:solidFill>
-                  <a:schemeClr val="bg1"/>
-                </a:solidFill>
-              </a:rPr>
-              <a:t>'</a:t>
-            </a:r>
-            <a:r>
-              <a:rPr lang="mr-IN" sz="2000" dirty="0" err="1">
-                <a:solidFill>
-                  <a:schemeClr val="bg1"/>
-                </a:solidFill>
-              </a:rPr>
-              <a:t>foo</a:t>
-            </a:r>
-            <a:r>
-              <a:rPr lang="mr-IN" sz="2000" dirty="0">
-                <a:solidFill>
-                  <a:schemeClr val="bg1"/>
-                </a:solidFill>
-              </a:rPr>
-              <a:t>';</a:t>
-            </a:r>
-            <a:r>
-              <a:rPr lang="mr-IN" sz="2000" dirty="0">
-                <a:solidFill>
-                  <a:schemeClr val="bg1"/>
-                </a:solidFill>
-              </a:rPr>
-              <a:t> </a:t>
+              <a:t>'; </a:t>
             </a:r>
             <a:endParaRPr lang="nl-NL" sz="2000" dirty="0" smtClean="0">
               <a:solidFill>
@@ -21030,39 +21082,7 @@
                   <a:schemeClr val="bg1"/>
                 </a:solidFill>
               </a:rPr>
-              <a:t> </a:t>
-            </a:r>
-            <a:r>
-              <a:rPr lang="mr-IN" sz="2000" dirty="0">
-                <a:solidFill>
-                  <a:schemeClr val="bg1"/>
-                </a:solidFill>
-              </a:rPr>
-              <a:t>=</a:t>
-            </a:r>
-            <a:r>
-              <a:rPr lang="mr-IN" sz="2000" dirty="0">
-                <a:solidFill>
-                  <a:schemeClr val="bg1"/>
-                </a:solidFill>
-              </a:rPr>
-              <a:t> </a:t>
-            </a:r>
-            <a:r>
-              <a:rPr lang="mr-IN" sz="2000" dirty="0">
-                <a:solidFill>
-                  <a:schemeClr val="bg1"/>
-                </a:solidFill>
-              </a:rPr>
-              <a:t>{</a:t>
-            </a:r>
-            <a:r>
-              <a:rPr lang="mr-IN" sz="2000" dirty="0">
-                <a:solidFill>
-                  <a:schemeClr val="bg1"/>
-                </a:solidFill>
-              </a:rPr>
-              <a:t> </a:t>
+              <a:t> = { </a:t>
             </a:r>
             <a:endParaRPr lang="nl-NL" sz="2000" dirty="0" smtClean="0">
               <a:solidFill>
@@ -21107,7 +21127,15 @@
                   <a:schemeClr val="bg1"/>
                 </a:solidFill>
               </a:rPr>
-              <a:t>]:</a:t>
+              <a:t>]: '</a:t>
+            </a:r>
+            <a:r>
+              <a:rPr lang="mr-IN" sz="2000" dirty="0" err="1">
+                <a:solidFill>
+                  <a:schemeClr val="bg1"/>
+                </a:solidFill>
+              </a:rPr>
+              <a:t>hey</a:t>
             </a:r>
             <a:r>
               <a:rPr lang="mr-IN" sz="2000" dirty="0">
@@ -21115,39 +21143,7 @@
                   <a:schemeClr val="bg1"/>
                 </a:solidFill>
               </a:rPr>
-              <a:t> </a:t>
-            </a:r>
-            <a:r>
-              <a:rPr lang="mr-IN" sz="2000" dirty="0">
-                <a:solidFill>
-                  <a:schemeClr val="bg1"/>
-                </a:solidFill>
-              </a:rPr>
-              <a:t>'</a:t>
-            </a:r>
-            <a:r>
-              <a:rPr lang="mr-IN" sz="2000" dirty="0" err="1">
-                <a:solidFill>
-                  <a:schemeClr val="bg1"/>
-                </a:solidFill>
-              </a:rPr>
-              <a:t>hey</a:t>
-            </a:r>
-            <a:r>
-              <a:rPr lang="mr-IN" sz="2000" dirty="0">
-                <a:solidFill>
-                  <a:schemeClr val="bg1"/>
-                </a:solidFill>
-              </a:rPr>
-              <a:t>',</a:t>
-            </a:r>
-            <a:r>
-              <a:rPr lang="mr-IN" sz="2000" dirty="0">
-                <a:solidFill>
-                  <a:schemeClr val="bg1"/>
-                </a:solidFill>
-              </a:rPr>
-              <a:t> </a:t>
+              <a:t>', </a:t>
             </a:r>
             <a:endParaRPr lang="nl-NL" sz="2000" dirty="0" smtClean="0">
               <a:solidFill>
@@ -21208,7 +21204,15 @@
                   <a:schemeClr val="bg1"/>
                 </a:solidFill>
               </a:rPr>
-              <a:t>'</a:t>
+              <a:t>' + '</a:t>
+            </a:r>
+            <a:r>
+              <a:rPr lang="mr-IN" sz="2000" dirty="0" err="1">
+                <a:solidFill>
+                  <a:schemeClr val="bg1"/>
+                </a:solidFill>
+              </a:rPr>
+              <a:t>ar</a:t>
             </a:r>
             <a:r>
               <a:rPr lang="mr-IN" sz="2000" dirty="0">
@@ -21216,7 +21220,15 @@
                   <a:schemeClr val="bg1"/>
                 </a:solidFill>
               </a:rPr>
-              <a:t> </a:t>
+              <a:t>']: '</a:t>
+            </a:r>
+            <a:r>
+              <a:rPr lang="mr-IN" sz="2000" dirty="0" err="1">
+                <a:solidFill>
+                  <a:schemeClr val="bg1"/>
+                </a:solidFill>
+              </a:rPr>
+              <a:t>there</a:t>
             </a:r>
             <a:r>
               <a:rPr lang="mr-IN" sz="2000" dirty="0">
@@ -21224,79 +21236,7 @@
                   <a:schemeClr val="bg1"/>
                 </a:solidFill>
               </a:rPr>
-              <a:t>+</a:t>
-            </a:r>
-            <a:r>
-              <a:rPr lang="mr-IN" sz="2000" dirty="0">
-                <a:solidFill>
-                  <a:schemeClr val="bg1"/>
-                </a:solidFill>
-              </a:rPr>
-              <a:t> </a:t>
-            </a:r>
-            <a:r>
-              <a:rPr lang="mr-IN" sz="2000" dirty="0">
-                <a:solidFill>
-                  <a:schemeClr val="bg1"/>
-                </a:solidFill>
-              </a:rPr>
-              <a:t>'</a:t>
-            </a:r>
-            <a:r>
-              <a:rPr lang="mr-IN" sz="2000" dirty="0" err="1">
-                <a:solidFill>
-                  <a:schemeClr val="bg1"/>
-                </a:solidFill>
-              </a:rPr>
-              <a:t>ar</a:t>
-            </a:r>
-            <a:r>
-              <a:rPr lang="mr-IN" sz="2000" dirty="0">
-                <a:solidFill>
-                  <a:schemeClr val="bg1"/>
-                </a:solidFill>
-              </a:rPr>
-              <a:t>']:</a:t>
-            </a:r>
-            <a:r>
-              <a:rPr lang="mr-IN" sz="2000" dirty="0">
-                <a:solidFill>
-                  <a:schemeClr val="bg1"/>
-                </a:solidFill>
-              </a:rPr>
-              <a:t> </a:t>
-            </a:r>
-            <a:r>
-              <a:rPr lang="mr-IN" sz="2000" dirty="0">
-                <a:solidFill>
-                  <a:schemeClr val="bg1"/>
-                </a:solidFill>
-              </a:rPr>
-              <a:t>'</a:t>
-            </a:r>
-            <a:r>
-              <a:rPr lang="mr-IN" sz="2000" dirty="0" err="1">
-                <a:solidFill>
-                  <a:schemeClr val="bg1"/>
-                </a:solidFill>
-              </a:rPr>
-              <a:t>there</a:t>
-            </a:r>
-            <a:r>
-              <a:rPr lang="mr-IN" sz="2000" dirty="0">
-                <a:solidFill>
-                  <a:schemeClr val="bg1"/>
-                </a:solidFill>
-              </a:rPr>
-              <a:t>'</a:t>
-            </a:r>
-            <a:r>
-              <a:rPr lang="mr-IN" sz="2000" dirty="0">
-                <a:solidFill>
-                  <a:schemeClr val="bg1"/>
-                </a:solidFill>
-              </a:rPr>
-              <a:t> </a:t>
+              <a:t>' </a:t>
             </a:r>
             <a:endParaRPr lang="nl-NL" sz="2000" dirty="0" smtClean="0">
               <a:solidFill>
@@ -21533,7 +21473,15 @@
                   <a:schemeClr val="bg1"/>
                 </a:solidFill>
               </a:rPr>
-              <a:t>,</a:t>
+              <a:t>, </a:t>
+            </a:r>
+            <a:r>
+              <a:rPr lang="mr-IN" sz="2400" dirty="0" err="1">
+                <a:solidFill>
+                  <a:schemeClr val="bg1"/>
+                </a:solidFill>
+              </a:rPr>
+              <a:t>b</a:t>
             </a:r>
             <a:r>
               <a:rPr lang="mr-IN" sz="2400" dirty="0">
@@ -21541,7 +21489,7 @@
                   <a:schemeClr val="bg1"/>
                 </a:solidFill>
               </a:rPr>
-              <a:t> </a:t>
+              <a:t>, ...</a:t>
             </a:r>
             <a:r>
               <a:rPr lang="mr-IN" sz="2400" dirty="0" err="1">
@@ -21549,7 +21497,7 @@
                   <a:schemeClr val="bg1"/>
                 </a:solidFill>
               </a:rPr>
-              <a:t>b</a:t>
+              <a:t>rest</a:t>
             </a:r>
             <a:r>
               <a:rPr lang="mr-IN" sz="2400" dirty="0">
@@ -21557,143 +21505,7 @@
                   <a:schemeClr val="bg1"/>
                 </a:solidFill>
               </a:rPr>
-              <a:t>,</a:t>
-            </a:r>
-            <a:r>
-              <a:rPr lang="mr-IN" sz="2400" dirty="0">
-                <a:solidFill>
-                  <a:schemeClr val="bg1"/>
-                </a:solidFill>
-              </a:rPr>
-              <a:t> </a:t>
-            </a:r>
-            <a:r>
-              <a:rPr lang="mr-IN" sz="2400" dirty="0">
-                <a:solidFill>
-                  <a:schemeClr val="bg1"/>
-                </a:solidFill>
-              </a:rPr>
-              <a:t>...</a:t>
-            </a:r>
-            <a:r>
-              <a:rPr lang="mr-IN" sz="2400" dirty="0" err="1">
-                <a:solidFill>
-                  <a:schemeClr val="bg1"/>
-                </a:solidFill>
-              </a:rPr>
-              <a:t>rest</a:t>
-            </a:r>
-            <a:r>
-              <a:rPr lang="mr-IN" sz="2400" dirty="0">
-                <a:solidFill>
-                  <a:schemeClr val="bg1"/>
-                </a:solidFill>
-              </a:rPr>
-              <a:t>]</a:t>
-            </a:r>
-            <a:r>
-              <a:rPr lang="mr-IN" sz="2400" dirty="0">
-                <a:solidFill>
-                  <a:schemeClr val="bg1"/>
-                </a:solidFill>
-              </a:rPr>
-              <a:t> </a:t>
-            </a:r>
-            <a:r>
-              <a:rPr lang="mr-IN" sz="2400" dirty="0">
-                <a:solidFill>
-                  <a:schemeClr val="bg1"/>
-                </a:solidFill>
-              </a:rPr>
-              <a:t>=</a:t>
-            </a:r>
-            <a:r>
-              <a:rPr lang="mr-IN" sz="2400" dirty="0">
-                <a:solidFill>
-                  <a:schemeClr val="bg1"/>
-                </a:solidFill>
-              </a:rPr>
-              <a:t> </a:t>
-            </a:r>
-            <a:r>
-              <a:rPr lang="mr-IN" sz="2400" dirty="0">
-                <a:solidFill>
-                  <a:schemeClr val="bg1"/>
-                </a:solidFill>
-              </a:rPr>
-              <a:t>[1,</a:t>
-            </a:r>
-            <a:r>
-              <a:rPr lang="mr-IN" sz="2400" dirty="0">
-                <a:solidFill>
-                  <a:schemeClr val="bg1"/>
-                </a:solidFill>
-              </a:rPr>
-              <a:t> </a:t>
-            </a:r>
-            <a:r>
-              <a:rPr lang="mr-IN" sz="2400" dirty="0">
-                <a:solidFill>
-                  <a:schemeClr val="bg1"/>
-                </a:solidFill>
-              </a:rPr>
-              <a:t>2,</a:t>
-            </a:r>
-            <a:r>
-              <a:rPr lang="mr-IN" sz="2400" dirty="0">
-                <a:solidFill>
-                  <a:schemeClr val="bg1"/>
-                </a:solidFill>
-              </a:rPr>
-              <a:t> </a:t>
-            </a:r>
-            <a:r>
-              <a:rPr lang="mr-IN" sz="2400" dirty="0">
-                <a:solidFill>
-                  <a:schemeClr val="bg1"/>
-                </a:solidFill>
-              </a:rPr>
-              <a:t>3,</a:t>
-            </a:r>
-            <a:r>
-              <a:rPr lang="mr-IN" sz="2400" dirty="0">
-                <a:solidFill>
-                  <a:schemeClr val="bg1"/>
-                </a:solidFill>
-              </a:rPr>
-              <a:t> </a:t>
-            </a:r>
-            <a:r>
-              <a:rPr lang="mr-IN" sz="2400" dirty="0">
-                <a:solidFill>
-                  <a:schemeClr val="bg1"/>
-                </a:solidFill>
-              </a:rPr>
-              <a:t>4,</a:t>
-            </a:r>
-            <a:r>
-              <a:rPr lang="mr-IN" sz="2400" dirty="0">
-                <a:solidFill>
-                  <a:schemeClr val="bg1"/>
-                </a:solidFill>
-              </a:rPr>
-              <a:t> </a:t>
-            </a:r>
-            <a:r>
-              <a:rPr lang="mr-IN" sz="2400" dirty="0">
-                <a:solidFill>
-                  <a:schemeClr val="bg1"/>
-                </a:solidFill>
-              </a:rPr>
-              <a:t>5];</a:t>
-            </a:r>
-            <a:r>
-              <a:rPr lang="mr-IN" sz="2400" dirty="0">
-                <a:solidFill>
-                  <a:schemeClr val="bg1"/>
-                </a:solidFill>
-              </a:rPr>
-              <a:t> </a:t>
+              <a:t>] = [1, 2, 3, 4, 5]; </a:t>
             </a:r>
             <a:endParaRPr lang="nl-NL" sz="2400" dirty="0" smtClean="0">
               <a:solidFill>
@@ -21738,31 +21550,7 @@
                   <a:schemeClr val="bg1"/>
                 </a:solidFill>
               </a:rPr>
-              <a:t>);</a:t>
-            </a:r>
-            <a:r>
-              <a:rPr lang="mr-IN" sz="2400" dirty="0">
-                <a:solidFill>
-                  <a:schemeClr val="bg1"/>
-                </a:solidFill>
-              </a:rPr>
-              <a:t> </a:t>
-            </a:r>
-            <a:r>
-              <a:rPr lang="mr-IN" sz="2400" dirty="0">
-                <a:solidFill>
-                  <a:schemeClr val="bg1"/>
-                </a:solidFill>
-              </a:rPr>
-              <a:t>// 1</a:t>
-            </a:r>
-            <a:r>
-              <a:rPr lang="mr-IN" sz="2400" dirty="0">
-                <a:solidFill>
-                  <a:schemeClr val="bg1"/>
-                </a:solidFill>
-              </a:rPr>
-              <a:t> </a:t>
+              <a:t>); // 1 </a:t>
             </a:r>
             <a:endParaRPr lang="nl-NL" sz="2400" dirty="0" smtClean="0">
               <a:solidFill>
@@ -21807,31 +21595,7 @@
                   <a:schemeClr val="bg1"/>
                 </a:solidFill>
               </a:rPr>
-              <a:t>);</a:t>
-            </a:r>
-            <a:r>
-              <a:rPr lang="mr-IN" sz="2400" dirty="0">
-                <a:solidFill>
-                  <a:schemeClr val="bg1"/>
-                </a:solidFill>
-              </a:rPr>
-              <a:t> </a:t>
-            </a:r>
-            <a:r>
-              <a:rPr lang="mr-IN" sz="2400" dirty="0">
-                <a:solidFill>
-                  <a:schemeClr val="bg1"/>
-                </a:solidFill>
-              </a:rPr>
-              <a:t>// 2</a:t>
-            </a:r>
-            <a:r>
-              <a:rPr lang="mr-IN" sz="2400" dirty="0">
-                <a:solidFill>
-                  <a:schemeClr val="bg1"/>
-                </a:solidFill>
-              </a:rPr>
-              <a:t> </a:t>
+              <a:t>); // 2 </a:t>
             </a:r>
             <a:endParaRPr lang="nl-NL" sz="2400" dirty="0" smtClean="0">
               <a:solidFill>
@@ -21884,23 +21648,7 @@
                   <a:schemeClr val="bg1"/>
                 </a:solidFill>
               </a:rPr>
-              <a:t>);</a:t>
-            </a:r>
-            <a:r>
-              <a:rPr lang="mr-IN" sz="2400" dirty="0">
-                <a:solidFill>
-                  <a:schemeClr val="bg1"/>
-                </a:solidFill>
-              </a:rPr>
-              <a:t> </a:t>
-            </a:r>
-            <a:r>
-              <a:rPr lang="mr-IN" sz="2400" dirty="0">
-                <a:solidFill>
-                  <a:schemeClr val="bg1"/>
-                </a:solidFill>
-              </a:rPr>
-              <a:t>// [3, 4, 5] </a:t>
+              <a:t>); // [3, 4, 5] </a:t>
             </a:r>
             <a:endParaRPr lang="nl-NL" sz="2400" dirty="0" smtClean="0">
               <a:solidFill>
@@ -21982,7 +21730,15 @@
                   <a:schemeClr val="bg1"/>
                 </a:solidFill>
               </a:rPr>
-              <a:t>,</a:t>
+              <a:t>, </a:t>
+            </a:r>
+            <a:r>
+              <a:rPr lang="mr-IN" sz="2400" dirty="0" err="1">
+                <a:solidFill>
+                  <a:schemeClr val="bg1"/>
+                </a:solidFill>
+              </a:rPr>
+              <a:t>b</a:t>
             </a:r>
             <a:r>
               <a:rPr lang="mr-IN" sz="2400" dirty="0">
@@ -21990,95 +21746,7 @@
                   <a:schemeClr val="bg1"/>
                 </a:solidFill>
               </a:rPr>
-              <a:t> </a:t>
-            </a:r>
-            <a:r>
-              <a:rPr lang="mr-IN" sz="2400" dirty="0" err="1">
-                <a:solidFill>
-                  <a:schemeClr val="bg1"/>
-                </a:solidFill>
-              </a:rPr>
-              <a:t>b</a:t>
-            </a:r>
-            <a:r>
-              <a:rPr lang="mr-IN" sz="2400" dirty="0">
-                <a:solidFill>
-                  <a:schemeClr val="bg1"/>
-                </a:solidFill>
-              </a:rPr>
-              <a:t>}</a:t>
-            </a:r>
-            <a:r>
-              <a:rPr lang="mr-IN" sz="2400" dirty="0">
-                <a:solidFill>
-                  <a:schemeClr val="bg1"/>
-                </a:solidFill>
-              </a:rPr>
-              <a:t> </a:t>
-            </a:r>
-            <a:r>
-              <a:rPr lang="mr-IN" sz="2400" dirty="0">
-                <a:solidFill>
-                  <a:schemeClr val="bg1"/>
-                </a:solidFill>
-              </a:rPr>
-              <a:t>=</a:t>
-            </a:r>
-            <a:r>
-              <a:rPr lang="mr-IN" sz="2400" dirty="0">
-                <a:solidFill>
-                  <a:schemeClr val="bg1"/>
-                </a:solidFill>
-              </a:rPr>
-              <a:t> </a:t>
-            </a:r>
-            <a:r>
-              <a:rPr lang="mr-IN" sz="2400" dirty="0">
-                <a:solidFill>
-                  <a:schemeClr val="bg1"/>
-                </a:solidFill>
-              </a:rPr>
-              <a:t>{</a:t>
-            </a:r>
-            <a:r>
-              <a:rPr lang="mr-IN" sz="2400" dirty="0">
-                <a:solidFill>
-                  <a:schemeClr val="bg1"/>
-                </a:solidFill>
-              </a:rPr>
-              <a:t>a</a:t>
-            </a:r>
-            <a:r>
-              <a:rPr lang="mr-IN" sz="2400" dirty="0">
-                <a:solidFill>
-                  <a:schemeClr val="bg1"/>
-                </a:solidFill>
-              </a:rPr>
-              <a:t>:1,</a:t>
-            </a:r>
-            <a:r>
-              <a:rPr lang="mr-IN" sz="2400" dirty="0">
-                <a:solidFill>
-                  <a:schemeClr val="bg1"/>
-                </a:solidFill>
-              </a:rPr>
-              <a:t> b</a:t>
-            </a:r>
-            <a:r>
-              <a:rPr lang="mr-IN" sz="2400" dirty="0">
-                <a:solidFill>
-                  <a:schemeClr val="bg1"/>
-                </a:solidFill>
-              </a:rPr>
-              <a:t>:2});</a:t>
-            </a:r>
-            <a:r>
-              <a:rPr lang="mr-IN" sz="2400" dirty="0">
-                <a:solidFill>
-                  <a:schemeClr val="bg1"/>
-                </a:solidFill>
-              </a:rPr>
-              <a:t> </a:t>
+              <a:t>} = {a:1, b:2}); </a:t>
             </a:r>
             <a:endParaRPr lang="nl-NL" sz="2400" dirty="0" smtClean="0">
               <a:solidFill>
@@ -22123,31 +21791,7 @@
                   <a:schemeClr val="bg1"/>
                 </a:solidFill>
               </a:rPr>
-              <a:t>);</a:t>
-            </a:r>
-            <a:r>
-              <a:rPr lang="mr-IN" sz="2400" dirty="0">
-                <a:solidFill>
-                  <a:schemeClr val="bg1"/>
-                </a:solidFill>
-              </a:rPr>
-              <a:t> </a:t>
-            </a:r>
-            <a:r>
-              <a:rPr lang="mr-IN" sz="2400" dirty="0">
-                <a:solidFill>
-                  <a:schemeClr val="bg1"/>
-                </a:solidFill>
-              </a:rPr>
-              <a:t>// 1</a:t>
-            </a:r>
-            <a:r>
-              <a:rPr lang="mr-IN" sz="2400" dirty="0">
-                <a:solidFill>
-                  <a:schemeClr val="bg1"/>
-                </a:solidFill>
-              </a:rPr>
-              <a:t> </a:t>
+              <a:t>); // 1 </a:t>
             </a:r>
             <a:endParaRPr lang="nl-NL" sz="2400" dirty="0" smtClean="0">
               <a:solidFill>
@@ -22192,23 +21836,7 @@
                   <a:schemeClr val="bg1"/>
                 </a:solidFill>
               </a:rPr>
-              <a:t>);</a:t>
-            </a:r>
-            <a:r>
-              <a:rPr lang="mr-IN" sz="2400" dirty="0">
-                <a:solidFill>
-                  <a:schemeClr val="bg1"/>
-                </a:solidFill>
-              </a:rPr>
-              <a:t> </a:t>
-            </a:r>
-            <a:r>
-              <a:rPr lang="mr-IN" sz="2400" dirty="0">
-                <a:solidFill>
-                  <a:schemeClr val="bg1"/>
-                </a:solidFill>
-              </a:rPr>
-              <a:t>// 2</a:t>
+              <a:t>); // 2</a:t>
             </a:r>
             <a:endParaRPr lang="en-US" sz="2300" b="0" i="0" u="none" strike="noStrike" cap="none" dirty="0">
               <a:solidFill>
@@ -22340,596 +21968,605 @@
           </a:bodyPr>
           <a:lstStyle/>
           <a:p>
-            <a:pPr marL="0" marR="0" lvl="0" indent="0" algn="l" rtl="0">
-              <a:lnSpc>
-                <a:spcPct val="100000"/>
-              </a:lnSpc>
-              <a:spcBef>
-                <a:spcPts val="0"/>
-              </a:spcBef>
-              <a:spcAft>
-                <a:spcPts val="0"/>
-              </a:spcAft>
+            <a:pPr lvl="0">
               <a:buClr>
                 <a:srgbClr val="AEAEAE"/>
               </a:buClr>
               <a:buSzPct val="25000"/>
-              <a:buFont typeface="Helvetica Neue"/>
-              <a:buNone/>
             </a:pPr>
-            <a:r>
-              <a:rPr lang="en-US" sz="2300" b="0" i="1" u="none" strike="noStrike" cap="none">
-                <a:solidFill>
-                  <a:srgbClr val="AEAEAE"/>
-                </a:solidFill>
-                <a:latin typeface="Helvetica Neue"/>
-                <a:ea typeface="Helvetica Neue"/>
-                <a:cs typeface="Helvetica Neue"/>
-                <a:sym typeface="Helvetica Neue"/>
-              </a:rPr>
-              <a:t>//  lib/mathplusplus.js</a:t>
-            </a:r>
-          </a:p>
-          <a:p>
-            <a:pPr marL="0" marR="0" lvl="0" indent="0" algn="l" rtl="0">
-              <a:lnSpc>
-                <a:spcPct val="100000"/>
-              </a:lnSpc>
-              <a:spcBef>
-                <a:spcPts val="0"/>
-              </a:spcBef>
-              <a:spcAft>
-                <a:spcPts val="0"/>
-              </a:spcAft>
-              <a:buClr>
-                <a:srgbClr val="99CF50"/>
+            <a:endParaRPr lang="en-US" sz="2400" dirty="0" smtClean="0">
+              <a:solidFill>
+                <a:schemeClr val="bg1"/>
+              </a:solidFill>
+            </a:endParaRPr>
+          </a:p>
+          <a:p>
+            <a:pPr lvl="0">
+              <a:buClr>
+                <a:srgbClr val="AEAEAE"/>
               </a:buClr>
               <a:buSzPct val="25000"/>
-              <a:buFont typeface="Consolas"/>
-              <a:buNone/>
             </a:pPr>
             <a:r>
-              <a:rPr lang="en-US" sz="2300" b="0" i="0" u="none" strike="noStrike" cap="none">
-                <a:solidFill>
-                  <a:srgbClr val="99CF50"/>
-                </a:solidFill>
-                <a:latin typeface="Consolas"/>
-                <a:ea typeface="Consolas"/>
-                <a:cs typeface="Consolas"/>
-                <a:sym typeface="Consolas"/>
+              <a:rPr lang="en-US" sz="2400" dirty="0" smtClean="0">
+                <a:solidFill>
+                  <a:schemeClr val="bg1"/>
+                </a:solidFill>
+              </a:rPr>
+              <a:t>//------ </a:t>
+            </a:r>
+            <a:r>
+              <a:rPr lang="en-US" sz="2400" dirty="0" err="1">
+                <a:solidFill>
+                  <a:schemeClr val="bg1"/>
+                </a:solidFill>
+              </a:rPr>
+              <a:t>lib.js</a:t>
+            </a:r>
+            <a:r>
+              <a:rPr lang="en-US" sz="2400" dirty="0">
+                <a:solidFill>
+                  <a:schemeClr val="bg1"/>
+                </a:solidFill>
+              </a:rPr>
+              <a:t> ------</a:t>
+            </a:r>
+            <a:r>
+              <a:rPr lang="en-US" sz="2400" dirty="0">
+                <a:solidFill>
+                  <a:schemeClr val="bg1"/>
+                </a:solidFill>
+              </a:rPr>
+              <a:t> </a:t>
+            </a:r>
+            <a:endParaRPr lang="en-US" sz="2400" dirty="0" smtClean="0">
+              <a:solidFill>
+                <a:schemeClr val="bg1"/>
+              </a:solidFill>
+            </a:endParaRPr>
+          </a:p>
+          <a:p>
+            <a:pPr lvl="0">
+              <a:buClr>
+                <a:srgbClr val="AEAEAE"/>
+              </a:buClr>
+              <a:buSzPct val="25000"/>
+            </a:pPr>
+            <a:r>
+              <a:rPr lang="en-US" sz="2400" b="1" dirty="0" smtClean="0">
+                <a:solidFill>
+                  <a:schemeClr val="bg1"/>
+                </a:solidFill>
               </a:rPr>
               <a:t>export</a:t>
             </a:r>
             <a:r>
-              <a:rPr lang="en-US" sz="2300" b="0" i="0" u="none" strike="noStrike" cap="none">
-                <a:solidFill>
-                  <a:srgbClr val="F8F8F8"/>
-                </a:solidFill>
-                <a:latin typeface="Consolas"/>
-                <a:ea typeface="Consolas"/>
-                <a:cs typeface="Consolas"/>
-                <a:sym typeface="Consolas"/>
+              <a:rPr lang="en-US" sz="2400" dirty="0" smtClean="0">
+                <a:solidFill>
+                  <a:schemeClr val="bg1"/>
+                </a:solidFill>
               </a:rPr>
               <a:t> </a:t>
             </a:r>
             <a:r>
-              <a:rPr lang="en-US" sz="2300" b="0" i="0" u="none" strike="noStrike" cap="none">
-                <a:solidFill>
-                  <a:srgbClr val="E28964"/>
-                </a:solidFill>
-                <a:latin typeface="Consolas"/>
-                <a:ea typeface="Consolas"/>
-                <a:cs typeface="Consolas"/>
-                <a:sym typeface="Consolas"/>
-              </a:rPr>
-              <a:t>*</a:t>
-            </a:r>
-            <a:r>
-              <a:rPr lang="en-US" sz="2300" b="0" i="0" u="none" strike="noStrike" cap="none">
-                <a:solidFill>
-                  <a:srgbClr val="F8F8F8"/>
-                </a:solidFill>
-                <a:latin typeface="Consolas"/>
-                <a:ea typeface="Consolas"/>
-                <a:cs typeface="Consolas"/>
-                <a:sym typeface="Consolas"/>
-              </a:rPr>
-              <a:t> from </a:t>
-            </a:r>
-            <a:r>
-              <a:rPr lang="en-US" sz="2300" b="0" i="0" u="none" strike="noStrike" cap="none">
-                <a:solidFill>
-                  <a:srgbClr val="65B042"/>
-                </a:solidFill>
-                <a:latin typeface="Consolas"/>
-                <a:ea typeface="Consolas"/>
-                <a:cs typeface="Consolas"/>
-                <a:sym typeface="Consolas"/>
-              </a:rPr>
-              <a:t>"lib/math"</a:t>
-            </a:r>
-          </a:p>
-          <a:p>
-            <a:pPr marL="0" marR="0" lvl="0" indent="0" algn="l" rtl="0">
-              <a:lnSpc>
-                <a:spcPct val="100000"/>
-              </a:lnSpc>
-              <a:spcBef>
-                <a:spcPts val="0"/>
-              </a:spcBef>
-              <a:spcAft>
-                <a:spcPts val="0"/>
-              </a:spcAft>
-              <a:buClr>
-                <a:srgbClr val="99CF50"/>
+              <a:rPr lang="en-US" sz="2400" b="1" dirty="0" err="1">
+                <a:solidFill>
+                  <a:schemeClr val="bg1"/>
+                </a:solidFill>
+              </a:rPr>
+              <a:t>const</a:t>
+            </a:r>
+            <a:r>
+              <a:rPr lang="en-US" sz="2400" dirty="0">
+                <a:solidFill>
+                  <a:schemeClr val="bg1"/>
+                </a:solidFill>
+              </a:rPr>
+              <a:t> </a:t>
+            </a:r>
+            <a:r>
+              <a:rPr lang="en-US" sz="2400" dirty="0" err="1">
+                <a:solidFill>
+                  <a:schemeClr val="bg1"/>
+                </a:solidFill>
+              </a:rPr>
+              <a:t>sqrt</a:t>
+            </a:r>
+            <a:r>
+              <a:rPr lang="en-US" sz="2400" dirty="0">
+                <a:solidFill>
+                  <a:schemeClr val="bg1"/>
+                </a:solidFill>
+              </a:rPr>
+              <a:t> = </a:t>
+            </a:r>
+            <a:r>
+              <a:rPr lang="en-US" sz="2400" b="1" dirty="0" err="1">
+                <a:solidFill>
+                  <a:schemeClr val="bg1"/>
+                </a:solidFill>
+              </a:rPr>
+              <a:t>Math</a:t>
+            </a:r>
+            <a:r>
+              <a:rPr lang="en-US" sz="2400" dirty="0" err="1">
+                <a:solidFill>
+                  <a:schemeClr val="bg1"/>
+                </a:solidFill>
+              </a:rPr>
+              <a:t>.sqrt</a:t>
+            </a:r>
+            <a:r>
+              <a:rPr lang="en-US" sz="2400" dirty="0">
+                <a:solidFill>
+                  <a:schemeClr val="bg1"/>
+                </a:solidFill>
+              </a:rPr>
+              <a:t>; </a:t>
+            </a:r>
+            <a:endParaRPr lang="en-US" sz="2400" dirty="0" smtClean="0">
+              <a:solidFill>
+                <a:schemeClr val="bg1"/>
+              </a:solidFill>
+            </a:endParaRPr>
+          </a:p>
+          <a:p>
+            <a:pPr lvl="0">
+              <a:buClr>
+                <a:srgbClr val="AEAEAE"/>
               </a:buClr>
               <a:buSzPct val="25000"/>
-              <a:buFont typeface="Consolas"/>
-              <a:buNone/>
             </a:pPr>
             <a:r>
-              <a:rPr lang="en-US" sz="2300" b="0" i="0" u="none" strike="noStrike" cap="none">
-                <a:solidFill>
-                  <a:srgbClr val="99CF50"/>
-                </a:solidFill>
-                <a:latin typeface="Consolas"/>
-                <a:ea typeface="Consolas"/>
-                <a:cs typeface="Consolas"/>
-                <a:sym typeface="Consolas"/>
+              <a:rPr lang="en-US" sz="2400" b="1" dirty="0" smtClean="0">
+                <a:solidFill>
+                  <a:schemeClr val="bg1"/>
+                </a:solidFill>
               </a:rPr>
               <a:t>export</a:t>
             </a:r>
             <a:r>
-              <a:rPr lang="en-US" sz="2300" b="0" i="0" u="none" strike="noStrike" cap="none">
-                <a:solidFill>
-                  <a:srgbClr val="F8F8F8"/>
-                </a:solidFill>
-                <a:latin typeface="Consolas"/>
-                <a:ea typeface="Consolas"/>
-                <a:cs typeface="Consolas"/>
-                <a:sym typeface="Consolas"/>
+              <a:rPr lang="en-US" sz="2400" dirty="0" smtClean="0">
+                <a:solidFill>
+                  <a:schemeClr val="bg1"/>
+                </a:solidFill>
               </a:rPr>
               <a:t> </a:t>
             </a:r>
             <a:r>
-              <a:rPr lang="en-US" sz="2300" b="0" i="0" u="none" strike="noStrike" cap="none">
-                <a:solidFill>
-                  <a:srgbClr val="99CF50"/>
-                </a:solidFill>
-                <a:latin typeface="Consolas"/>
-                <a:ea typeface="Consolas"/>
-                <a:cs typeface="Consolas"/>
-                <a:sym typeface="Consolas"/>
-              </a:rPr>
-              <a:t>const</a:t>
-            </a:r>
-            <a:r>
-              <a:rPr lang="en-US" sz="2300" b="0" i="0" u="none" strike="noStrike" cap="none">
-                <a:solidFill>
-                  <a:srgbClr val="F8F8F8"/>
-                </a:solidFill>
-                <a:latin typeface="Consolas"/>
-                <a:ea typeface="Consolas"/>
-                <a:cs typeface="Consolas"/>
-                <a:sym typeface="Consolas"/>
-              </a:rPr>
-              <a:t> e </a:t>
-            </a:r>
-            <a:r>
-              <a:rPr lang="en-US" sz="2300" b="0" i="0" u="none" strike="noStrike" cap="none">
-                <a:solidFill>
-                  <a:srgbClr val="E28964"/>
-                </a:solidFill>
-                <a:latin typeface="Consolas"/>
-                <a:ea typeface="Consolas"/>
-                <a:cs typeface="Consolas"/>
-                <a:sym typeface="Consolas"/>
-              </a:rPr>
-              <a:t>=</a:t>
-            </a:r>
-            <a:r>
-              <a:rPr lang="en-US" sz="2300" b="0" i="0" u="none" strike="noStrike" cap="none">
-                <a:solidFill>
-                  <a:srgbClr val="F8F8F8"/>
-                </a:solidFill>
-                <a:latin typeface="Consolas"/>
-                <a:ea typeface="Consolas"/>
-                <a:cs typeface="Consolas"/>
-                <a:sym typeface="Consolas"/>
+              <a:rPr lang="en-US" sz="2400" b="1" dirty="0">
+                <a:solidFill>
+                  <a:schemeClr val="bg1"/>
+                </a:solidFill>
+              </a:rPr>
+              <a:t>function</a:t>
+            </a:r>
+            <a:r>
+              <a:rPr lang="en-US" sz="2400" dirty="0">
+                <a:solidFill>
+                  <a:schemeClr val="bg1"/>
+                </a:solidFill>
               </a:rPr>
               <a:t> </a:t>
             </a:r>
             <a:r>
-              <a:rPr lang="en-US" sz="2300" b="0" i="0" u="none" strike="noStrike" cap="none">
-                <a:solidFill>
-                  <a:srgbClr val="3387CC"/>
-                </a:solidFill>
-                <a:latin typeface="Consolas"/>
-                <a:ea typeface="Consolas"/>
-                <a:cs typeface="Consolas"/>
-                <a:sym typeface="Consolas"/>
-              </a:rPr>
-              <a:t>2.71828182846</a:t>
-            </a:r>
-          </a:p>
-          <a:p>
-            <a:pPr marL="0" marR="0" lvl="0" indent="0" algn="l" rtl="0">
-              <a:lnSpc>
-                <a:spcPct val="100000"/>
-              </a:lnSpc>
-              <a:spcBef>
-                <a:spcPts val="0"/>
-              </a:spcBef>
-              <a:spcAft>
-                <a:spcPts val="0"/>
-              </a:spcAft>
-              <a:buClr>
-                <a:srgbClr val="99CF50"/>
+              <a:rPr lang="en-US" sz="2400" b="1" dirty="0">
+                <a:solidFill>
+                  <a:schemeClr val="bg1"/>
+                </a:solidFill>
+              </a:rPr>
+              <a:t>square</a:t>
+            </a:r>
+            <a:r>
+              <a:rPr lang="en-US" sz="2400" dirty="0">
+                <a:solidFill>
+                  <a:schemeClr val="bg1"/>
+                </a:solidFill>
+              </a:rPr>
+              <a:t>(x) { </a:t>
+            </a:r>
+            <a:r>
+              <a:rPr lang="en-US" sz="2400" b="1" dirty="0">
+                <a:solidFill>
+                  <a:schemeClr val="bg1"/>
+                </a:solidFill>
+              </a:rPr>
+              <a:t>return</a:t>
+            </a:r>
+            <a:r>
+              <a:rPr lang="en-US" sz="2400" dirty="0">
+                <a:solidFill>
+                  <a:schemeClr val="bg1"/>
+                </a:solidFill>
+              </a:rPr>
+              <a:t> x * x; } </a:t>
+            </a:r>
+            <a:endParaRPr lang="en-US" sz="2400" dirty="0" smtClean="0">
+              <a:solidFill>
+                <a:schemeClr val="bg1"/>
+              </a:solidFill>
+            </a:endParaRPr>
+          </a:p>
+          <a:p>
+            <a:pPr lvl="0">
+              <a:buClr>
+                <a:srgbClr val="AEAEAE"/>
               </a:buClr>
               <a:buSzPct val="25000"/>
-              <a:buFont typeface="Consolas"/>
-              <a:buNone/>
             </a:pPr>
             <a:r>
-              <a:rPr lang="en-US" sz="2300" b="0" i="0" u="none" strike="noStrike" cap="none">
-                <a:solidFill>
-                  <a:srgbClr val="99CF50"/>
-                </a:solidFill>
-                <a:latin typeface="Consolas"/>
-                <a:ea typeface="Consolas"/>
-                <a:cs typeface="Consolas"/>
-                <a:sym typeface="Consolas"/>
+              <a:rPr lang="en-US" sz="2400" b="1" dirty="0" smtClean="0">
+                <a:solidFill>
+                  <a:schemeClr val="bg1"/>
+                </a:solidFill>
               </a:rPr>
               <a:t>export</a:t>
             </a:r>
             <a:r>
-              <a:rPr lang="en-US" sz="2300" b="0" i="0" u="none" strike="noStrike" cap="none">
-                <a:solidFill>
-                  <a:srgbClr val="F8F8F8"/>
-                </a:solidFill>
-                <a:latin typeface="Consolas"/>
-                <a:ea typeface="Consolas"/>
-                <a:cs typeface="Consolas"/>
-                <a:sym typeface="Consolas"/>
+              <a:rPr lang="en-US" sz="2400" dirty="0" smtClean="0">
+                <a:solidFill>
+                  <a:schemeClr val="bg1"/>
+                </a:solidFill>
               </a:rPr>
               <a:t> </a:t>
             </a:r>
             <a:r>
-              <a:rPr lang="en-US" sz="2300" b="0" i="0" u="none" strike="noStrike" cap="none">
-                <a:solidFill>
-                  <a:srgbClr val="E28964"/>
-                </a:solidFill>
-                <a:latin typeface="Consolas"/>
-                <a:ea typeface="Consolas"/>
-                <a:cs typeface="Consolas"/>
-                <a:sym typeface="Consolas"/>
-              </a:rPr>
-              <a:t>default</a:t>
-            </a:r>
-            <a:r>
-              <a:rPr lang="en-US" sz="2300" b="0" i="0" u="none" strike="noStrike" cap="none">
-                <a:solidFill>
-                  <a:srgbClr val="F8F8F8"/>
-                </a:solidFill>
-                <a:latin typeface="Consolas"/>
-                <a:ea typeface="Consolas"/>
-                <a:cs typeface="Consolas"/>
-                <a:sym typeface="Consolas"/>
-              </a:rPr>
-              <a:t> x </a:t>
-            </a:r>
-            <a:r>
-              <a:rPr lang="en-US" sz="2300" b="0" i="0" u="none" strike="noStrike" cap="none">
-                <a:solidFill>
-                  <a:srgbClr val="E28964"/>
-                </a:solidFill>
-                <a:latin typeface="Consolas"/>
-                <a:ea typeface="Consolas"/>
-                <a:cs typeface="Consolas"/>
-                <a:sym typeface="Consolas"/>
-              </a:rPr>
-              <a:t>=&gt;</a:t>
-            </a:r>
-            <a:r>
-              <a:rPr lang="en-US" sz="2300" b="0" i="0" u="none" strike="noStrike" cap="none">
-                <a:solidFill>
-                  <a:srgbClr val="F8F8F8"/>
-                </a:solidFill>
-                <a:latin typeface="Consolas"/>
-                <a:ea typeface="Consolas"/>
-                <a:cs typeface="Consolas"/>
-                <a:sym typeface="Consolas"/>
+              <a:rPr lang="en-US" sz="2400" b="1" dirty="0">
+                <a:solidFill>
+                  <a:schemeClr val="bg1"/>
+                </a:solidFill>
+              </a:rPr>
+              <a:t>function</a:t>
+            </a:r>
+            <a:r>
+              <a:rPr lang="en-US" sz="2400" dirty="0">
+                <a:solidFill>
+                  <a:schemeClr val="bg1"/>
+                </a:solidFill>
               </a:rPr>
               <a:t> </a:t>
             </a:r>
             <a:r>
-              <a:rPr lang="en-US" sz="2300" b="0" i="0" u="none" strike="noStrike" cap="none">
-                <a:solidFill>
-                  <a:srgbClr val="9B859D"/>
-                </a:solidFill>
-                <a:latin typeface="Consolas"/>
-                <a:ea typeface="Consolas"/>
-                <a:cs typeface="Consolas"/>
-                <a:sym typeface="Consolas"/>
-              </a:rPr>
-              <a:t>Math</a:t>
-            </a:r>
-            <a:r>
-              <a:rPr lang="en-US" sz="2300" b="0" i="0" u="none" strike="noStrike" cap="none">
-                <a:solidFill>
-                  <a:srgbClr val="F8F8F8"/>
-                </a:solidFill>
-                <a:latin typeface="Consolas"/>
-                <a:ea typeface="Consolas"/>
-                <a:cs typeface="Consolas"/>
-                <a:sym typeface="Consolas"/>
-              </a:rPr>
-              <a:t>.</a:t>
-            </a:r>
-            <a:r>
-              <a:rPr lang="en-US" sz="2300" b="0" i="0" u="none" strike="noStrike" cap="none">
-                <a:solidFill>
-                  <a:srgbClr val="DAD085"/>
-                </a:solidFill>
-                <a:latin typeface="Consolas"/>
-                <a:ea typeface="Consolas"/>
-                <a:cs typeface="Consolas"/>
-                <a:sym typeface="Consolas"/>
-              </a:rPr>
-              <a:t>exp</a:t>
-            </a:r>
-            <a:r>
-              <a:rPr lang="en-US" sz="2300" b="0" i="0" u="none" strike="noStrike" cap="none">
-                <a:solidFill>
-                  <a:srgbClr val="F8F8F8"/>
-                </a:solidFill>
-                <a:latin typeface="Consolas"/>
-                <a:ea typeface="Consolas"/>
-                <a:cs typeface="Consolas"/>
-                <a:sym typeface="Consolas"/>
-              </a:rPr>
-              <a:t>(x)</a:t>
-            </a:r>
-          </a:p>
-          <a:p>
-            <a:pPr marL="0" marR="0" lvl="0" indent="0" algn="l" rtl="0">
-              <a:lnSpc>
-                <a:spcPct val="100000"/>
-              </a:lnSpc>
-              <a:spcBef>
-                <a:spcPts val="0"/>
-              </a:spcBef>
-              <a:spcAft>
-                <a:spcPts val="0"/>
-              </a:spcAft>
-              <a:buClr>
-                <a:srgbClr val="F8F8F8"/>
-              </a:buClr>
-              <a:buFont typeface="Consolas"/>
-              <a:buNone/>
+              <a:rPr lang="en-US" sz="2400" b="1" dirty="0" err="1">
+                <a:solidFill>
+                  <a:schemeClr val="bg1"/>
+                </a:solidFill>
+              </a:rPr>
+              <a:t>diag</a:t>
+            </a:r>
+            <a:r>
+              <a:rPr lang="en-US" sz="2400" dirty="0">
+                <a:solidFill>
+                  <a:schemeClr val="bg1"/>
+                </a:solidFill>
+              </a:rPr>
+              <a:t>(x, y) { </a:t>
+            </a:r>
+            <a:r>
+              <a:rPr lang="en-US" sz="2400" b="1" dirty="0">
+                <a:solidFill>
+                  <a:schemeClr val="bg1"/>
+                </a:solidFill>
+              </a:rPr>
+              <a:t>return</a:t>
+            </a:r>
+            <a:r>
+              <a:rPr lang="en-US" sz="2400" dirty="0">
+                <a:solidFill>
+                  <a:schemeClr val="bg1"/>
+                </a:solidFill>
+              </a:rPr>
+              <a:t> </a:t>
+            </a:r>
+            <a:r>
+              <a:rPr lang="en-US" sz="2400" dirty="0" err="1">
+                <a:solidFill>
+                  <a:schemeClr val="bg1"/>
+                </a:solidFill>
+              </a:rPr>
+              <a:t>sqrt</a:t>
+            </a:r>
+            <a:r>
+              <a:rPr lang="en-US" sz="2400" dirty="0">
+                <a:solidFill>
+                  <a:schemeClr val="bg1"/>
+                </a:solidFill>
+              </a:rPr>
+              <a:t>(square(x) + square(y)); } </a:t>
+            </a:r>
+            <a:endParaRPr lang="en-US" sz="2400" dirty="0" smtClean="0">
+              <a:solidFill>
+                <a:schemeClr val="bg1"/>
+              </a:solidFill>
+            </a:endParaRPr>
+          </a:p>
+          <a:p>
+            <a:pPr lvl="0">
+              <a:buClr>
+                <a:srgbClr val="AEAEAE"/>
+              </a:buClr>
+              <a:buSzPct val="25000"/>
             </a:pPr>
-            <a:endParaRPr sz="2300" b="0" i="0" u="none" strike="noStrike" cap="none">
+            <a:endParaRPr lang="en-US" sz="2400" dirty="0">
               <a:solidFill>
-                <a:srgbClr val="F8F8F8"/>
+                <a:schemeClr val="bg1"/>
               </a:solidFill>
-              <a:latin typeface="Helvetica Neue"/>
-              <a:ea typeface="Helvetica Neue"/>
-              <a:cs typeface="Helvetica Neue"/>
-              <a:sym typeface="Helvetica Neue"/>
             </a:endParaRPr>
           </a:p>
           <a:p>
-            <a:pPr marL="0" marR="0" lvl="0" indent="0" algn="l" rtl="0">
-              <a:lnSpc>
-                <a:spcPct val="100000"/>
-              </a:lnSpc>
-              <a:spcBef>
-                <a:spcPts val="0"/>
-              </a:spcBef>
-              <a:spcAft>
-                <a:spcPts val="0"/>
-              </a:spcAft>
+            <a:pPr lvl="0">
               <a:buClr>
                 <a:srgbClr val="AEAEAE"/>
               </a:buClr>
               <a:buSzPct val="25000"/>
-              <a:buFont typeface="Helvetica Neue"/>
-              <a:buNone/>
             </a:pPr>
             <a:r>
-              <a:rPr lang="en-US" sz="2300" b="0" i="1" u="none" strike="noStrike" cap="none">
-                <a:solidFill>
-                  <a:srgbClr val="AEAEAE"/>
-                </a:solidFill>
-                <a:latin typeface="Helvetica Neue"/>
-                <a:ea typeface="Helvetica Neue"/>
-                <a:cs typeface="Helvetica Neue"/>
-                <a:sym typeface="Helvetica Neue"/>
-              </a:rPr>
-              <a:t>//  someApp.js</a:t>
-            </a:r>
-          </a:p>
-          <a:p>
-            <a:pPr marL="0" marR="0" lvl="0" indent="0" algn="l" rtl="0">
-              <a:lnSpc>
-                <a:spcPct val="100000"/>
-              </a:lnSpc>
-              <a:spcBef>
-                <a:spcPts val="0"/>
-              </a:spcBef>
-              <a:spcAft>
-                <a:spcPts val="0"/>
-              </a:spcAft>
-              <a:buClr>
-                <a:srgbClr val="E28964"/>
+              <a:rPr lang="en-US" sz="2400" dirty="0" smtClean="0">
+                <a:solidFill>
+                  <a:schemeClr val="bg1"/>
+                </a:solidFill>
+              </a:rPr>
+              <a:t>//------ </a:t>
+            </a:r>
+            <a:r>
+              <a:rPr lang="en-US" sz="2400" dirty="0" err="1">
+                <a:solidFill>
+                  <a:schemeClr val="bg1"/>
+                </a:solidFill>
+              </a:rPr>
+              <a:t>main.js</a:t>
+            </a:r>
+            <a:r>
+              <a:rPr lang="en-US" sz="2400" dirty="0">
+                <a:solidFill>
+                  <a:schemeClr val="bg1"/>
+                </a:solidFill>
+              </a:rPr>
+              <a:t> </a:t>
+            </a:r>
+            <a:r>
+              <a:rPr lang="en-US" sz="2400" dirty="0" smtClean="0">
+                <a:solidFill>
+                  <a:schemeClr val="bg1"/>
+                </a:solidFill>
+              </a:rPr>
+              <a:t>------</a:t>
+            </a:r>
+          </a:p>
+          <a:p>
+            <a:pPr lvl="0">
+              <a:buClr>
+                <a:srgbClr val="AEAEAE"/>
               </a:buClr>
               <a:buSzPct val="25000"/>
-              <a:buFont typeface="Consolas"/>
-              <a:buNone/>
             </a:pPr>
             <a:r>
-              <a:rPr lang="en-US" sz="2300" b="0" i="0" u="none" strike="noStrike" cap="none">
-                <a:solidFill>
-                  <a:srgbClr val="E28964"/>
-                </a:solidFill>
-                <a:latin typeface="Consolas"/>
-                <a:ea typeface="Consolas"/>
-                <a:cs typeface="Consolas"/>
-                <a:sym typeface="Consolas"/>
+              <a:rPr lang="en-US" sz="2400" dirty="0" smtClean="0">
+                <a:solidFill>
+                  <a:schemeClr val="bg1"/>
+                </a:solidFill>
+              </a:rPr>
+              <a:t> </a:t>
+            </a:r>
+            <a:r>
+              <a:rPr lang="en-US" sz="2400" b="1" dirty="0">
+                <a:solidFill>
+                  <a:schemeClr val="bg1"/>
+                </a:solidFill>
               </a:rPr>
               <a:t>import</a:t>
             </a:r>
             <a:r>
-              <a:rPr lang="en-US" sz="2300" b="0" i="0" u="none" strike="noStrike" cap="none">
-                <a:solidFill>
-                  <a:srgbClr val="F8F8F8"/>
-                </a:solidFill>
-                <a:latin typeface="Consolas"/>
-                <a:ea typeface="Consolas"/>
-                <a:cs typeface="Consolas"/>
-                <a:sym typeface="Consolas"/>
-              </a:rPr>
-              <a:t> exp, { pi as apple, e } from </a:t>
-            </a:r>
-            <a:r>
-              <a:rPr lang="en-US" sz="2300" b="0" i="0" u="none" strike="noStrike" cap="none">
-                <a:solidFill>
-                  <a:srgbClr val="65B042"/>
-                </a:solidFill>
-                <a:latin typeface="Consolas"/>
-                <a:ea typeface="Consolas"/>
-                <a:cs typeface="Consolas"/>
-                <a:sym typeface="Consolas"/>
-              </a:rPr>
-              <a:t>"./lib/mathplusplus"</a:t>
-            </a:r>
-          </a:p>
-          <a:p>
-            <a:pPr marL="0" marR="0" lvl="0" indent="0" algn="l" rtl="0">
-              <a:lnSpc>
-                <a:spcPct val="100000"/>
-              </a:lnSpc>
-              <a:spcBef>
-                <a:spcPts val="0"/>
-              </a:spcBef>
-              <a:spcAft>
-                <a:spcPts val="0"/>
-              </a:spcAft>
-              <a:buClr>
-                <a:srgbClr val="F8F8F8"/>
+              <a:rPr lang="en-US" sz="2400" dirty="0">
+                <a:solidFill>
+                  <a:schemeClr val="bg1"/>
+                </a:solidFill>
+              </a:rPr>
+              <a:t> { square, </a:t>
+            </a:r>
+            <a:r>
+              <a:rPr lang="en-US" sz="2400" dirty="0" err="1">
+                <a:solidFill>
+                  <a:schemeClr val="bg1"/>
+                </a:solidFill>
+              </a:rPr>
+              <a:t>diag</a:t>
+            </a:r>
+            <a:r>
+              <a:rPr lang="en-US" sz="2400" dirty="0">
+                <a:solidFill>
+                  <a:schemeClr val="bg1"/>
+                </a:solidFill>
+              </a:rPr>
+              <a:t> } </a:t>
+            </a:r>
+            <a:r>
+              <a:rPr lang="en-US" sz="2400" b="1" dirty="0">
+                <a:solidFill>
+                  <a:schemeClr val="bg1"/>
+                </a:solidFill>
+              </a:rPr>
+              <a:t>from</a:t>
+            </a:r>
+            <a:r>
+              <a:rPr lang="en-US" sz="2400" dirty="0">
+                <a:solidFill>
+                  <a:schemeClr val="bg1"/>
+                </a:solidFill>
+              </a:rPr>
+              <a:t> </a:t>
+            </a:r>
+            <a:r>
+              <a:rPr lang="en-US" sz="2400" dirty="0">
+                <a:solidFill>
+                  <a:schemeClr val="bg1"/>
+                </a:solidFill>
+              </a:rPr>
+              <a:t>'lib'</a:t>
+            </a:r>
+            <a:r>
+              <a:rPr lang="en-US" sz="2400" dirty="0">
+                <a:solidFill>
+                  <a:schemeClr val="bg1"/>
+                </a:solidFill>
+              </a:rPr>
+              <a:t>; </a:t>
+            </a:r>
+            <a:endParaRPr lang="en-US" sz="2400" dirty="0" smtClean="0">
+              <a:solidFill>
+                <a:schemeClr val="bg1"/>
+              </a:solidFill>
+            </a:endParaRPr>
+          </a:p>
+          <a:p>
+            <a:pPr lvl="0">
+              <a:buClr>
+                <a:srgbClr val="AEAEAE"/>
               </a:buClr>
               <a:buSzPct val="25000"/>
-              <a:buFont typeface="Consolas"/>
-              <a:buNone/>
             </a:pPr>
             <a:r>
-              <a:rPr lang="en-US" sz="2300" b="0" i="0" u="sng" strike="noStrike" cap="none">
-                <a:solidFill>
-                  <a:srgbClr val="F8F8F8"/>
-                </a:solidFill>
-                <a:latin typeface="Consolas"/>
-                <a:ea typeface="Consolas"/>
-                <a:cs typeface="Consolas"/>
-                <a:sym typeface="Consolas"/>
+              <a:rPr lang="en-US" sz="2400" b="1" dirty="0" err="1" smtClean="0">
+                <a:solidFill>
+                  <a:schemeClr val="bg1"/>
+                </a:solidFill>
               </a:rPr>
               <a:t>console</a:t>
             </a:r>
             <a:r>
-              <a:rPr lang="en-US" sz="2300" b="0" i="0" u="none" strike="noStrike" cap="none">
-                <a:solidFill>
-                  <a:srgbClr val="DAD085"/>
-                </a:solidFill>
-                <a:latin typeface="Consolas"/>
-                <a:ea typeface="Consolas"/>
-                <a:cs typeface="Consolas"/>
-                <a:sym typeface="Consolas"/>
+              <a:rPr lang="en-US" sz="2400" dirty="0" err="1" smtClean="0">
+                <a:solidFill>
+                  <a:schemeClr val="bg1"/>
+                </a:solidFill>
               </a:rPr>
               <a:t>.log</a:t>
             </a:r>
             <a:r>
-              <a:rPr lang="en-US" sz="2300" b="0" i="0" u="none" strike="noStrike" cap="none">
-                <a:solidFill>
-                  <a:srgbClr val="F8F8F8"/>
-                </a:solidFill>
-                <a:latin typeface="Consolas"/>
-                <a:ea typeface="Consolas"/>
-                <a:cs typeface="Consolas"/>
-                <a:sym typeface="Consolas"/>
+              <a:rPr lang="en-US" sz="2400" dirty="0" smtClean="0">
+                <a:solidFill>
+                  <a:schemeClr val="bg1"/>
+                </a:solidFill>
+              </a:rPr>
+              <a:t>(square(11</a:t>
+            </a:r>
+            <a:r>
+              <a:rPr lang="en-US" sz="2400" dirty="0">
+                <a:solidFill>
+                  <a:schemeClr val="bg1"/>
+                </a:solidFill>
+              </a:rPr>
+              <a:t>)); </a:t>
+            </a:r>
+            <a:r>
+              <a:rPr lang="en-US" sz="2400" dirty="0">
+                <a:solidFill>
+                  <a:schemeClr val="bg1"/>
+                </a:solidFill>
+              </a:rPr>
+              <a:t>// 121</a:t>
+            </a:r>
+            <a:r>
+              <a:rPr lang="en-US" sz="2400" dirty="0">
+                <a:solidFill>
+                  <a:schemeClr val="bg1"/>
+                </a:solidFill>
+              </a:rPr>
+              <a:t> </a:t>
+            </a:r>
+            <a:endParaRPr lang="en-US" sz="2400" dirty="0" smtClean="0">
+              <a:solidFill>
+                <a:schemeClr val="bg1"/>
+              </a:solidFill>
+            </a:endParaRPr>
+          </a:p>
+          <a:p>
+            <a:pPr lvl="0">
+              <a:buClr>
+                <a:srgbClr val="AEAEAE"/>
+              </a:buClr>
+              <a:buSzPct val="25000"/>
+            </a:pPr>
+            <a:r>
+              <a:rPr lang="en-US" sz="2400" b="1" dirty="0" err="1" smtClean="0">
+                <a:solidFill>
+                  <a:schemeClr val="bg1"/>
+                </a:solidFill>
+              </a:rPr>
+              <a:t>console</a:t>
+            </a:r>
+            <a:r>
+              <a:rPr lang="en-US" sz="2400" dirty="0" err="1" smtClean="0">
+                <a:solidFill>
+                  <a:schemeClr val="bg1"/>
+                </a:solidFill>
+              </a:rPr>
+              <a:t>.log</a:t>
+            </a:r>
+            <a:r>
+              <a:rPr lang="en-US" sz="2400" dirty="0" smtClean="0">
+                <a:solidFill>
+                  <a:schemeClr val="bg1"/>
+                </a:solidFill>
               </a:rPr>
               <a:t>(</a:t>
             </a:r>
             <a:r>
-              <a:rPr lang="en-US" sz="2300" b="0" i="0" u="none" strike="noStrike" cap="none">
-                <a:solidFill>
-                  <a:srgbClr val="65B042"/>
-                </a:solidFill>
-                <a:latin typeface="Consolas"/>
-                <a:ea typeface="Consolas"/>
-                <a:cs typeface="Consolas"/>
-                <a:sym typeface="Consolas"/>
-              </a:rPr>
-              <a:t>"e^{π} = "</a:t>
-            </a:r>
-            <a:r>
-              <a:rPr lang="en-US" sz="2300" b="0" i="0" u="none" strike="noStrike" cap="none">
-                <a:solidFill>
-                  <a:srgbClr val="F8F8F8"/>
-                </a:solidFill>
-                <a:latin typeface="Consolas"/>
-                <a:ea typeface="Consolas"/>
-                <a:cs typeface="Consolas"/>
-                <a:sym typeface="Consolas"/>
-              </a:rPr>
-              <a:t> </a:t>
-            </a:r>
-            <a:r>
-              <a:rPr lang="en-US" sz="2300" b="0" i="0" u="none" strike="noStrike" cap="none">
-                <a:solidFill>
-                  <a:srgbClr val="E28964"/>
-                </a:solidFill>
-                <a:latin typeface="Consolas"/>
-                <a:ea typeface="Consolas"/>
-                <a:cs typeface="Consolas"/>
-                <a:sym typeface="Consolas"/>
-              </a:rPr>
-              <a:t>+</a:t>
-            </a:r>
-            <a:r>
-              <a:rPr lang="en-US" sz="2300" b="0" i="0" u="none" strike="noStrike" cap="none">
-                <a:solidFill>
-                  <a:srgbClr val="F8F8F8"/>
-                </a:solidFill>
-                <a:latin typeface="Consolas"/>
-                <a:ea typeface="Consolas"/>
-                <a:cs typeface="Consolas"/>
-                <a:sym typeface="Consolas"/>
-              </a:rPr>
-              <a:t> </a:t>
-            </a:r>
-            <a:r>
-              <a:rPr lang="en-US" sz="2300" b="0" i="0" u="none" strike="noStrike" cap="none">
-                <a:solidFill>
-                  <a:srgbClr val="DAD085"/>
-                </a:solidFill>
-                <a:latin typeface="Consolas"/>
-                <a:ea typeface="Consolas"/>
-                <a:cs typeface="Consolas"/>
-                <a:sym typeface="Consolas"/>
-              </a:rPr>
-              <a:t>exp</a:t>
-            </a:r>
-            <a:r>
-              <a:rPr lang="en-US" sz="2300" b="0" i="0" u="none" strike="noStrike" cap="none">
-                <a:solidFill>
-                  <a:srgbClr val="F8F8F8"/>
-                </a:solidFill>
-                <a:latin typeface="Consolas"/>
-                <a:ea typeface="Consolas"/>
-                <a:cs typeface="Consolas"/>
-                <a:sym typeface="Consolas"/>
-              </a:rPr>
-              <a:t>(apple))</a:t>
-            </a:r>
+              <a:rPr lang="en-US" sz="2400" dirty="0" err="1" smtClean="0">
+                <a:solidFill>
+                  <a:schemeClr val="bg1"/>
+                </a:solidFill>
+              </a:rPr>
+              <a:t>diag</a:t>
+            </a:r>
+            <a:r>
+              <a:rPr lang="en-US" sz="2400" dirty="0" smtClean="0">
+                <a:solidFill>
+                  <a:schemeClr val="bg1"/>
+                </a:solidFill>
+              </a:rPr>
+              <a:t>(4</a:t>
+            </a:r>
+            <a:r>
+              <a:rPr lang="en-US" sz="2400" dirty="0">
+                <a:solidFill>
+                  <a:schemeClr val="bg1"/>
+                </a:solidFill>
+              </a:rPr>
+              <a:t>, </a:t>
+            </a:r>
+            <a:r>
+              <a:rPr lang="en-US" sz="2400" dirty="0">
+                <a:solidFill>
+                  <a:schemeClr val="bg1"/>
+                </a:solidFill>
+              </a:rPr>
+              <a:t>3</a:t>
+            </a:r>
+            <a:r>
+              <a:rPr lang="en-US" sz="2400" dirty="0">
+                <a:solidFill>
+                  <a:schemeClr val="bg1"/>
+                </a:solidFill>
+              </a:rPr>
+              <a:t>)); </a:t>
+            </a:r>
+            <a:r>
+              <a:rPr lang="en-US" sz="2400" dirty="0">
+                <a:solidFill>
+                  <a:schemeClr val="bg1"/>
+                </a:solidFill>
+              </a:rPr>
+              <a:t>// 5</a:t>
+            </a:r>
+            <a:endParaRPr lang="en-US" sz="2300" b="0" i="0" u="none" strike="noStrike" cap="none" dirty="0">
+              <a:solidFill>
+                <a:schemeClr val="bg1"/>
+              </a:solidFill>
+              <a:latin typeface="Consolas"/>
+              <a:ea typeface="Consolas"/>
+              <a:cs typeface="Consolas"/>
+              <a:sym typeface="Consolas"/>
+            </a:endParaRPr>
           </a:p>
         </p:txBody>
       </p:sp>
@@ -23073,7 +22710,7 @@
               <a:buChar char="•"/>
             </a:pPr>
             <a:r>
-              <a:rPr lang="en-US" sz="2400" b="0" i="0" u="none" strike="noStrike" cap="none">
+              <a:rPr lang="en-US" sz="2400" b="0" i="0" u="none" strike="noStrike" cap="none" dirty="0">
                 <a:solidFill>
                   <a:srgbClr val="FFFFFF"/>
                 </a:solidFill>
@@ -23104,7 +22741,7 @@
               <a:buChar char="•"/>
             </a:pPr>
             <a:r>
-              <a:rPr lang="en-US" sz="2400" b="0" i="0" u="none" strike="noStrike" cap="none">
+              <a:rPr lang="en-US" sz="2400" b="0" i="0" u="none" strike="noStrike" cap="none" dirty="0">
                 <a:solidFill>
                   <a:srgbClr val="FFFFFF"/>
                 </a:solidFill>
@@ -23135,17 +22772,54 @@
               <a:buChar char="•"/>
             </a:pPr>
             <a:r>
-              <a:rPr lang="en-US" sz="2400" b="0" i="0" u="none" strike="noStrike" cap="none">
-                <a:solidFill>
-                  <a:srgbClr val="FFFFFF"/>
-                </a:solidFill>
-                <a:latin typeface="Helvetica Neue"/>
-                <a:ea typeface="Helvetica Neue"/>
-                <a:cs typeface="Helvetica Neue"/>
-                <a:sym typeface="Helvetica Neue"/>
-              </a:rPr>
-              <a:t>Transpiling helps </a:t>
-            </a:r>
+              <a:rPr lang="en-US" sz="2400" b="0" i="0" u="none" strike="noStrike" cap="none" dirty="0" err="1">
+                <a:solidFill>
+                  <a:srgbClr val="FFFFFF"/>
+                </a:solidFill>
+                <a:latin typeface="Helvetica Neue"/>
+                <a:ea typeface="Helvetica Neue"/>
+                <a:cs typeface="Helvetica Neue"/>
+                <a:sym typeface="Helvetica Neue"/>
+              </a:rPr>
+              <a:t>Transpiling</a:t>
+            </a:r>
+            <a:r>
+              <a:rPr lang="en-US" sz="2400" b="0" i="0" u="none" strike="noStrike" cap="none" dirty="0">
+                <a:solidFill>
+                  <a:srgbClr val="FFFFFF"/>
+                </a:solidFill>
+                <a:latin typeface="Helvetica Neue"/>
+                <a:ea typeface="Helvetica Neue"/>
+                <a:cs typeface="Helvetica Neue"/>
+                <a:sym typeface="Helvetica Neue"/>
+              </a:rPr>
+              <a:t> helps </a:t>
+            </a:r>
+            <a:endParaRPr lang="en-US" sz="2400" b="0" i="0" u="none" strike="noStrike" cap="none" dirty="0" smtClean="0">
+              <a:solidFill>
+                <a:srgbClr val="FFFFFF"/>
+              </a:solidFill>
+              <a:latin typeface="Helvetica Neue"/>
+              <a:ea typeface="Helvetica Neue"/>
+              <a:cs typeface="Helvetica Neue"/>
+              <a:sym typeface="Helvetica Neue"/>
+            </a:endParaRPr>
+          </a:p>
+          <a:p>
+            <a:pPr lvl="3" indent="-279400"/>
+            <a:r>
+              <a:rPr lang="en-US" dirty="0"/>
+              <a:t>http://2ality.com/2014/09/es6-modules-final.html</a:t>
+            </a:r>
+            <a:endParaRPr lang="en-US" sz="2400" b="0" i="0" u="none" strike="noStrike" cap="none" dirty="0">
+              <a:solidFill>
+                <a:srgbClr val="FFFFFF"/>
+              </a:solidFill>
+              <a:latin typeface="Helvetica Neue"/>
+              <a:ea typeface="Helvetica Neue"/>
+              <a:cs typeface="Helvetica Neue"/>
+              <a:sym typeface="Helvetica Neue"/>
+            </a:endParaRPr>
           </a:p>
         </p:txBody>
       </p:sp>
@@ -26891,6 +26565,549 @@
   <p:cSld>
     <p:spTree>
       <p:nvGrpSpPr>
+        <p:cNvPr id="1" name=""/>
+        <p:cNvGrpSpPr/>
+        <p:nvPr/>
+      </p:nvGrpSpPr>
+      <p:grpSpPr>
+        <a:xfrm>
+          <a:off x="0" y="0"/>
+          <a:ext cx="0" cy="0"/>
+          <a:chOff x="0" y="0"/>
+          <a:chExt cx="0" cy="0"/>
+        </a:xfrm>
+      </p:grpSpPr>
+      <p:sp>
+        <p:nvSpPr>
+          <p:cNvPr id="2" name="Title 1"/>
+          <p:cNvSpPr>
+            <a:spLocks noGrp="1"/>
+          </p:cNvSpPr>
+          <p:nvPr>
+            <p:ph type="title"/>
+          </p:nvPr>
+        </p:nvSpPr>
+        <p:spPr/>
+        <p:txBody>
+          <a:bodyPr/>
+          <a:lstStyle/>
+          <a:p>
+            <a:r>
+              <a:rPr lang="en-US" dirty="0" smtClean="0"/>
+              <a:t>Map</a:t>
+            </a:r>
+            <a:endParaRPr lang="en-US" dirty="0"/>
+          </a:p>
+        </p:txBody>
+      </p:sp>
+      <p:sp>
+        <p:nvSpPr>
+          <p:cNvPr id="3" name="Text Placeholder 2"/>
+          <p:cNvSpPr>
+            <a:spLocks noGrp="1"/>
+          </p:cNvSpPr>
+          <p:nvPr>
+            <p:ph type="body" idx="1"/>
+          </p:nvPr>
+        </p:nvSpPr>
+        <p:spPr/>
+        <p:txBody>
+          <a:bodyPr/>
+          <a:lstStyle/>
+          <a:p>
+            <a:pPr marL="114300" indent="0">
+              <a:buNone/>
+            </a:pPr>
+            <a:r>
+              <a:rPr lang="en-US" dirty="0" err="1"/>
+              <a:t>var</a:t>
+            </a:r>
+            <a:r>
+              <a:rPr lang="en-US" dirty="0"/>
+              <a:t> </a:t>
+            </a:r>
+            <a:r>
+              <a:rPr lang="en-US" dirty="0" err="1" smtClean="0"/>
+              <a:t>newMap</a:t>
+            </a:r>
+            <a:r>
+              <a:rPr lang="en-US" dirty="0" smtClean="0"/>
+              <a:t> </a:t>
+            </a:r>
+            <a:r>
+              <a:rPr lang="en-US" dirty="0"/>
+              <a:t>= new Map();</a:t>
+            </a:r>
+            <a:br>
+              <a:rPr lang="en-US" dirty="0"/>
+            </a:br>
+            <a:r>
+              <a:rPr lang="en-US" dirty="0" err="1" smtClean="0"/>
+              <a:t>newMap.set</a:t>
+            </a:r>
+            <a:r>
+              <a:rPr lang="en-US" dirty="0"/>
+              <a:t>('name', 'John'); </a:t>
+            </a:r>
+            <a:br>
+              <a:rPr lang="en-US" dirty="0"/>
+            </a:br>
+            <a:r>
+              <a:rPr lang="en-US" dirty="0" err="1" smtClean="0"/>
+              <a:t>newMap.set</a:t>
+            </a:r>
+            <a:r>
+              <a:rPr lang="en-US" dirty="0"/>
+              <a:t>('id', 2345796);</a:t>
+            </a:r>
+            <a:br>
+              <a:rPr lang="en-US" dirty="0"/>
+            </a:br>
+            <a:r>
+              <a:rPr lang="en-US" dirty="0" err="1" smtClean="0"/>
+              <a:t>newMap.set</a:t>
+            </a:r>
+            <a:r>
+              <a:rPr lang="en-US" dirty="0"/>
+              <a:t>('interest', ['</a:t>
+            </a:r>
+            <a:r>
+              <a:rPr lang="en-US" dirty="0" err="1"/>
+              <a:t>js</a:t>
+            </a:r>
+            <a:r>
+              <a:rPr lang="en-US" dirty="0"/>
+              <a:t>', 'ruby', 'python</a:t>
+            </a:r>
+            <a:r>
+              <a:rPr lang="en-US" dirty="0" smtClean="0"/>
+              <a:t>']);</a:t>
+            </a:r>
+          </a:p>
+          <a:p>
+            <a:pPr marL="114300" indent="0">
+              <a:buNone/>
+            </a:pPr>
+            <a:r>
+              <a:rPr lang="en-US" dirty="0" err="1">
+                <a:solidFill>
+                  <a:srgbClr val="FFC000"/>
+                </a:solidFill>
+              </a:rPr>
+              <a:t>n</a:t>
+            </a:r>
+            <a:r>
+              <a:rPr lang="en-US" dirty="0" err="1" smtClean="0">
+                <a:solidFill>
+                  <a:srgbClr val="FFC000"/>
+                </a:solidFill>
+              </a:rPr>
+              <a:t>ewMap.get</a:t>
+            </a:r>
+            <a:r>
+              <a:rPr lang="en-US" dirty="0">
+                <a:solidFill>
+                  <a:srgbClr val="FFC000"/>
+                </a:solidFill>
+              </a:rPr>
+              <a:t>('name'); </a:t>
+            </a:r>
+            <a:r>
+              <a:rPr lang="en-US" dirty="0">
+                <a:solidFill>
+                  <a:srgbClr val="FFFF00"/>
+                </a:solidFill>
+              </a:rPr>
+              <a:t>// John</a:t>
+            </a:r>
+            <a:r>
+              <a:rPr lang="en-US" dirty="0">
+                <a:solidFill>
+                  <a:srgbClr val="FFC000"/>
+                </a:solidFill>
+              </a:rPr>
+              <a:t/>
+            </a:r>
+            <a:br>
+              <a:rPr lang="en-US" dirty="0">
+                <a:solidFill>
+                  <a:srgbClr val="FFC000"/>
+                </a:solidFill>
+              </a:rPr>
+            </a:br>
+            <a:r>
+              <a:rPr lang="en-US" dirty="0" err="1" smtClean="0">
+                <a:solidFill>
+                  <a:srgbClr val="FFC000"/>
+                </a:solidFill>
+              </a:rPr>
+              <a:t>newMap.get</a:t>
+            </a:r>
+            <a:r>
+              <a:rPr lang="en-US" dirty="0">
+                <a:solidFill>
+                  <a:srgbClr val="FFC000"/>
+                </a:solidFill>
+              </a:rPr>
+              <a:t>('id'); </a:t>
+            </a:r>
+            <a:r>
+              <a:rPr lang="en-US" dirty="0">
+                <a:solidFill>
+                  <a:srgbClr val="FFFF00"/>
+                </a:solidFill>
+              </a:rPr>
+              <a:t>// 2345796</a:t>
+            </a:r>
+            <a:r>
+              <a:rPr lang="en-US" dirty="0">
+                <a:solidFill>
+                  <a:srgbClr val="FFC000"/>
+                </a:solidFill>
+              </a:rPr>
+              <a:t/>
+            </a:r>
+            <a:br>
+              <a:rPr lang="en-US" dirty="0">
+                <a:solidFill>
+                  <a:srgbClr val="FFC000"/>
+                </a:solidFill>
+              </a:rPr>
+            </a:br>
+            <a:r>
+              <a:rPr lang="en-US" dirty="0" err="1" smtClean="0">
+                <a:solidFill>
+                  <a:srgbClr val="FFC000"/>
+                </a:solidFill>
+              </a:rPr>
+              <a:t>newMap.get</a:t>
+            </a:r>
+            <a:r>
+              <a:rPr lang="en-US" dirty="0">
+                <a:solidFill>
+                  <a:srgbClr val="FFC000"/>
+                </a:solidFill>
+              </a:rPr>
+              <a:t>('interest'); </a:t>
+            </a:r>
+            <a:r>
+              <a:rPr lang="en-US" dirty="0">
+                <a:solidFill>
+                  <a:srgbClr val="FFFF00"/>
+                </a:solidFill>
+              </a:rPr>
+              <a:t>// ['</a:t>
+            </a:r>
+            <a:r>
+              <a:rPr lang="en-US" dirty="0" err="1">
+                <a:solidFill>
+                  <a:srgbClr val="FFFF00"/>
+                </a:solidFill>
+              </a:rPr>
+              <a:t>js</a:t>
+            </a:r>
+            <a:r>
+              <a:rPr lang="en-US" dirty="0">
+                <a:solidFill>
+                  <a:srgbClr val="FFFF00"/>
+                </a:solidFill>
+              </a:rPr>
+              <a:t>', 'ruby', 'python']</a:t>
+            </a:r>
+          </a:p>
+        </p:txBody>
+      </p:sp>
+    </p:spTree>
+    <p:extLst>
+      <p:ext uri="{BB962C8B-B14F-4D97-AF65-F5344CB8AC3E}">
+        <p14:creationId xmlns:p14="http://schemas.microsoft.com/office/powerpoint/2010/main" val="1298627705"/>
+      </p:ext>
+    </p:extLst>
+  </p:cSld>
+  <p:clrMapOvr>
+    <a:masterClrMapping/>
+  </p:clrMapOvr>
+</p:sld>
+</file>
+
+<file path=ppt/slides/slide32.xml><?xml version="1.0" encoding="utf-8"?>
+<p:sld xmlns:a="http://schemas.openxmlformats.org/drawingml/2006/main" xmlns:r="http://schemas.openxmlformats.org/officeDocument/2006/relationships" xmlns:p="http://schemas.openxmlformats.org/presentationml/2006/main">
+  <p:cSld>
+    <p:spTree>
+      <p:nvGrpSpPr>
+        <p:cNvPr id="1" name=""/>
+        <p:cNvGrpSpPr/>
+        <p:nvPr/>
+      </p:nvGrpSpPr>
+      <p:grpSpPr>
+        <a:xfrm>
+          <a:off x="0" y="0"/>
+          <a:ext cx="0" cy="0"/>
+          <a:chOff x="0" y="0"/>
+          <a:chExt cx="0" cy="0"/>
+        </a:xfrm>
+      </p:grpSpPr>
+      <p:sp>
+        <p:nvSpPr>
+          <p:cNvPr id="2" name="Title 1"/>
+          <p:cNvSpPr>
+            <a:spLocks noGrp="1"/>
+          </p:cNvSpPr>
+          <p:nvPr>
+            <p:ph type="title"/>
+          </p:nvPr>
+        </p:nvSpPr>
+        <p:spPr/>
+        <p:txBody>
+          <a:bodyPr/>
+          <a:lstStyle/>
+          <a:p>
+            <a:r>
+              <a:rPr lang="en-US" dirty="0" smtClean="0"/>
+              <a:t>Set</a:t>
+            </a:r>
+            <a:endParaRPr lang="en-US" dirty="0"/>
+          </a:p>
+        </p:txBody>
+      </p:sp>
+      <p:sp>
+        <p:nvSpPr>
+          <p:cNvPr id="3" name="Text Placeholder 2"/>
+          <p:cNvSpPr>
+            <a:spLocks noGrp="1"/>
+          </p:cNvSpPr>
+          <p:nvPr>
+            <p:ph type="body" idx="1"/>
+          </p:nvPr>
+        </p:nvSpPr>
+        <p:spPr/>
+        <p:txBody>
+          <a:bodyPr/>
+          <a:lstStyle/>
+          <a:p>
+            <a:pPr marL="114300" indent="0">
+              <a:buNone/>
+            </a:pPr>
+            <a:r>
+              <a:rPr lang="en-US" dirty="0" err="1"/>
+              <a:t>var</a:t>
+            </a:r>
+            <a:r>
+              <a:rPr lang="en-US" dirty="0"/>
+              <a:t> map = new Map();</a:t>
+            </a:r>
+            <a:br>
+              <a:rPr lang="en-US" dirty="0"/>
+            </a:br>
+            <a:r>
+              <a:rPr lang="en-US" dirty="0" err="1"/>
+              <a:t>map.set</a:t>
+            </a:r>
+            <a:r>
+              <a:rPr lang="en-US" dirty="0"/>
+              <a:t>('name', 'John');</a:t>
+            </a:r>
+            <a:br>
+              <a:rPr lang="en-US" dirty="0"/>
+            </a:br>
+            <a:r>
+              <a:rPr lang="en-US" dirty="0" err="1"/>
+              <a:t>map.set</a:t>
+            </a:r>
+            <a:r>
+              <a:rPr lang="en-US" dirty="0"/>
+              <a:t>('name', 'Andy');</a:t>
+            </a:r>
+            <a:br>
+              <a:rPr lang="en-US" dirty="0"/>
+            </a:br>
+            <a:r>
+              <a:rPr lang="en-US" dirty="0" err="1"/>
+              <a:t>map.set</a:t>
+            </a:r>
+            <a:r>
+              <a:rPr lang="en-US" dirty="0"/>
+              <a:t>(1, 'number one');</a:t>
+            </a:r>
+            <a:br>
+              <a:rPr lang="en-US" dirty="0"/>
+            </a:br>
+            <a:r>
+              <a:rPr lang="en-US" dirty="0" err="1"/>
+              <a:t>map.set</a:t>
+            </a:r>
+            <a:r>
+              <a:rPr lang="en-US" dirty="0"/>
+              <a:t>(</a:t>
+            </a:r>
+            <a:r>
+              <a:rPr lang="en-US" dirty="0" err="1"/>
+              <a:t>NaN</a:t>
+            </a:r>
+            <a:r>
+              <a:rPr lang="en-US" dirty="0"/>
+              <a:t>, 'No value</a:t>
+            </a:r>
+            <a:r>
+              <a:rPr lang="en-US" dirty="0" smtClean="0"/>
+              <a:t>');</a:t>
+            </a:r>
+          </a:p>
+          <a:p>
+            <a:pPr marL="114300" indent="0">
+              <a:buNone/>
+            </a:pPr>
+            <a:r>
+              <a:rPr lang="en-US" dirty="0" err="1" smtClean="0">
+                <a:solidFill>
+                  <a:srgbClr val="FFC000"/>
+                </a:solidFill>
+              </a:rPr>
+              <a:t>map.get</a:t>
+            </a:r>
+            <a:r>
+              <a:rPr lang="en-US" dirty="0">
+                <a:solidFill>
+                  <a:srgbClr val="FFC000"/>
+                </a:solidFill>
+              </a:rPr>
+              <a:t>('name');</a:t>
+            </a:r>
+            <a:r>
+              <a:rPr lang="en-US" dirty="0"/>
+              <a:t> </a:t>
+            </a:r>
+            <a:r>
+              <a:rPr lang="en-US" dirty="0">
+                <a:solidFill>
+                  <a:srgbClr val="FFFF00"/>
+                </a:solidFill>
+              </a:rPr>
+              <a:t>// Andy</a:t>
+            </a:r>
+            <a:r>
+              <a:rPr lang="en-US" dirty="0" smtClean="0">
+                <a:solidFill>
+                  <a:srgbClr val="FFFF00"/>
+                </a:solidFill>
+              </a:rPr>
+              <a:t>. </a:t>
+            </a:r>
+            <a:r>
+              <a:rPr lang="en-US" sz="1800" dirty="0">
+                <a:solidFill>
+                  <a:srgbClr val="FF0000"/>
+                </a:solidFill>
+              </a:rPr>
+              <a:t>Note John is replaced by Andy.</a:t>
+            </a:r>
+            <a:r>
+              <a:rPr lang="en-US" dirty="0"/>
+              <a:t/>
+            </a:r>
+            <a:br>
+              <a:rPr lang="en-US" dirty="0"/>
+            </a:br>
+            <a:r>
+              <a:rPr lang="en-US" dirty="0" err="1">
+                <a:solidFill>
+                  <a:srgbClr val="FFC000"/>
+                </a:solidFill>
+              </a:rPr>
+              <a:t>map.get</a:t>
+            </a:r>
+            <a:r>
+              <a:rPr lang="en-US" dirty="0">
+                <a:solidFill>
+                  <a:srgbClr val="FFC000"/>
+                </a:solidFill>
+              </a:rPr>
+              <a:t>(1); </a:t>
+            </a:r>
+            <a:r>
+              <a:rPr lang="en-US" dirty="0">
+                <a:solidFill>
+                  <a:srgbClr val="FFFF00"/>
+                </a:solidFill>
+              </a:rPr>
+              <a:t>// number one</a:t>
+            </a:r>
+            <a:r>
+              <a:rPr lang="en-US" dirty="0">
+                <a:solidFill>
+                  <a:srgbClr val="FFC000"/>
+                </a:solidFill>
+              </a:rPr>
+              <a:t/>
+            </a:r>
+            <a:br>
+              <a:rPr lang="en-US" dirty="0">
+                <a:solidFill>
+                  <a:srgbClr val="FFC000"/>
+                </a:solidFill>
+              </a:rPr>
+            </a:br>
+            <a:r>
+              <a:rPr lang="en-US" dirty="0" err="1">
+                <a:solidFill>
+                  <a:srgbClr val="FFC000"/>
+                </a:solidFill>
+              </a:rPr>
+              <a:t>map.get</a:t>
+            </a:r>
+            <a:r>
+              <a:rPr lang="en-US" dirty="0">
+                <a:solidFill>
+                  <a:srgbClr val="FFC000"/>
+                </a:solidFill>
+              </a:rPr>
+              <a:t>(</a:t>
+            </a:r>
+            <a:r>
+              <a:rPr lang="en-US" dirty="0" err="1">
+                <a:solidFill>
+                  <a:srgbClr val="FFC000"/>
+                </a:solidFill>
+              </a:rPr>
+              <a:t>NaN</a:t>
+            </a:r>
+            <a:r>
+              <a:rPr lang="en-US" dirty="0">
+                <a:solidFill>
+                  <a:srgbClr val="FFC000"/>
+                </a:solidFill>
+              </a:rPr>
+              <a:t>); </a:t>
+            </a:r>
+            <a:r>
+              <a:rPr lang="en-US" dirty="0">
+                <a:solidFill>
+                  <a:srgbClr val="FFFF00"/>
+                </a:solidFill>
+              </a:rPr>
+              <a:t>// No value</a:t>
+            </a:r>
+          </a:p>
+        </p:txBody>
+      </p:sp>
+    </p:spTree>
+    <p:extLst>
+      <p:ext uri="{BB962C8B-B14F-4D97-AF65-F5344CB8AC3E}">
+        <p14:creationId xmlns:p14="http://schemas.microsoft.com/office/powerpoint/2010/main" val="1066565359"/>
+      </p:ext>
+    </p:extLst>
+  </p:cSld>
+  <p:clrMapOvr>
+    <a:masterClrMapping/>
+  </p:clrMapOvr>
+</p:sld>
+</file>
+
+<file path=ppt/slides/slide33.xml><?xml version="1.0" encoding="utf-8"?>
+<p:sld xmlns:a="http://schemas.openxmlformats.org/drawingml/2006/main" xmlns:r="http://schemas.openxmlformats.org/officeDocument/2006/relationships" xmlns:p="http://schemas.openxmlformats.org/presentationml/2006/main">
+  <p:cSld>
+    <p:spTree>
+      <p:nvGrpSpPr>
         <p:cNvPr id="1" name="Shape 240"/>
         <p:cNvGrpSpPr/>
         <p:nvPr/>
@@ -27020,7 +27237,31 @@
                 <a:cs typeface="Helvetica Neue"/>
                 <a:sym typeface="Helvetica Neue"/>
               </a:rPr>
-              <a:t>Symbols, generators, Sets/Maps/Weak Link datasets</a:t>
+              <a:t>Symbols, generators, </a:t>
+            </a:r>
+            <a:r>
+              <a:rPr lang="en-US" sz="2400" b="0" i="0" u="none" strike="noStrike" cap="none" dirty="0" smtClean="0">
+                <a:solidFill>
+                  <a:srgbClr val="FFFFFF"/>
+                </a:solidFill>
+                <a:latin typeface="Helvetica Neue"/>
+                <a:ea typeface="Helvetica Neue"/>
+                <a:cs typeface="Helvetica Neue"/>
+                <a:sym typeface="Helvetica Neue"/>
+              </a:rPr>
+              <a:t>Weak </a:t>
+            </a:r>
+            <a:r>
+              <a:rPr lang="en-US" sz="2400" b="0" i="0" u="none" strike="noStrike" cap="none" dirty="0">
+                <a:solidFill>
+                  <a:srgbClr val="FFFFFF"/>
+                </a:solidFill>
+                <a:latin typeface="Helvetica Neue"/>
+                <a:ea typeface="Helvetica Neue"/>
+                <a:cs typeface="Helvetica Neue"/>
+                <a:sym typeface="Helvetica Neue"/>
+              </a:rPr>
+              <a:t>Link datasets</a:t>
             </a:r>
           </a:p>
           <a:p>
@@ -27138,7 +27379,7 @@
 </p:sld>
 </file>
 
-<file path=ppt/slides/slide32.xml><?xml version="1.0" encoding="utf-8"?>
+<file path=ppt/slides/slide34.xml><?xml version="1.0" encoding="utf-8"?>
 <p:sld xmlns:a="http://schemas.openxmlformats.org/drawingml/2006/main" xmlns:r="http://schemas.openxmlformats.org/officeDocument/2006/relationships" xmlns:p="http://schemas.openxmlformats.org/presentationml/2006/main">
   <p:cSld>
     <p:spTree>
@@ -27202,16 +27443,32 @@
               <a:buNone/>
             </a:pPr>
             <a:r>
-              <a:rPr lang="en-US" sz="4800" b="0" i="0" u="none" strike="noStrike" cap="none">
-                <a:solidFill>
-                  <a:srgbClr val="FFFFFF"/>
-                </a:solidFill>
-                <a:latin typeface="Helvetica Neue"/>
-                <a:ea typeface="Helvetica Neue"/>
-                <a:cs typeface="Helvetica Neue"/>
-                <a:sym typeface="Helvetica Neue"/>
-              </a:rPr>
-              <a:t>Homework regarding ES6</a:t>
+              <a:rPr lang="en-US" sz="4800" dirty="0" err="1" smtClean="0"/>
+              <a:t>Opdracht</a:t>
+            </a:r>
+            <a:r>
+              <a:rPr lang="en-US" sz="4800" b="0" i="0" u="none" strike="noStrike" cap="none" dirty="0" smtClean="0">
+                <a:solidFill>
+                  <a:srgbClr val="FFFFFF"/>
+                </a:solidFill>
+                <a:latin typeface="Helvetica Neue"/>
+                <a:ea typeface="Helvetica Neue"/>
+                <a:cs typeface="Helvetica Neue"/>
+                <a:sym typeface="Helvetica Neue"/>
+              </a:rPr>
+              <a:t> </a:t>
+            </a:r>
+            <a:r>
+              <a:rPr lang="en-US" sz="4800" b="0" i="0" u="none" strike="noStrike" cap="none" dirty="0">
+                <a:solidFill>
+                  <a:srgbClr val="FFFFFF"/>
+                </a:solidFill>
+                <a:latin typeface="Helvetica Neue"/>
+                <a:ea typeface="Helvetica Neue"/>
+                <a:cs typeface="Helvetica Neue"/>
+                <a:sym typeface="Helvetica Neue"/>
+              </a:rPr>
+              <a:t>ES6</a:t>
             </a:r>
           </a:p>
         </p:txBody>
@@ -27539,7 +27796,7 @@
 </p:sld>
 </file>
 
-<file path=ppt/slides/slide33.xml><?xml version="1.0" encoding="utf-8"?>
+<file path=ppt/slides/slide35.xml><?xml version="1.0" encoding="utf-8"?>
 <p:sld xmlns:a="http://schemas.openxmlformats.org/drawingml/2006/main" xmlns:r="http://schemas.openxmlformats.org/officeDocument/2006/relationships" xmlns:p="http://schemas.openxmlformats.org/presentationml/2006/main">
   <p:cSld>
     <p:spTree>
@@ -27598,7 +27855,7 @@
 </p:sld>
 </file>
 
-<file path=ppt/slides/slide34.xml><?xml version="1.0" encoding="utf-8"?>
+<file path=ppt/slides/slide36.xml><?xml version="1.0" encoding="utf-8"?>
 <p:sld xmlns:a="http://schemas.openxmlformats.org/drawingml/2006/main" xmlns:r="http://schemas.openxmlformats.org/officeDocument/2006/relationships" xmlns:p="http://schemas.openxmlformats.org/presentationml/2006/main">
   <p:cSld>
     <p:spTree>
@@ -27691,7 +27948,7 @@
 </p:sld>
 </file>
 
-<file path=ppt/slides/slide35.xml><?xml version="1.0" encoding="utf-8"?>
+<file path=ppt/slides/slide37.xml><?xml version="1.0" encoding="utf-8"?>
 <p:sld xmlns:a="http://schemas.openxmlformats.org/drawingml/2006/main" xmlns:r="http://schemas.openxmlformats.org/officeDocument/2006/relationships" xmlns:p="http://schemas.openxmlformats.org/presentationml/2006/main">
   <p:cSld>
     <p:spTree>
@@ -27907,7 +28164,7 @@
 </p:sld>
 </file>
 
-<file path=ppt/slides/slide36.xml><?xml version="1.0" encoding="utf-8"?>
+<file path=ppt/slides/slide38.xml><?xml version="1.0" encoding="utf-8"?>
 <p:sld xmlns:a="http://schemas.openxmlformats.org/drawingml/2006/main" xmlns:r="http://schemas.openxmlformats.org/officeDocument/2006/relationships" xmlns:p="http://schemas.openxmlformats.org/presentationml/2006/main">
   <p:cSld>
     <p:spTree>
@@ -28123,7 +28380,7 @@
 </p:sld>
 </file>
 
-<file path=ppt/slides/slide37.xml><?xml version="1.0" encoding="utf-8"?>
+<file path=ppt/slides/slide39.xml><?xml version="1.0" encoding="utf-8"?>
 <p:sld xmlns:a="http://schemas.openxmlformats.org/drawingml/2006/main" xmlns:r="http://schemas.openxmlformats.org/officeDocument/2006/relationships" xmlns:p="http://schemas.openxmlformats.org/presentationml/2006/main">
   <p:cSld>
     <p:spTree>
@@ -28382,456 +28639,6 @@
           </a:ln>
         </p:spPr>
       </p:pic>
-    </p:spTree>
-  </p:cSld>
-  <p:clrMapOvr>
-    <a:masterClrMapping/>
-  </p:clrMapOvr>
-  <p:timing>
-    <p:tnLst>
-      <p:par>
-        <p:cTn id="1" dur="indefinite" restart="never" nodeType="tmRoot"/>
-      </p:par>
-    </p:tnLst>
-  </p:timing>
-</p:sld>
-</file>
-
-<file path=ppt/slides/slide38.xml><?xml version="1.0" encoding="utf-8"?>
-<p:sld xmlns:a="http://schemas.openxmlformats.org/drawingml/2006/main" xmlns:r="http://schemas.openxmlformats.org/officeDocument/2006/relationships" xmlns:p="http://schemas.openxmlformats.org/presentationml/2006/main">
-  <p:cSld>
-    <p:spTree>
-      <p:nvGrpSpPr>
-        <p:cNvPr id="1" name="Shape 281"/>
-        <p:cNvGrpSpPr/>
-        <p:nvPr/>
-      </p:nvGrpSpPr>
-      <p:grpSpPr>
-        <a:xfrm>
-          <a:off x="0" y="0"/>
-          <a:ext cx="0" cy="0"/>
-          <a:chOff x="0" y="0"/>
-          <a:chExt cx="0" cy="0"/>
-        </a:xfrm>
-      </p:grpSpPr>
-      <p:sp>
-        <p:nvSpPr>
-          <p:cNvPr id="282" name="Shape 282"/>
-          <p:cNvSpPr txBox="1">
-            <a:spLocks noGrp="1"/>
-          </p:cNvSpPr>
-          <p:nvPr>
-            <p:ph type="title"/>
-          </p:nvPr>
-        </p:nvSpPr>
-        <p:spPr>
-          <a:xfrm>
-            <a:off x="669726" y="133945"/>
-            <a:ext cx="7804500" cy="1138500"/>
-          </a:xfrm>
-          <a:prstGeom prst="rect">
-            <a:avLst/>
-          </a:prstGeom>
-          <a:noFill/>
-          <a:ln>
-            <a:noFill/>
-          </a:ln>
-        </p:spPr>
-        <p:txBody>
-          <a:bodyPr lIns="32750" tIns="32750" rIns="32750" bIns="32750" anchor="ctr" anchorCtr="0">
-            <a:noAutofit/>
-          </a:bodyPr>
-          <a:lstStyle/>
-          <a:p>
-            <a:pPr marL="0" marR="0" lvl="0" indent="0" algn="ctr" rtl="0">
-              <a:lnSpc>
-                <a:spcPct val="100000"/>
-              </a:lnSpc>
-              <a:spcBef>
-                <a:spcPts val="0"/>
-              </a:spcBef>
-              <a:spcAft>
-                <a:spcPts val="0"/>
-              </a:spcAft>
-              <a:buClr>
-                <a:srgbClr val="FFFFFF"/>
-              </a:buClr>
-              <a:buSzPct val="25000"/>
-              <a:buFont typeface="Helvetica Neue"/>
-              <a:buNone/>
-            </a:pPr>
-            <a:r>
-              <a:rPr lang="en-US" sz="5200" b="0" i="0" u="none" strike="noStrike" cap="none">
-                <a:solidFill>
-                  <a:srgbClr val="FFFFFF"/>
-                </a:solidFill>
-                <a:latin typeface="Helvetica Neue"/>
-                <a:ea typeface="Helvetica Neue"/>
-                <a:cs typeface="Helvetica Neue"/>
-                <a:sym typeface="Helvetica Neue"/>
-              </a:rPr>
-              <a:t>Utilities</a:t>
-            </a:r>
-          </a:p>
-        </p:txBody>
-      </p:sp>
-      <p:sp>
-        <p:nvSpPr>
-          <p:cNvPr id="283" name="Shape 283"/>
-          <p:cNvSpPr txBox="1">
-            <a:spLocks noGrp="1"/>
-          </p:cNvSpPr>
-          <p:nvPr>
-            <p:ph type="body" idx="1"/>
-          </p:nvPr>
-        </p:nvSpPr>
-        <p:spPr>
-          <a:xfrm>
-            <a:off x="669726" y="1369590"/>
-            <a:ext cx="7804500" cy="3315000"/>
-          </a:xfrm>
-          <a:prstGeom prst="rect">
-            <a:avLst/>
-          </a:prstGeom>
-          <a:noFill/>
-          <a:ln>
-            <a:noFill/>
-          </a:ln>
-        </p:spPr>
-        <p:txBody>
-          <a:bodyPr lIns="32750" tIns="32750" rIns="32750" bIns="32750" anchor="ctr" anchorCtr="0">
-            <a:noAutofit/>
-          </a:bodyPr>
-          <a:lstStyle/>
-          <a:p>
-            <a:pPr marL="292100" marR="0" lvl="0" indent="-292100" algn="l" rtl="0">
-              <a:lnSpc>
-                <a:spcPct val="100000"/>
-              </a:lnSpc>
-              <a:spcBef>
-                <a:spcPts val="0"/>
-              </a:spcBef>
-              <a:spcAft>
-                <a:spcPts val="0"/>
-              </a:spcAft>
-              <a:buClr>
-                <a:srgbClr val="FFFFFF"/>
-              </a:buClr>
-              <a:buSzPct val="75000"/>
-              <a:buFont typeface="Helvetica Neue"/>
-              <a:buChar char="•"/>
-            </a:pPr>
-            <a:r>
-              <a:rPr lang="en-US" sz="2400" b="0" i="0" u="none" strike="noStrike" cap="none">
-                <a:solidFill>
-                  <a:srgbClr val="FFFFFF"/>
-                </a:solidFill>
-                <a:latin typeface="Helvetica Neue"/>
-                <a:ea typeface="Helvetica Neue"/>
-                <a:cs typeface="Helvetica Neue"/>
-                <a:sym typeface="Helvetica Neue"/>
-              </a:rPr>
-              <a:t>Node comes with the following:</a:t>
-            </a:r>
-          </a:p>
-          <a:p>
-            <a:pPr marL="571500" marR="0" lvl="1" indent="-279400" algn="l" rtl="0">
-              <a:lnSpc>
-                <a:spcPct val="100000"/>
-              </a:lnSpc>
-              <a:spcBef>
-                <a:spcPts val="2700"/>
-              </a:spcBef>
-              <a:spcAft>
-                <a:spcPts val="0"/>
-              </a:spcAft>
-              <a:buClr>
-                <a:srgbClr val="FFFFFF"/>
-              </a:buClr>
-              <a:buSzPct val="75000"/>
-              <a:buFont typeface="Helvetica Neue"/>
-              <a:buChar char="•"/>
-            </a:pPr>
-            <a:r>
-              <a:rPr lang="en-US" sz="2400" b="0" i="0" u="none" strike="noStrike" cap="none">
-                <a:solidFill>
-                  <a:srgbClr val="FFFFFF"/>
-                </a:solidFill>
-                <a:latin typeface="Helvetica Neue"/>
-                <a:ea typeface="Helvetica Neue"/>
-                <a:cs typeface="Helvetica Neue"/>
-                <a:sym typeface="Helvetica Neue"/>
-              </a:rPr>
-              <a:t>I/O, Sockets(http/dns/udp/etc), crypto functions, data streams</a:t>
-            </a:r>
-          </a:p>
-          <a:p>
-            <a:pPr marL="292100" marR="0" lvl="0" indent="-292100" algn="l" rtl="0">
-              <a:lnSpc>
-                <a:spcPct val="100000"/>
-              </a:lnSpc>
-              <a:spcBef>
-                <a:spcPts val="2700"/>
-              </a:spcBef>
-              <a:spcAft>
-                <a:spcPts val="0"/>
-              </a:spcAft>
-              <a:buClr>
-                <a:srgbClr val="FFFFFF"/>
-              </a:buClr>
-              <a:buSzPct val="75000"/>
-              <a:buFont typeface="Helvetica Neue"/>
-              <a:buChar char="•"/>
-            </a:pPr>
-            <a:r>
-              <a:rPr lang="en-US" sz="2400" b="0" i="0" u="none" strike="noStrike" cap="none">
-                <a:solidFill>
-                  <a:srgbClr val="FFFFFF"/>
-                </a:solidFill>
-                <a:latin typeface="Helvetica Neue"/>
-                <a:ea typeface="Helvetica Neue"/>
-                <a:cs typeface="Helvetica Neue"/>
-                <a:sym typeface="Helvetica Neue"/>
-              </a:rPr>
-              <a:t>Runs on Linux, Mac, Windows</a:t>
-            </a:r>
-          </a:p>
-        </p:txBody>
-      </p:sp>
-    </p:spTree>
-  </p:cSld>
-  <p:clrMapOvr>
-    <a:masterClrMapping/>
-  </p:clrMapOvr>
-  <p:timing>
-    <p:tnLst>
-      <p:par>
-        <p:cTn id="1" dur="indefinite" restart="never" nodeType="tmRoot"/>
-      </p:par>
-    </p:tnLst>
-  </p:timing>
-</p:sld>
-</file>
-
-<file path=ppt/slides/slide39.xml><?xml version="1.0" encoding="utf-8"?>
-<p:sld xmlns:a="http://schemas.openxmlformats.org/drawingml/2006/main" xmlns:r="http://schemas.openxmlformats.org/officeDocument/2006/relationships" xmlns:p="http://schemas.openxmlformats.org/presentationml/2006/main">
-  <p:cSld>
-    <p:spTree>
-      <p:nvGrpSpPr>
-        <p:cNvPr id="1" name="Shape 287"/>
-        <p:cNvGrpSpPr/>
-        <p:nvPr/>
-      </p:nvGrpSpPr>
-      <p:grpSpPr>
-        <a:xfrm>
-          <a:off x="0" y="0"/>
-          <a:ext cx="0" cy="0"/>
-          <a:chOff x="0" y="0"/>
-          <a:chExt cx="0" cy="0"/>
-        </a:xfrm>
-      </p:grpSpPr>
-      <p:sp>
-        <p:nvSpPr>
-          <p:cNvPr id="288" name="Shape 288"/>
-          <p:cNvSpPr txBox="1">
-            <a:spLocks noGrp="1"/>
-          </p:cNvSpPr>
-          <p:nvPr>
-            <p:ph type="title"/>
-          </p:nvPr>
-        </p:nvSpPr>
-        <p:spPr>
-          <a:xfrm>
-            <a:off x="669726" y="133945"/>
-            <a:ext cx="7804500" cy="1138500"/>
-          </a:xfrm>
-          <a:prstGeom prst="rect">
-            <a:avLst/>
-          </a:prstGeom>
-          <a:noFill/>
-          <a:ln>
-            <a:noFill/>
-          </a:ln>
-        </p:spPr>
-        <p:txBody>
-          <a:bodyPr lIns="32750" tIns="32750" rIns="32750" bIns="32750" anchor="ctr" anchorCtr="0">
-            <a:noAutofit/>
-          </a:bodyPr>
-          <a:lstStyle/>
-          <a:p>
-            <a:pPr marL="0" marR="0" lvl="0" indent="0" algn="ctr" rtl="0">
-              <a:lnSpc>
-                <a:spcPct val="100000"/>
-              </a:lnSpc>
-              <a:spcBef>
-                <a:spcPts val="0"/>
-              </a:spcBef>
-              <a:spcAft>
-                <a:spcPts val="0"/>
-              </a:spcAft>
-              <a:buClr>
-                <a:srgbClr val="FFFFFF"/>
-              </a:buClr>
-              <a:buSzPct val="25000"/>
-              <a:buFont typeface="Helvetica Neue"/>
-              <a:buNone/>
-            </a:pPr>
-            <a:r>
-              <a:rPr lang="en-US" sz="5200" b="0" i="0" u="none" strike="noStrike" cap="none">
-                <a:solidFill>
-                  <a:srgbClr val="FFFFFF"/>
-                </a:solidFill>
-                <a:latin typeface="Helvetica Neue"/>
-                <a:ea typeface="Helvetica Neue"/>
-                <a:cs typeface="Helvetica Neue"/>
-                <a:sym typeface="Helvetica Neue"/>
-              </a:rPr>
-              <a:t>Homework</a:t>
-            </a:r>
-          </a:p>
-        </p:txBody>
-      </p:sp>
-      <p:sp>
-        <p:nvSpPr>
-          <p:cNvPr id="289" name="Shape 289"/>
-          <p:cNvSpPr txBox="1">
-            <a:spLocks noGrp="1"/>
-          </p:cNvSpPr>
-          <p:nvPr>
-            <p:ph type="body" idx="1"/>
-          </p:nvPr>
-        </p:nvSpPr>
-        <p:spPr>
-          <a:xfrm>
-            <a:off x="669726" y="1369590"/>
-            <a:ext cx="7804500" cy="3315000"/>
-          </a:xfrm>
-          <a:prstGeom prst="rect">
-            <a:avLst/>
-          </a:prstGeom>
-          <a:noFill/>
-          <a:ln>
-            <a:noFill/>
-          </a:ln>
-        </p:spPr>
-        <p:txBody>
-          <a:bodyPr lIns="32750" tIns="32750" rIns="32750" bIns="32750" anchor="ctr" anchorCtr="0">
-            <a:noAutofit/>
-          </a:bodyPr>
-          <a:lstStyle/>
-          <a:p>
-            <a:pPr marL="292100" marR="0" lvl="0" indent="-292100" algn="l" rtl="0">
-              <a:lnSpc>
-                <a:spcPct val="100000"/>
-              </a:lnSpc>
-              <a:spcBef>
-                <a:spcPts val="0"/>
-              </a:spcBef>
-              <a:spcAft>
-                <a:spcPts val="0"/>
-              </a:spcAft>
-              <a:buClr>
-                <a:srgbClr val="FFFFFF"/>
-              </a:buClr>
-              <a:buSzPct val="75000"/>
-              <a:buFont typeface="Helvetica Neue"/>
-              <a:buChar char="•"/>
-            </a:pPr>
-            <a:r>
-              <a:rPr lang="en-US" sz="2400" b="0" i="0" u="none" strike="noStrike" cap="none">
-                <a:solidFill>
-                  <a:srgbClr val="FFFFFF"/>
-                </a:solidFill>
-                <a:latin typeface="Helvetica Neue"/>
-                <a:ea typeface="Helvetica Neue"/>
-                <a:cs typeface="Helvetica Neue"/>
-                <a:sym typeface="Helvetica Neue"/>
-              </a:rPr>
-              <a:t>Open </a:t>
-            </a:r>
-            <a:r>
-              <a:rPr lang="en-US" sz="2400" b="0" i="0" u="none" strike="noStrike" cap="none" smtClean="0">
-                <a:solidFill>
-                  <a:srgbClr val="FFFFFF"/>
-                </a:solidFill>
-                <a:latin typeface="Helvetica Neue"/>
-                <a:ea typeface="Helvetica Neue"/>
-                <a:cs typeface="Helvetica Neue"/>
-                <a:sym typeface="Helvetica Neue"/>
-              </a:rPr>
-              <a:t>./</a:t>
-            </a:r>
-            <a:r>
-              <a:rPr lang="en-US" smtClean="0"/>
-              <a:t>ECMAScript 6</a:t>
-            </a:r>
-            <a:r>
-              <a:rPr lang="en-US" sz="2400" b="0" i="0" u="none" strike="noStrike" cap="none" smtClean="0">
-                <a:solidFill>
-                  <a:srgbClr val="FFFFFF"/>
-                </a:solidFill>
-                <a:latin typeface="Helvetica Neue"/>
-                <a:ea typeface="Helvetica Neue"/>
-                <a:cs typeface="Helvetica Neue"/>
-                <a:sym typeface="Helvetica Neue"/>
-              </a:rPr>
-              <a:t>/</a:t>
-            </a:r>
-            <a:r>
-              <a:rPr lang="en-US" dirty="0" err="1" smtClean="0"/>
-              <a:t>Readme</a:t>
-            </a:r>
-            <a:r>
-              <a:rPr lang="en-US" sz="2400" b="0" i="0" u="none" strike="noStrike" cap="none" dirty="0" err="1" smtClean="0">
-                <a:solidFill>
-                  <a:srgbClr val="FFFFFF"/>
-                </a:solidFill>
-                <a:latin typeface="Helvetica Neue"/>
-                <a:ea typeface="Helvetica Neue"/>
-                <a:cs typeface="Helvetica Neue"/>
-                <a:sym typeface="Helvetica Neue"/>
-              </a:rPr>
-              <a:t>.</a:t>
-            </a:r>
-            <a:r>
-              <a:rPr lang="en-US" dirty="0" err="1" smtClean="0"/>
-              <a:t>md</a:t>
-            </a:r>
-            <a:endParaRPr lang="en-US" dirty="0"/>
-          </a:p>
-          <a:p>
-            <a:pPr marL="571500" marR="0" lvl="1" indent="-279400" algn="l" rtl="0">
-              <a:lnSpc>
-                <a:spcPct val="100000"/>
-              </a:lnSpc>
-              <a:spcBef>
-                <a:spcPts val="2700"/>
-              </a:spcBef>
-              <a:spcAft>
-                <a:spcPts val="0"/>
-              </a:spcAft>
-              <a:buClr>
-                <a:srgbClr val="FFFFFF"/>
-              </a:buClr>
-              <a:buSzPct val="75000"/>
-              <a:buFont typeface="Helvetica Neue"/>
-              <a:buChar char="•"/>
-            </a:pPr>
-            <a:r>
-              <a:rPr lang="en-US" sz="2400" b="0" i="0" u="none" strike="noStrike" cap="none" dirty="0">
-                <a:solidFill>
-                  <a:srgbClr val="FFFFFF"/>
-                </a:solidFill>
-                <a:latin typeface="Helvetica Neue"/>
-                <a:ea typeface="Helvetica Neue"/>
-                <a:cs typeface="Helvetica Neue"/>
-                <a:sym typeface="Helvetica Neue"/>
-              </a:rPr>
-              <a:t>Implement a directory walker</a:t>
-            </a:r>
-          </a:p>
-        </p:txBody>
-      </p:sp>
     </p:spTree>
   </p:cSld>
   <p:clrMapOvr>
@@ -29099,6 +28906,540 @@
   <p:cSld>
     <p:spTree>
       <p:nvGrpSpPr>
+        <p:cNvPr id="1" name="Shape 281"/>
+        <p:cNvGrpSpPr/>
+        <p:nvPr/>
+      </p:nvGrpSpPr>
+      <p:grpSpPr>
+        <a:xfrm>
+          <a:off x="0" y="0"/>
+          <a:ext cx="0" cy="0"/>
+          <a:chOff x="0" y="0"/>
+          <a:chExt cx="0" cy="0"/>
+        </a:xfrm>
+      </p:grpSpPr>
+      <p:sp>
+        <p:nvSpPr>
+          <p:cNvPr id="282" name="Shape 282"/>
+          <p:cNvSpPr txBox="1">
+            <a:spLocks noGrp="1"/>
+          </p:cNvSpPr>
+          <p:nvPr>
+            <p:ph type="title"/>
+          </p:nvPr>
+        </p:nvSpPr>
+        <p:spPr>
+          <a:xfrm>
+            <a:off x="669726" y="133945"/>
+            <a:ext cx="7804500" cy="1138500"/>
+          </a:xfrm>
+          <a:prstGeom prst="rect">
+            <a:avLst/>
+          </a:prstGeom>
+          <a:noFill/>
+          <a:ln>
+            <a:noFill/>
+          </a:ln>
+        </p:spPr>
+        <p:txBody>
+          <a:bodyPr lIns="32750" tIns="32750" rIns="32750" bIns="32750" anchor="ctr" anchorCtr="0">
+            <a:noAutofit/>
+          </a:bodyPr>
+          <a:lstStyle/>
+          <a:p>
+            <a:pPr marL="0" marR="0" lvl="0" indent="0" algn="ctr" rtl="0">
+              <a:lnSpc>
+                <a:spcPct val="100000"/>
+              </a:lnSpc>
+              <a:spcBef>
+                <a:spcPts val="0"/>
+              </a:spcBef>
+              <a:spcAft>
+                <a:spcPts val="0"/>
+              </a:spcAft>
+              <a:buClr>
+                <a:srgbClr val="FFFFFF"/>
+              </a:buClr>
+              <a:buSzPct val="25000"/>
+              <a:buFont typeface="Helvetica Neue"/>
+              <a:buNone/>
+            </a:pPr>
+            <a:r>
+              <a:rPr lang="en-US" sz="5200" b="0" i="0" u="none" strike="noStrike" cap="none">
+                <a:solidFill>
+                  <a:srgbClr val="FFFFFF"/>
+                </a:solidFill>
+                <a:latin typeface="Helvetica Neue"/>
+                <a:ea typeface="Helvetica Neue"/>
+                <a:cs typeface="Helvetica Neue"/>
+                <a:sym typeface="Helvetica Neue"/>
+              </a:rPr>
+              <a:t>Utilities</a:t>
+            </a:r>
+          </a:p>
+        </p:txBody>
+      </p:sp>
+      <p:sp>
+        <p:nvSpPr>
+          <p:cNvPr id="283" name="Shape 283"/>
+          <p:cNvSpPr txBox="1">
+            <a:spLocks noGrp="1"/>
+          </p:cNvSpPr>
+          <p:nvPr>
+            <p:ph type="body" idx="1"/>
+          </p:nvPr>
+        </p:nvSpPr>
+        <p:spPr>
+          <a:xfrm>
+            <a:off x="669726" y="1369590"/>
+            <a:ext cx="7804500" cy="3315000"/>
+          </a:xfrm>
+          <a:prstGeom prst="rect">
+            <a:avLst/>
+          </a:prstGeom>
+          <a:noFill/>
+          <a:ln>
+            <a:noFill/>
+          </a:ln>
+        </p:spPr>
+        <p:txBody>
+          <a:bodyPr lIns="32750" tIns="32750" rIns="32750" bIns="32750" anchor="ctr" anchorCtr="0">
+            <a:noAutofit/>
+          </a:bodyPr>
+          <a:lstStyle/>
+          <a:p>
+            <a:pPr marL="292100" marR="0" lvl="0" indent="-292100" algn="l" rtl="0">
+              <a:lnSpc>
+                <a:spcPct val="100000"/>
+              </a:lnSpc>
+              <a:spcBef>
+                <a:spcPts val="0"/>
+              </a:spcBef>
+              <a:spcAft>
+                <a:spcPts val="0"/>
+              </a:spcAft>
+              <a:buClr>
+                <a:srgbClr val="FFFFFF"/>
+              </a:buClr>
+              <a:buSzPct val="75000"/>
+              <a:buFont typeface="Helvetica Neue"/>
+              <a:buChar char="•"/>
+            </a:pPr>
+            <a:r>
+              <a:rPr lang="en-US" sz="2400" b="0" i="0" u="none" strike="noStrike" cap="none">
+                <a:solidFill>
+                  <a:srgbClr val="FFFFFF"/>
+                </a:solidFill>
+                <a:latin typeface="Helvetica Neue"/>
+                <a:ea typeface="Helvetica Neue"/>
+                <a:cs typeface="Helvetica Neue"/>
+                <a:sym typeface="Helvetica Neue"/>
+              </a:rPr>
+              <a:t>Node comes with the following:</a:t>
+            </a:r>
+          </a:p>
+          <a:p>
+            <a:pPr marL="571500" marR="0" lvl="1" indent="-279400" algn="l" rtl="0">
+              <a:lnSpc>
+                <a:spcPct val="100000"/>
+              </a:lnSpc>
+              <a:spcBef>
+                <a:spcPts val="2700"/>
+              </a:spcBef>
+              <a:spcAft>
+                <a:spcPts val="0"/>
+              </a:spcAft>
+              <a:buClr>
+                <a:srgbClr val="FFFFFF"/>
+              </a:buClr>
+              <a:buSzPct val="75000"/>
+              <a:buFont typeface="Helvetica Neue"/>
+              <a:buChar char="•"/>
+            </a:pPr>
+            <a:r>
+              <a:rPr lang="en-US" sz="2400" b="0" i="0" u="none" strike="noStrike" cap="none">
+                <a:solidFill>
+                  <a:srgbClr val="FFFFFF"/>
+                </a:solidFill>
+                <a:latin typeface="Helvetica Neue"/>
+                <a:ea typeface="Helvetica Neue"/>
+                <a:cs typeface="Helvetica Neue"/>
+                <a:sym typeface="Helvetica Neue"/>
+              </a:rPr>
+              <a:t>I/O, Sockets(http/dns/udp/etc), crypto functions, data streams</a:t>
+            </a:r>
+          </a:p>
+          <a:p>
+            <a:pPr marL="292100" marR="0" lvl="0" indent="-292100" algn="l" rtl="0">
+              <a:lnSpc>
+                <a:spcPct val="100000"/>
+              </a:lnSpc>
+              <a:spcBef>
+                <a:spcPts val="2700"/>
+              </a:spcBef>
+              <a:spcAft>
+                <a:spcPts val="0"/>
+              </a:spcAft>
+              <a:buClr>
+                <a:srgbClr val="FFFFFF"/>
+              </a:buClr>
+              <a:buSzPct val="75000"/>
+              <a:buFont typeface="Helvetica Neue"/>
+              <a:buChar char="•"/>
+            </a:pPr>
+            <a:r>
+              <a:rPr lang="en-US" sz="2400" b="0" i="0" u="none" strike="noStrike" cap="none">
+                <a:solidFill>
+                  <a:srgbClr val="FFFFFF"/>
+                </a:solidFill>
+                <a:latin typeface="Helvetica Neue"/>
+                <a:ea typeface="Helvetica Neue"/>
+                <a:cs typeface="Helvetica Neue"/>
+                <a:sym typeface="Helvetica Neue"/>
+              </a:rPr>
+              <a:t>Runs on Linux, Mac, Windows</a:t>
+            </a:r>
+          </a:p>
+        </p:txBody>
+      </p:sp>
+    </p:spTree>
+  </p:cSld>
+  <p:clrMapOvr>
+    <a:masterClrMapping/>
+  </p:clrMapOvr>
+  <p:timing>
+    <p:tnLst>
+      <p:par>
+        <p:cTn id="1" dur="indefinite" restart="never" nodeType="tmRoot"/>
+      </p:par>
+    </p:tnLst>
+  </p:timing>
+</p:sld>
+</file>
+
+<file path=ppt/slides/slide41.xml><?xml version="1.0" encoding="utf-8"?>
+<p:sld xmlns:a="http://schemas.openxmlformats.org/drawingml/2006/main" xmlns:r="http://schemas.openxmlformats.org/officeDocument/2006/relationships" xmlns:p="http://schemas.openxmlformats.org/presentationml/2006/main">
+  <p:cSld>
+    <p:spTree>
+      <p:nvGrpSpPr>
+        <p:cNvPr id="1" name="Shape 287"/>
+        <p:cNvGrpSpPr/>
+        <p:nvPr/>
+      </p:nvGrpSpPr>
+      <p:grpSpPr>
+        <a:xfrm>
+          <a:off x="0" y="0"/>
+          <a:ext cx="0" cy="0"/>
+          <a:chOff x="0" y="0"/>
+          <a:chExt cx="0" cy="0"/>
+        </a:xfrm>
+      </p:grpSpPr>
+      <p:sp>
+        <p:nvSpPr>
+          <p:cNvPr id="288" name="Shape 288"/>
+          <p:cNvSpPr txBox="1">
+            <a:spLocks noGrp="1"/>
+          </p:cNvSpPr>
+          <p:nvPr>
+            <p:ph type="title"/>
+          </p:nvPr>
+        </p:nvSpPr>
+        <p:spPr>
+          <a:xfrm>
+            <a:off x="669726" y="133945"/>
+            <a:ext cx="7804500" cy="1138500"/>
+          </a:xfrm>
+          <a:prstGeom prst="rect">
+            <a:avLst/>
+          </a:prstGeom>
+          <a:noFill/>
+          <a:ln>
+            <a:noFill/>
+          </a:ln>
+        </p:spPr>
+        <p:txBody>
+          <a:bodyPr lIns="32750" tIns="32750" rIns="32750" bIns="32750" anchor="ctr" anchorCtr="0">
+            <a:noAutofit/>
+          </a:bodyPr>
+          <a:lstStyle/>
+          <a:p>
+            <a:pPr marL="0" marR="0" lvl="0" indent="0" algn="ctr" rtl="0">
+              <a:lnSpc>
+                <a:spcPct val="100000"/>
+              </a:lnSpc>
+              <a:spcBef>
+                <a:spcPts val="0"/>
+              </a:spcBef>
+              <a:spcAft>
+                <a:spcPts val="0"/>
+              </a:spcAft>
+              <a:buClr>
+                <a:srgbClr val="FFFFFF"/>
+              </a:buClr>
+              <a:buSzPct val="25000"/>
+              <a:buFont typeface="Helvetica Neue"/>
+              <a:buNone/>
+            </a:pPr>
+            <a:r>
+              <a:rPr lang="en-US" sz="5200" b="0" i="0" u="none" strike="noStrike" cap="none" dirty="0" err="1" smtClean="0">
+                <a:solidFill>
+                  <a:srgbClr val="FFFFFF"/>
+                </a:solidFill>
+                <a:latin typeface="Helvetica Neue"/>
+                <a:ea typeface="Helvetica Neue"/>
+                <a:cs typeface="Helvetica Neue"/>
+                <a:sym typeface="Helvetica Neue"/>
+              </a:rPr>
+              <a:t>Opdracht</a:t>
+            </a:r>
+            <a:r>
+              <a:rPr lang="en-US" dirty="0"/>
+              <a:t> </a:t>
+            </a:r>
+            <a:r>
+              <a:rPr lang="en-US" dirty="0" smtClean="0"/>
+              <a:t>Node</a:t>
+            </a:r>
+            <a:endParaRPr lang="en-US" sz="5200" b="0" i="0" u="none" strike="noStrike" cap="none" dirty="0">
+              <a:solidFill>
+                <a:srgbClr val="FFFFFF"/>
+              </a:solidFill>
+              <a:latin typeface="Helvetica Neue"/>
+              <a:ea typeface="Helvetica Neue"/>
+              <a:cs typeface="Helvetica Neue"/>
+              <a:sym typeface="Helvetica Neue"/>
+            </a:endParaRPr>
+          </a:p>
+        </p:txBody>
+      </p:sp>
+      <p:sp>
+        <p:nvSpPr>
+          <p:cNvPr id="289" name="Shape 289"/>
+          <p:cNvSpPr txBox="1">
+            <a:spLocks noGrp="1"/>
+          </p:cNvSpPr>
+          <p:nvPr>
+            <p:ph type="body" idx="1"/>
+          </p:nvPr>
+        </p:nvSpPr>
+        <p:spPr>
+          <a:xfrm>
+            <a:off x="669726" y="1369590"/>
+            <a:ext cx="7804500" cy="3315000"/>
+          </a:xfrm>
+          <a:prstGeom prst="rect">
+            <a:avLst/>
+          </a:prstGeom>
+          <a:noFill/>
+          <a:ln>
+            <a:noFill/>
+          </a:ln>
+        </p:spPr>
+        <p:txBody>
+          <a:bodyPr lIns="32750" tIns="32750" rIns="32750" bIns="32750" anchor="ctr" anchorCtr="0">
+            <a:noAutofit/>
+          </a:bodyPr>
+          <a:lstStyle/>
+          <a:p>
+            <a:pPr marL="0" lvl="0" indent="0" algn="ctr">
+              <a:spcBef>
+                <a:spcPts val="0"/>
+              </a:spcBef>
+              <a:buNone/>
+            </a:pPr>
+            <a:r>
+              <a:rPr lang="en-US" sz="2400" b="0" i="0" u="sng" strike="noStrike" cap="none" dirty="0" smtClean="0">
+                <a:solidFill>
+                  <a:srgbClr val="FFC000"/>
+                </a:solidFill>
+                <a:sym typeface="Helvetica Neue"/>
+              </a:rPr>
+              <a:t>Open map:</a:t>
+            </a:r>
+            <a:r>
+              <a:rPr lang="en-US" u="sng" dirty="0" smtClean="0">
+                <a:solidFill>
+                  <a:srgbClr val="FFC000"/>
+                </a:solidFill>
+              </a:rPr>
+              <a:t> </a:t>
+            </a:r>
+          </a:p>
+          <a:p>
+            <a:pPr marL="0" lvl="0" indent="0" algn="ctr">
+              <a:spcBef>
+                <a:spcPts val="0"/>
+              </a:spcBef>
+              <a:buNone/>
+            </a:pPr>
+            <a:r>
+              <a:rPr lang="en-US" dirty="0" smtClean="0"/>
+              <a:t>3 </a:t>
+            </a:r>
+            <a:r>
+              <a:rPr lang="en-US" dirty="0"/>
+              <a:t>- </a:t>
+            </a:r>
+            <a:r>
+              <a:rPr lang="en-US" dirty="0" err="1"/>
+              <a:t>Javascript</a:t>
+            </a:r>
+            <a:r>
+              <a:rPr lang="en-US" dirty="0"/>
+              <a:t> + ECMAScript </a:t>
+            </a:r>
+            <a:r>
+              <a:rPr lang="en-US" dirty="0" smtClean="0"/>
+              <a:t>6/</a:t>
+            </a:r>
+            <a:r>
+              <a:rPr lang="en-US" dirty="0" smtClean="0"/>
+              <a:t>ECMAScript </a:t>
+            </a:r>
+            <a:r>
+              <a:rPr lang="en-US" dirty="0" smtClean="0"/>
+              <a:t>6</a:t>
+            </a:r>
+            <a:r>
+              <a:rPr lang="en-US" sz="2400" b="0" i="0" u="none" strike="noStrike" cap="none" dirty="0" smtClean="0">
+                <a:solidFill>
+                  <a:srgbClr val="FFFFFF"/>
+                </a:solidFill>
+                <a:latin typeface="Helvetica Neue"/>
+                <a:ea typeface="Helvetica Neue"/>
+                <a:cs typeface="Helvetica Neue"/>
+                <a:sym typeface="Helvetica Neue"/>
+              </a:rPr>
+              <a:t>/</a:t>
+            </a:r>
+            <a:r>
+              <a:rPr lang="en-US" dirty="0" err="1" smtClean="0"/>
+              <a:t>Readme</a:t>
+            </a:r>
+            <a:r>
+              <a:rPr lang="en-US" sz="2400" b="0" i="0" u="none" strike="noStrike" cap="none" dirty="0" err="1" smtClean="0">
+                <a:solidFill>
+                  <a:srgbClr val="FFFFFF"/>
+                </a:solidFill>
+                <a:latin typeface="Helvetica Neue"/>
+                <a:ea typeface="Helvetica Neue"/>
+                <a:cs typeface="Helvetica Neue"/>
+                <a:sym typeface="Helvetica Neue"/>
+              </a:rPr>
+              <a:t>.</a:t>
+            </a:r>
+            <a:r>
+              <a:rPr lang="en-US" dirty="0" err="1" smtClean="0"/>
+              <a:t>md</a:t>
+            </a:r>
+            <a:endParaRPr lang="en-US" dirty="0"/>
+          </a:p>
+          <a:p>
+            <a:pPr marL="292100" marR="0" lvl="1" indent="0" algn="ctr" rtl="0">
+              <a:lnSpc>
+                <a:spcPct val="100000"/>
+              </a:lnSpc>
+              <a:spcBef>
+                <a:spcPts val="2700"/>
+              </a:spcBef>
+              <a:spcAft>
+                <a:spcPts val="0"/>
+              </a:spcAft>
+              <a:buClr>
+                <a:srgbClr val="FFFFFF"/>
+              </a:buClr>
+              <a:buSzPct val="75000"/>
+              <a:buNone/>
+            </a:pPr>
+            <a:r>
+              <a:rPr lang="en-US" sz="2400" b="0" i="0" u="none" strike="noStrike" cap="none" dirty="0" err="1" smtClean="0">
+                <a:solidFill>
+                  <a:srgbClr val="FFC000"/>
+                </a:solidFill>
+                <a:latin typeface="Helvetica Neue"/>
+                <a:ea typeface="Helvetica Neue"/>
+                <a:cs typeface="Helvetica Neue"/>
+                <a:sym typeface="Helvetica Neue"/>
+              </a:rPr>
+              <a:t>Opdracht</a:t>
+            </a:r>
+            <a:r>
+              <a:rPr lang="en-US" sz="2400" b="0" i="0" u="none" strike="noStrike" cap="none" dirty="0" smtClean="0">
+                <a:solidFill>
+                  <a:srgbClr val="FFC000"/>
+                </a:solidFill>
+                <a:latin typeface="Helvetica Neue"/>
+                <a:ea typeface="Helvetica Neue"/>
+                <a:cs typeface="Helvetica Neue"/>
+                <a:sym typeface="Helvetica Neue"/>
+              </a:rPr>
+              <a:t>: </a:t>
+            </a:r>
+          </a:p>
+          <a:p>
+            <a:pPr marL="292100" marR="0" lvl="1" indent="0" algn="ctr" rtl="0">
+              <a:lnSpc>
+                <a:spcPct val="100000"/>
+              </a:lnSpc>
+              <a:spcBef>
+                <a:spcPts val="2700"/>
+              </a:spcBef>
+              <a:spcAft>
+                <a:spcPts val="0"/>
+              </a:spcAft>
+              <a:buClr>
+                <a:srgbClr val="FFFFFF"/>
+              </a:buClr>
+              <a:buSzPct val="75000"/>
+              <a:buNone/>
+            </a:pPr>
+            <a:r>
+              <a:rPr lang="en-US" sz="2400" b="0" i="0" u="none" strike="noStrike" cap="none" dirty="0" smtClean="0">
+                <a:solidFill>
+                  <a:srgbClr val="FFFFFF"/>
+                </a:solidFill>
+                <a:latin typeface="Helvetica Neue"/>
+                <a:ea typeface="Helvetica Neue"/>
+                <a:cs typeface="Helvetica Neue"/>
+                <a:sym typeface="Helvetica Neue"/>
+              </a:rPr>
+              <a:t>Implement </a:t>
+            </a:r>
+            <a:r>
+              <a:rPr lang="en-US" sz="2400" b="0" i="0" u="none" strike="noStrike" cap="none" dirty="0">
+                <a:solidFill>
+                  <a:srgbClr val="FFFFFF"/>
+                </a:solidFill>
+                <a:latin typeface="Helvetica Neue"/>
+                <a:ea typeface="Helvetica Neue"/>
+                <a:cs typeface="Helvetica Neue"/>
+                <a:sym typeface="Helvetica Neue"/>
+              </a:rPr>
+              <a:t>a directory walker</a:t>
+            </a:r>
+          </a:p>
+        </p:txBody>
+      </p:sp>
+    </p:spTree>
+  </p:cSld>
+  <p:clrMapOvr>
+    <a:masterClrMapping/>
+  </p:clrMapOvr>
+  <p:timing>
+    <p:tnLst>
+      <p:par>
+        <p:cTn id="1" dur="indefinite" restart="never" nodeType="tmRoot"/>
+      </p:par>
+    </p:tnLst>
+  </p:timing>
+</p:sld>
+</file>
+
+<file path=ppt/slides/slide42.xml><?xml version="1.0" encoding="utf-8"?>
+<p:sld xmlns:a="http://schemas.openxmlformats.org/drawingml/2006/main" xmlns:r="http://schemas.openxmlformats.org/officeDocument/2006/relationships" xmlns:p="http://schemas.openxmlformats.org/presentationml/2006/main">
+  <p:cSld>
+    <p:spTree>
+      <p:nvGrpSpPr>
         <p:cNvPr id="1" name="Shape 293"/>
         <p:cNvGrpSpPr/>
         <p:nvPr/>
@@ -29187,7 +29528,7 @@
 </p:sld>
 </file>
 
-<file path=ppt/slides/slide41.xml><?xml version="1.0" encoding="utf-8"?>
+<file path=ppt/slides/slide43.xml><?xml version="1.0" encoding="utf-8"?>
 <p:sld xmlns:a="http://schemas.openxmlformats.org/drawingml/2006/main" xmlns:r="http://schemas.openxmlformats.org/officeDocument/2006/relationships" xmlns:p="http://schemas.openxmlformats.org/presentationml/2006/main">
   <p:cSld>
     <p:spTree>
@@ -29463,8 +29804,8 @@
         </p:nvSpPr>
         <p:spPr>
           <a:xfrm>
-            <a:off x="669726" y="1366242"/>
-            <a:ext cx="7804500" cy="3315000"/>
+            <a:off x="1679172" y="1366242"/>
+            <a:ext cx="6966064" cy="1559838"/>
           </a:xfrm>
           <a:prstGeom prst="rect">
             <a:avLst/>
@@ -29480,7 +29821,7 @@
           </a:bodyPr>
           <a:lstStyle/>
           <a:p>
-            <a:pPr marL="292100" marR="0" lvl="0" indent="-292100" algn="l" rtl="0">
+            <a:pPr marL="0" marR="0" lvl="0" indent="0" algn="l" rtl="0">
               <a:lnSpc>
                 <a:spcPct val="100000"/>
               </a:lnSpc>
@@ -29494,8 +29835,7 @@
                 <a:srgbClr val="FFFFFF"/>
               </a:buClr>
               <a:buSzPct val="75000"/>
-              <a:buFont typeface="Helvetica Neue"/>
-              <a:buChar char="•"/>
+              <a:buNone/>
             </a:pPr>
             <a:r>
               <a:rPr lang="en-US" sz="2400" b="0" i="0" u="none" strike="noStrike" cap="none" dirty="0">
@@ -29560,6 +29900,36 @@
           </a:p>
         </p:txBody>
       </p:sp>
+      <p:pic>
+        <p:nvPicPr>
+          <p:cNvPr id="2" name="Picture 1"/>
+          <p:cNvPicPr>
+            <a:picLocks noChangeAspect="1"/>
+          </p:cNvPicPr>
+          <p:nvPr/>
+        </p:nvPicPr>
+        <p:blipFill>
+          <a:blip r:embed="rId3">
+            <a:extLst>
+              <a:ext uri="{28A0092B-C50C-407E-A947-70E740481C1C}">
+                <a14:useLocalDpi xmlns:a14="http://schemas.microsoft.com/office/drawing/2010/main" val="0"/>
+              </a:ext>
+            </a:extLst>
+          </a:blip>
+          <a:stretch>
+            <a:fillRect/>
+          </a:stretch>
+        </p:blipFill>
+        <p:spPr>
+          <a:xfrm>
+            <a:off x="2510444" y="2637365"/>
+            <a:ext cx="3724101" cy="2086206"/>
+          </a:xfrm>
+          <a:prstGeom prst="rect">
+            <a:avLst/>
+          </a:prstGeom>
+        </p:spPr>
+      </p:pic>
     </p:spTree>
   </p:cSld>
   <p:clrMapOvr>

</xml_diff>

<commit_message>
Node js en Javascript cursus
Node js en Javascript cursus
</commit_message>
<xml_diff>
--- a/frontend-cursus/ 4 - ECMAScript 6 node-browser.pptx
+++ b/frontend-cursus/ 4 - ECMAScript 6 node-browser.pptx
@@ -5,7 +5,7 @@
     <p:sldMasterId id="2147483660" r:id="rId1"/>
   </p:sldMasterIdLst>
   <p:notesMasterIdLst>
-    <p:notesMasterId r:id="rId46"/>
+    <p:notesMasterId r:id="rId37"/>
   </p:notesMasterIdLst>
   <p:sldIdLst>
     <p:sldId id="256" r:id="rId2"/>
@@ -43,15 +43,6 @@
     <p:sldId id="299" r:id="rId34"/>
     <p:sldId id="286" r:id="rId35"/>
     <p:sldId id="287" r:id="rId36"/>
-    <p:sldId id="288" r:id="rId37"/>
-    <p:sldId id="289" r:id="rId38"/>
-    <p:sldId id="290" r:id="rId39"/>
-    <p:sldId id="291" r:id="rId40"/>
-    <p:sldId id="292" r:id="rId41"/>
-    <p:sldId id="293" r:id="rId42"/>
-    <p:sldId id="294" r:id="rId43"/>
-    <p:sldId id="295" r:id="rId44"/>
-    <p:sldId id="296" r:id="rId45"/>
   </p:sldIdLst>
   <p:sldSz cx="9144000" cy="5143500" type="screen16x9"/>
   <p:notesSz cx="6858000" cy="9144000"/>
@@ -4788,612 +4779,6 @@
 </p:notes>
 </file>
 
-<file path=ppt/notesSlides/notesSlide34.xml><?xml version="1.0" encoding="utf-8"?>
-<p:notes xmlns:a="http://schemas.openxmlformats.org/drawingml/2006/main" xmlns:r="http://schemas.openxmlformats.org/officeDocument/2006/relationships" xmlns:p="http://schemas.openxmlformats.org/presentationml/2006/main" showMasterSp="0" showMasterPhAnim="0">
-  <p:cSld>
-    <p:spTree>
-      <p:nvGrpSpPr>
-        <p:cNvPr id="1" name="Shape 249"/>
-        <p:cNvGrpSpPr/>
-        <p:nvPr/>
-      </p:nvGrpSpPr>
-      <p:grpSpPr>
-        <a:xfrm>
-          <a:off x="0" y="0"/>
-          <a:ext cx="0" cy="0"/>
-          <a:chOff x="0" y="0"/>
-          <a:chExt cx="0" cy="0"/>
-        </a:xfrm>
-      </p:grpSpPr>
-      <p:sp>
-        <p:nvSpPr>
-          <p:cNvPr id="250" name="Shape 250"/>
-          <p:cNvSpPr txBox="1">
-            <a:spLocks noGrp="1"/>
-          </p:cNvSpPr>
-          <p:nvPr>
-            <p:ph type="body" idx="1"/>
-          </p:nvPr>
-        </p:nvSpPr>
-        <p:spPr>
-          <a:xfrm>
-            <a:off x="914400" y="4343400"/>
-            <a:ext cx="5029199" cy="4114800"/>
-          </a:xfrm>
-          <a:prstGeom prst="rect">
-            <a:avLst/>
-          </a:prstGeom>
-        </p:spPr>
-        <p:txBody>
-          <a:bodyPr lIns="91425" tIns="91425" rIns="91425" bIns="91425" anchor="t" anchorCtr="0">
-            <a:noAutofit/>
-          </a:bodyPr>
-          <a:lstStyle/>
-          <a:p>
-            <a:pPr lvl="0">
-              <a:spcBef>
-                <a:spcPts val="0"/>
-              </a:spcBef>
-              <a:buNone/>
-            </a:pPr>
-            <a:endParaRPr/>
-          </a:p>
-        </p:txBody>
-      </p:sp>
-      <p:sp>
-        <p:nvSpPr>
-          <p:cNvPr id="251" name="Shape 251"/>
-          <p:cNvSpPr>
-            <a:spLocks noGrp="1" noRot="1" noChangeAspect="1"/>
-          </p:cNvSpPr>
-          <p:nvPr>
-            <p:ph type="sldImg" idx="2"/>
-          </p:nvPr>
-        </p:nvSpPr>
-        <p:spPr>
-          <a:xfrm>
-            <a:off x="380999" y="685800"/>
-            <a:ext cx="6096000" cy="3429000"/>
-          </a:xfrm>
-          <a:custGeom>
-            <a:avLst/>
-            <a:gdLst/>
-            <a:ahLst/>
-            <a:cxnLst/>
-            <a:rect l="0" t="0" r="0" b="0"/>
-            <a:pathLst>
-              <a:path w="120000" h="120000" extrusionOk="0">
-                <a:moveTo>
-                  <a:pt x="0" y="0"/>
-                </a:moveTo>
-                <a:lnTo>
-                  <a:pt x="120000" y="0"/>
-                </a:lnTo>
-                <a:lnTo>
-                  <a:pt x="120000" y="120000"/>
-                </a:lnTo>
-                <a:lnTo>
-                  <a:pt x="0" y="120000"/>
-                </a:lnTo>
-                <a:close/>
-              </a:path>
-            </a:pathLst>
-          </a:custGeom>
-        </p:spPr>
-      </p:sp>
-    </p:spTree>
-  </p:cSld>
-  <p:clrMapOvr>
-    <a:masterClrMapping/>
-  </p:clrMapOvr>
-</p:notes>
-</file>
-
-<file path=ppt/notesSlides/notesSlide35.xml><?xml version="1.0" encoding="utf-8"?>
-<p:notes xmlns:a="http://schemas.openxmlformats.org/drawingml/2006/main" xmlns:r="http://schemas.openxmlformats.org/officeDocument/2006/relationships" xmlns:p="http://schemas.openxmlformats.org/presentationml/2006/main" showMasterSp="0" showMasterPhAnim="0">
-  <p:cSld>
-    <p:spTree>
-      <p:nvGrpSpPr>
-        <p:cNvPr id="1" name="Shape 254"/>
-        <p:cNvGrpSpPr/>
-        <p:nvPr/>
-      </p:nvGrpSpPr>
-      <p:grpSpPr>
-        <a:xfrm>
-          <a:off x="0" y="0"/>
-          <a:ext cx="0" cy="0"/>
-          <a:chOff x="0" y="0"/>
-          <a:chExt cx="0" cy="0"/>
-        </a:xfrm>
-      </p:grpSpPr>
-      <p:sp>
-        <p:nvSpPr>
-          <p:cNvPr id="255" name="Shape 255"/>
-          <p:cNvSpPr txBox="1">
-            <a:spLocks noGrp="1"/>
-          </p:cNvSpPr>
-          <p:nvPr>
-            <p:ph type="body" idx="1"/>
-          </p:nvPr>
-        </p:nvSpPr>
-        <p:spPr>
-          <a:xfrm>
-            <a:off x="914400" y="4343400"/>
-            <a:ext cx="5029199" cy="4114800"/>
-          </a:xfrm>
-          <a:prstGeom prst="rect">
-            <a:avLst/>
-          </a:prstGeom>
-        </p:spPr>
-        <p:txBody>
-          <a:bodyPr lIns="91425" tIns="91425" rIns="91425" bIns="91425" anchor="t" anchorCtr="0">
-            <a:noAutofit/>
-          </a:bodyPr>
-          <a:lstStyle/>
-          <a:p>
-            <a:pPr lvl="0">
-              <a:spcBef>
-                <a:spcPts val="0"/>
-              </a:spcBef>
-              <a:buNone/>
-            </a:pPr>
-            <a:endParaRPr/>
-          </a:p>
-        </p:txBody>
-      </p:sp>
-      <p:sp>
-        <p:nvSpPr>
-          <p:cNvPr id="256" name="Shape 256"/>
-          <p:cNvSpPr>
-            <a:spLocks noGrp="1" noRot="1" noChangeAspect="1"/>
-          </p:cNvSpPr>
-          <p:nvPr>
-            <p:ph type="sldImg" idx="2"/>
-          </p:nvPr>
-        </p:nvSpPr>
-        <p:spPr>
-          <a:xfrm>
-            <a:off x="380999" y="685800"/>
-            <a:ext cx="6096000" cy="3429000"/>
-          </a:xfrm>
-          <a:custGeom>
-            <a:avLst/>
-            <a:gdLst/>
-            <a:ahLst/>
-            <a:cxnLst/>
-            <a:rect l="0" t="0" r="0" b="0"/>
-            <a:pathLst>
-              <a:path w="120000" h="120000" extrusionOk="0">
-                <a:moveTo>
-                  <a:pt x="0" y="0"/>
-                </a:moveTo>
-                <a:lnTo>
-                  <a:pt x="120000" y="0"/>
-                </a:lnTo>
-                <a:lnTo>
-                  <a:pt x="120000" y="120000"/>
-                </a:lnTo>
-                <a:lnTo>
-                  <a:pt x="0" y="120000"/>
-                </a:lnTo>
-                <a:close/>
-              </a:path>
-            </a:pathLst>
-          </a:custGeom>
-        </p:spPr>
-      </p:sp>
-    </p:spTree>
-  </p:cSld>
-  <p:clrMapOvr>
-    <a:masterClrMapping/>
-  </p:clrMapOvr>
-</p:notes>
-</file>
-
-<file path=ppt/notesSlides/notesSlide36.xml><?xml version="1.0" encoding="utf-8"?>
-<p:notes xmlns:a="http://schemas.openxmlformats.org/drawingml/2006/main" xmlns:r="http://schemas.openxmlformats.org/officeDocument/2006/relationships" xmlns:p="http://schemas.openxmlformats.org/presentationml/2006/main" showMasterSp="0" showMasterPhAnim="0">
-  <p:cSld>
-    <p:spTree>
-      <p:nvGrpSpPr>
-        <p:cNvPr id="1" name="Shape 259"/>
-        <p:cNvGrpSpPr/>
-        <p:nvPr/>
-      </p:nvGrpSpPr>
-      <p:grpSpPr>
-        <a:xfrm>
-          <a:off x="0" y="0"/>
-          <a:ext cx="0" cy="0"/>
-          <a:chOff x="0" y="0"/>
-          <a:chExt cx="0" cy="0"/>
-        </a:xfrm>
-      </p:grpSpPr>
-      <p:sp>
-        <p:nvSpPr>
-          <p:cNvPr id="260" name="Shape 260"/>
-          <p:cNvSpPr txBox="1">
-            <a:spLocks noGrp="1"/>
-          </p:cNvSpPr>
-          <p:nvPr>
-            <p:ph type="body" idx="1"/>
-          </p:nvPr>
-        </p:nvSpPr>
-        <p:spPr>
-          <a:xfrm>
-            <a:off x="914400" y="4343400"/>
-            <a:ext cx="5029199" cy="4114800"/>
-          </a:xfrm>
-          <a:prstGeom prst="rect">
-            <a:avLst/>
-          </a:prstGeom>
-        </p:spPr>
-        <p:txBody>
-          <a:bodyPr lIns="91425" tIns="91425" rIns="91425" bIns="91425" anchor="t" anchorCtr="0">
-            <a:noAutofit/>
-          </a:bodyPr>
-          <a:lstStyle/>
-          <a:p>
-            <a:pPr lvl="0">
-              <a:spcBef>
-                <a:spcPts val="0"/>
-              </a:spcBef>
-              <a:buNone/>
-            </a:pPr>
-            <a:endParaRPr/>
-          </a:p>
-        </p:txBody>
-      </p:sp>
-      <p:sp>
-        <p:nvSpPr>
-          <p:cNvPr id="261" name="Shape 261"/>
-          <p:cNvSpPr>
-            <a:spLocks noGrp="1" noRot="1" noChangeAspect="1"/>
-          </p:cNvSpPr>
-          <p:nvPr>
-            <p:ph type="sldImg" idx="2"/>
-          </p:nvPr>
-        </p:nvSpPr>
-        <p:spPr>
-          <a:xfrm>
-            <a:off x="380999" y="685800"/>
-            <a:ext cx="6096000" cy="3429000"/>
-          </a:xfrm>
-          <a:custGeom>
-            <a:avLst/>
-            <a:gdLst/>
-            <a:ahLst/>
-            <a:cxnLst/>
-            <a:rect l="0" t="0" r="0" b="0"/>
-            <a:pathLst>
-              <a:path w="120000" h="120000" extrusionOk="0">
-                <a:moveTo>
-                  <a:pt x="0" y="0"/>
-                </a:moveTo>
-                <a:lnTo>
-                  <a:pt x="120000" y="0"/>
-                </a:lnTo>
-                <a:lnTo>
-                  <a:pt x="120000" y="120000"/>
-                </a:lnTo>
-                <a:lnTo>
-                  <a:pt x="0" y="120000"/>
-                </a:lnTo>
-                <a:close/>
-              </a:path>
-            </a:pathLst>
-          </a:custGeom>
-        </p:spPr>
-      </p:sp>
-    </p:spTree>
-  </p:cSld>
-  <p:clrMapOvr>
-    <a:masterClrMapping/>
-  </p:clrMapOvr>
-</p:notes>
-</file>
-
-<file path=ppt/notesSlides/notesSlide37.xml><?xml version="1.0" encoding="utf-8"?>
-<p:notes xmlns:a="http://schemas.openxmlformats.org/drawingml/2006/main" xmlns:r="http://schemas.openxmlformats.org/officeDocument/2006/relationships" xmlns:p="http://schemas.openxmlformats.org/presentationml/2006/main" showMasterSp="0" showMasterPhAnim="0">
-  <p:cSld>
-    <p:spTree>
-      <p:nvGrpSpPr>
-        <p:cNvPr id="1" name="Shape 265"/>
-        <p:cNvGrpSpPr/>
-        <p:nvPr/>
-      </p:nvGrpSpPr>
-      <p:grpSpPr>
-        <a:xfrm>
-          <a:off x="0" y="0"/>
-          <a:ext cx="0" cy="0"/>
-          <a:chOff x="0" y="0"/>
-          <a:chExt cx="0" cy="0"/>
-        </a:xfrm>
-      </p:grpSpPr>
-      <p:sp>
-        <p:nvSpPr>
-          <p:cNvPr id="266" name="Shape 266"/>
-          <p:cNvSpPr txBox="1">
-            <a:spLocks noGrp="1"/>
-          </p:cNvSpPr>
-          <p:nvPr>
-            <p:ph type="body" idx="1"/>
-          </p:nvPr>
-        </p:nvSpPr>
-        <p:spPr>
-          <a:xfrm>
-            <a:off x="914400" y="4343400"/>
-            <a:ext cx="5029199" cy="4114800"/>
-          </a:xfrm>
-          <a:prstGeom prst="rect">
-            <a:avLst/>
-          </a:prstGeom>
-        </p:spPr>
-        <p:txBody>
-          <a:bodyPr lIns="91425" tIns="91425" rIns="91425" bIns="91425" anchor="t" anchorCtr="0">
-            <a:noAutofit/>
-          </a:bodyPr>
-          <a:lstStyle/>
-          <a:p>
-            <a:pPr lvl="0">
-              <a:spcBef>
-                <a:spcPts val="0"/>
-              </a:spcBef>
-              <a:buNone/>
-            </a:pPr>
-            <a:endParaRPr/>
-          </a:p>
-        </p:txBody>
-      </p:sp>
-      <p:sp>
-        <p:nvSpPr>
-          <p:cNvPr id="267" name="Shape 267"/>
-          <p:cNvSpPr>
-            <a:spLocks noGrp="1" noRot="1" noChangeAspect="1"/>
-          </p:cNvSpPr>
-          <p:nvPr>
-            <p:ph type="sldImg" idx="2"/>
-          </p:nvPr>
-        </p:nvSpPr>
-        <p:spPr>
-          <a:xfrm>
-            <a:off x="380999" y="685800"/>
-            <a:ext cx="6096000" cy="3429000"/>
-          </a:xfrm>
-          <a:custGeom>
-            <a:avLst/>
-            <a:gdLst/>
-            <a:ahLst/>
-            <a:cxnLst/>
-            <a:rect l="0" t="0" r="0" b="0"/>
-            <a:pathLst>
-              <a:path w="120000" h="120000" extrusionOk="0">
-                <a:moveTo>
-                  <a:pt x="0" y="0"/>
-                </a:moveTo>
-                <a:lnTo>
-                  <a:pt x="120000" y="0"/>
-                </a:lnTo>
-                <a:lnTo>
-                  <a:pt x="120000" y="120000"/>
-                </a:lnTo>
-                <a:lnTo>
-                  <a:pt x="0" y="120000"/>
-                </a:lnTo>
-                <a:close/>
-              </a:path>
-            </a:pathLst>
-          </a:custGeom>
-        </p:spPr>
-      </p:sp>
-    </p:spTree>
-  </p:cSld>
-  <p:clrMapOvr>
-    <a:masterClrMapping/>
-  </p:clrMapOvr>
-</p:notes>
-</file>
-
-<file path=ppt/notesSlides/notesSlide38.xml><?xml version="1.0" encoding="utf-8"?>
-<p:notes xmlns:a="http://schemas.openxmlformats.org/drawingml/2006/main" xmlns:r="http://schemas.openxmlformats.org/officeDocument/2006/relationships" xmlns:p="http://schemas.openxmlformats.org/presentationml/2006/main" showMasterSp="0" showMasterPhAnim="0">
-  <p:cSld>
-    <p:spTree>
-      <p:nvGrpSpPr>
-        <p:cNvPr id="1" name="Shape 271"/>
-        <p:cNvGrpSpPr/>
-        <p:nvPr/>
-      </p:nvGrpSpPr>
-      <p:grpSpPr>
-        <a:xfrm>
-          <a:off x="0" y="0"/>
-          <a:ext cx="0" cy="0"/>
-          <a:chOff x="0" y="0"/>
-          <a:chExt cx="0" cy="0"/>
-        </a:xfrm>
-      </p:grpSpPr>
-      <p:sp>
-        <p:nvSpPr>
-          <p:cNvPr id="272" name="Shape 272"/>
-          <p:cNvSpPr txBox="1">
-            <a:spLocks noGrp="1"/>
-          </p:cNvSpPr>
-          <p:nvPr>
-            <p:ph type="body" idx="1"/>
-          </p:nvPr>
-        </p:nvSpPr>
-        <p:spPr>
-          <a:xfrm>
-            <a:off x="914400" y="4343400"/>
-            <a:ext cx="5029199" cy="4114800"/>
-          </a:xfrm>
-          <a:prstGeom prst="rect">
-            <a:avLst/>
-          </a:prstGeom>
-        </p:spPr>
-        <p:txBody>
-          <a:bodyPr lIns="91425" tIns="91425" rIns="91425" bIns="91425" anchor="t" anchorCtr="0">
-            <a:noAutofit/>
-          </a:bodyPr>
-          <a:lstStyle/>
-          <a:p>
-            <a:pPr lvl="0">
-              <a:spcBef>
-                <a:spcPts val="0"/>
-              </a:spcBef>
-              <a:buNone/>
-            </a:pPr>
-            <a:endParaRPr/>
-          </a:p>
-        </p:txBody>
-      </p:sp>
-      <p:sp>
-        <p:nvSpPr>
-          <p:cNvPr id="273" name="Shape 273"/>
-          <p:cNvSpPr>
-            <a:spLocks noGrp="1" noRot="1" noChangeAspect="1"/>
-          </p:cNvSpPr>
-          <p:nvPr>
-            <p:ph type="sldImg" idx="2"/>
-          </p:nvPr>
-        </p:nvSpPr>
-        <p:spPr>
-          <a:xfrm>
-            <a:off x="380999" y="685800"/>
-            <a:ext cx="6096000" cy="3429000"/>
-          </a:xfrm>
-          <a:custGeom>
-            <a:avLst/>
-            <a:gdLst/>
-            <a:ahLst/>
-            <a:cxnLst/>
-            <a:rect l="0" t="0" r="0" b="0"/>
-            <a:pathLst>
-              <a:path w="120000" h="120000" extrusionOk="0">
-                <a:moveTo>
-                  <a:pt x="0" y="0"/>
-                </a:moveTo>
-                <a:lnTo>
-                  <a:pt x="120000" y="0"/>
-                </a:lnTo>
-                <a:lnTo>
-                  <a:pt x="120000" y="120000"/>
-                </a:lnTo>
-                <a:lnTo>
-                  <a:pt x="0" y="120000"/>
-                </a:lnTo>
-                <a:close/>
-              </a:path>
-            </a:pathLst>
-          </a:custGeom>
-        </p:spPr>
-      </p:sp>
-    </p:spTree>
-  </p:cSld>
-  <p:clrMapOvr>
-    <a:masterClrMapping/>
-  </p:clrMapOvr>
-</p:notes>
-</file>
-
-<file path=ppt/notesSlides/notesSlide39.xml><?xml version="1.0" encoding="utf-8"?>
-<p:notes xmlns:a="http://schemas.openxmlformats.org/drawingml/2006/main" xmlns:r="http://schemas.openxmlformats.org/officeDocument/2006/relationships" xmlns:p="http://schemas.openxmlformats.org/presentationml/2006/main" showMasterSp="0" showMasterPhAnim="0">
-  <p:cSld>
-    <p:spTree>
-      <p:nvGrpSpPr>
-        <p:cNvPr id="1" name="Shape 278"/>
-        <p:cNvGrpSpPr/>
-        <p:nvPr/>
-      </p:nvGrpSpPr>
-      <p:grpSpPr>
-        <a:xfrm>
-          <a:off x="0" y="0"/>
-          <a:ext cx="0" cy="0"/>
-          <a:chOff x="0" y="0"/>
-          <a:chExt cx="0" cy="0"/>
-        </a:xfrm>
-      </p:grpSpPr>
-      <p:sp>
-        <p:nvSpPr>
-          <p:cNvPr id="279" name="Shape 279"/>
-          <p:cNvSpPr txBox="1">
-            <a:spLocks noGrp="1"/>
-          </p:cNvSpPr>
-          <p:nvPr>
-            <p:ph type="body" idx="1"/>
-          </p:nvPr>
-        </p:nvSpPr>
-        <p:spPr>
-          <a:xfrm>
-            <a:off x="914400" y="4343400"/>
-            <a:ext cx="5029199" cy="4114800"/>
-          </a:xfrm>
-          <a:prstGeom prst="rect">
-            <a:avLst/>
-          </a:prstGeom>
-        </p:spPr>
-        <p:txBody>
-          <a:bodyPr lIns="91425" tIns="91425" rIns="91425" bIns="91425" anchor="t" anchorCtr="0">
-            <a:noAutofit/>
-          </a:bodyPr>
-          <a:lstStyle/>
-          <a:p>
-            <a:pPr lvl="0">
-              <a:spcBef>
-                <a:spcPts val="0"/>
-              </a:spcBef>
-              <a:buNone/>
-            </a:pPr>
-            <a:endParaRPr/>
-          </a:p>
-        </p:txBody>
-      </p:sp>
-      <p:sp>
-        <p:nvSpPr>
-          <p:cNvPr id="280" name="Shape 280"/>
-          <p:cNvSpPr>
-            <a:spLocks noGrp="1" noRot="1" noChangeAspect="1"/>
-          </p:cNvSpPr>
-          <p:nvPr>
-            <p:ph type="sldImg" idx="2"/>
-          </p:nvPr>
-        </p:nvSpPr>
-        <p:spPr>
-          <a:xfrm>
-            <a:off x="380999" y="685800"/>
-            <a:ext cx="6096000" cy="3429000"/>
-          </a:xfrm>
-          <a:custGeom>
-            <a:avLst/>
-            <a:gdLst/>
-            <a:ahLst/>
-            <a:cxnLst/>
-            <a:rect l="0" t="0" r="0" b="0"/>
-            <a:pathLst>
-              <a:path w="120000" h="120000" extrusionOk="0">
-                <a:moveTo>
-                  <a:pt x="0" y="0"/>
-                </a:moveTo>
-                <a:lnTo>
-                  <a:pt x="120000" y="0"/>
-                </a:lnTo>
-                <a:lnTo>
-                  <a:pt x="120000" y="120000"/>
-                </a:lnTo>
-                <a:lnTo>
-                  <a:pt x="0" y="120000"/>
-                </a:lnTo>
-                <a:close/>
-              </a:path>
-            </a:pathLst>
-          </a:custGeom>
-        </p:spPr>
-      </p:sp>
-    </p:spTree>
-  </p:cSld>
-  <p:clrMapOvr>
-    <a:masterClrMapping/>
-  </p:clrMapOvr>
-</p:notes>
-</file>
-
 <file path=ppt/notesSlides/notesSlide4.xml><?xml version="1.0" encoding="utf-8"?>
 <p:notes xmlns:a="http://schemas.openxmlformats.org/drawingml/2006/main" xmlns:r="http://schemas.openxmlformats.org/officeDocument/2006/relationships" xmlns:p="http://schemas.openxmlformats.org/presentationml/2006/main" showMasterSp="0" showMasterPhAnim="0">
   <p:cSld>
@@ -5452,309 +4837,6 @@
       <p:sp>
         <p:nvSpPr>
           <p:cNvPr id="75" name="Shape 75"/>
-          <p:cNvSpPr>
-            <a:spLocks noGrp="1" noRot="1" noChangeAspect="1"/>
-          </p:cNvSpPr>
-          <p:nvPr>
-            <p:ph type="sldImg" idx="2"/>
-          </p:nvPr>
-        </p:nvSpPr>
-        <p:spPr>
-          <a:xfrm>
-            <a:off x="380999" y="685800"/>
-            <a:ext cx="6096000" cy="3429000"/>
-          </a:xfrm>
-          <a:custGeom>
-            <a:avLst/>
-            <a:gdLst/>
-            <a:ahLst/>
-            <a:cxnLst/>
-            <a:rect l="0" t="0" r="0" b="0"/>
-            <a:pathLst>
-              <a:path w="120000" h="120000" extrusionOk="0">
-                <a:moveTo>
-                  <a:pt x="0" y="0"/>
-                </a:moveTo>
-                <a:lnTo>
-                  <a:pt x="120000" y="0"/>
-                </a:lnTo>
-                <a:lnTo>
-                  <a:pt x="120000" y="120000"/>
-                </a:lnTo>
-                <a:lnTo>
-                  <a:pt x="0" y="120000"/>
-                </a:lnTo>
-                <a:close/>
-              </a:path>
-            </a:pathLst>
-          </a:custGeom>
-        </p:spPr>
-      </p:sp>
-    </p:spTree>
-  </p:cSld>
-  <p:clrMapOvr>
-    <a:masterClrMapping/>
-  </p:clrMapOvr>
-</p:notes>
-</file>
-
-<file path=ppt/notesSlides/notesSlide40.xml><?xml version="1.0" encoding="utf-8"?>
-<p:notes xmlns:a="http://schemas.openxmlformats.org/drawingml/2006/main" xmlns:r="http://schemas.openxmlformats.org/officeDocument/2006/relationships" xmlns:p="http://schemas.openxmlformats.org/presentationml/2006/main" showMasterSp="0" showMasterPhAnim="0">
-  <p:cSld>
-    <p:spTree>
-      <p:nvGrpSpPr>
-        <p:cNvPr id="1" name="Shape 284"/>
-        <p:cNvGrpSpPr/>
-        <p:nvPr/>
-      </p:nvGrpSpPr>
-      <p:grpSpPr>
-        <a:xfrm>
-          <a:off x="0" y="0"/>
-          <a:ext cx="0" cy="0"/>
-          <a:chOff x="0" y="0"/>
-          <a:chExt cx="0" cy="0"/>
-        </a:xfrm>
-      </p:grpSpPr>
-      <p:sp>
-        <p:nvSpPr>
-          <p:cNvPr id="285" name="Shape 285"/>
-          <p:cNvSpPr txBox="1">
-            <a:spLocks noGrp="1"/>
-          </p:cNvSpPr>
-          <p:nvPr>
-            <p:ph type="body" idx="1"/>
-          </p:nvPr>
-        </p:nvSpPr>
-        <p:spPr>
-          <a:xfrm>
-            <a:off x="914400" y="4343400"/>
-            <a:ext cx="5029199" cy="4114800"/>
-          </a:xfrm>
-          <a:prstGeom prst="rect">
-            <a:avLst/>
-          </a:prstGeom>
-        </p:spPr>
-        <p:txBody>
-          <a:bodyPr lIns="91425" tIns="91425" rIns="91425" bIns="91425" anchor="t" anchorCtr="0">
-            <a:noAutofit/>
-          </a:bodyPr>
-          <a:lstStyle/>
-          <a:p>
-            <a:pPr lvl="0">
-              <a:spcBef>
-                <a:spcPts val="0"/>
-              </a:spcBef>
-              <a:buNone/>
-            </a:pPr>
-            <a:endParaRPr/>
-          </a:p>
-        </p:txBody>
-      </p:sp>
-      <p:sp>
-        <p:nvSpPr>
-          <p:cNvPr id="286" name="Shape 286"/>
-          <p:cNvSpPr>
-            <a:spLocks noGrp="1" noRot="1" noChangeAspect="1"/>
-          </p:cNvSpPr>
-          <p:nvPr>
-            <p:ph type="sldImg" idx="2"/>
-          </p:nvPr>
-        </p:nvSpPr>
-        <p:spPr>
-          <a:xfrm>
-            <a:off x="381000" y="685800"/>
-            <a:ext cx="6096000" cy="3429000"/>
-          </a:xfrm>
-          <a:custGeom>
-            <a:avLst/>
-            <a:gdLst/>
-            <a:ahLst/>
-            <a:cxnLst/>
-            <a:rect l="0" t="0" r="0" b="0"/>
-            <a:pathLst>
-              <a:path w="120000" h="120000" extrusionOk="0">
-                <a:moveTo>
-                  <a:pt x="0" y="0"/>
-                </a:moveTo>
-                <a:lnTo>
-                  <a:pt x="120000" y="0"/>
-                </a:lnTo>
-                <a:lnTo>
-                  <a:pt x="120000" y="120000"/>
-                </a:lnTo>
-                <a:lnTo>
-                  <a:pt x="0" y="120000"/>
-                </a:lnTo>
-                <a:close/>
-              </a:path>
-            </a:pathLst>
-          </a:custGeom>
-        </p:spPr>
-      </p:sp>
-    </p:spTree>
-  </p:cSld>
-  <p:clrMapOvr>
-    <a:masterClrMapping/>
-  </p:clrMapOvr>
-</p:notes>
-</file>
-
-<file path=ppt/notesSlides/notesSlide41.xml><?xml version="1.0" encoding="utf-8"?>
-<p:notes xmlns:a="http://schemas.openxmlformats.org/drawingml/2006/main" xmlns:r="http://schemas.openxmlformats.org/officeDocument/2006/relationships" xmlns:p="http://schemas.openxmlformats.org/presentationml/2006/main" showMasterSp="0" showMasterPhAnim="0">
-  <p:cSld>
-    <p:spTree>
-      <p:nvGrpSpPr>
-        <p:cNvPr id="1" name="Shape 290"/>
-        <p:cNvGrpSpPr/>
-        <p:nvPr/>
-      </p:nvGrpSpPr>
-      <p:grpSpPr>
-        <a:xfrm>
-          <a:off x="0" y="0"/>
-          <a:ext cx="0" cy="0"/>
-          <a:chOff x="0" y="0"/>
-          <a:chExt cx="0" cy="0"/>
-        </a:xfrm>
-      </p:grpSpPr>
-      <p:sp>
-        <p:nvSpPr>
-          <p:cNvPr id="291" name="Shape 291"/>
-          <p:cNvSpPr txBox="1">
-            <a:spLocks noGrp="1"/>
-          </p:cNvSpPr>
-          <p:nvPr>
-            <p:ph type="body" idx="1"/>
-          </p:nvPr>
-        </p:nvSpPr>
-        <p:spPr>
-          <a:xfrm>
-            <a:off x="914400" y="4343400"/>
-            <a:ext cx="5029199" cy="4114800"/>
-          </a:xfrm>
-          <a:prstGeom prst="rect">
-            <a:avLst/>
-          </a:prstGeom>
-        </p:spPr>
-        <p:txBody>
-          <a:bodyPr lIns="91425" tIns="91425" rIns="91425" bIns="91425" anchor="t" anchorCtr="0">
-            <a:noAutofit/>
-          </a:bodyPr>
-          <a:lstStyle/>
-          <a:p>
-            <a:pPr lvl="0">
-              <a:spcBef>
-                <a:spcPts val="0"/>
-              </a:spcBef>
-              <a:buNone/>
-            </a:pPr>
-            <a:endParaRPr/>
-          </a:p>
-        </p:txBody>
-      </p:sp>
-      <p:sp>
-        <p:nvSpPr>
-          <p:cNvPr id="292" name="Shape 292"/>
-          <p:cNvSpPr>
-            <a:spLocks noGrp="1" noRot="1" noChangeAspect="1"/>
-          </p:cNvSpPr>
-          <p:nvPr>
-            <p:ph type="sldImg" idx="2"/>
-          </p:nvPr>
-        </p:nvSpPr>
-        <p:spPr>
-          <a:xfrm>
-            <a:off x="380999" y="685800"/>
-            <a:ext cx="6096000" cy="3429000"/>
-          </a:xfrm>
-          <a:custGeom>
-            <a:avLst/>
-            <a:gdLst/>
-            <a:ahLst/>
-            <a:cxnLst/>
-            <a:rect l="0" t="0" r="0" b="0"/>
-            <a:pathLst>
-              <a:path w="120000" h="120000" extrusionOk="0">
-                <a:moveTo>
-                  <a:pt x="0" y="0"/>
-                </a:moveTo>
-                <a:lnTo>
-                  <a:pt x="120000" y="0"/>
-                </a:lnTo>
-                <a:lnTo>
-                  <a:pt x="120000" y="120000"/>
-                </a:lnTo>
-                <a:lnTo>
-                  <a:pt x="0" y="120000"/>
-                </a:lnTo>
-                <a:close/>
-              </a:path>
-            </a:pathLst>
-          </a:custGeom>
-        </p:spPr>
-      </p:sp>
-    </p:spTree>
-  </p:cSld>
-  <p:clrMapOvr>
-    <a:masterClrMapping/>
-  </p:clrMapOvr>
-</p:notes>
-</file>
-
-<file path=ppt/notesSlides/notesSlide42.xml><?xml version="1.0" encoding="utf-8"?>
-<p:notes xmlns:a="http://schemas.openxmlformats.org/drawingml/2006/main" xmlns:r="http://schemas.openxmlformats.org/officeDocument/2006/relationships" xmlns:p="http://schemas.openxmlformats.org/presentationml/2006/main" showMasterSp="0" showMasterPhAnim="0">
-  <p:cSld>
-    <p:spTree>
-      <p:nvGrpSpPr>
-        <p:cNvPr id="1" name="Shape 295"/>
-        <p:cNvGrpSpPr/>
-        <p:nvPr/>
-      </p:nvGrpSpPr>
-      <p:grpSpPr>
-        <a:xfrm>
-          <a:off x="0" y="0"/>
-          <a:ext cx="0" cy="0"/>
-          <a:chOff x="0" y="0"/>
-          <a:chExt cx="0" cy="0"/>
-        </a:xfrm>
-      </p:grpSpPr>
-      <p:sp>
-        <p:nvSpPr>
-          <p:cNvPr id="296" name="Shape 296"/>
-          <p:cNvSpPr txBox="1">
-            <a:spLocks noGrp="1"/>
-          </p:cNvSpPr>
-          <p:nvPr>
-            <p:ph type="body" idx="1"/>
-          </p:nvPr>
-        </p:nvSpPr>
-        <p:spPr>
-          <a:xfrm>
-            <a:off x="914400" y="4343400"/>
-            <a:ext cx="5029199" cy="4114800"/>
-          </a:xfrm>
-          <a:prstGeom prst="rect">
-            <a:avLst/>
-          </a:prstGeom>
-        </p:spPr>
-        <p:txBody>
-          <a:bodyPr lIns="91425" tIns="91425" rIns="91425" bIns="91425" anchor="t" anchorCtr="0">
-            <a:noAutofit/>
-          </a:bodyPr>
-          <a:lstStyle/>
-          <a:p>
-            <a:pPr lvl="0">
-              <a:spcBef>
-                <a:spcPts val="0"/>
-              </a:spcBef>
-              <a:buNone/>
-            </a:pPr>
-            <a:endParaRPr/>
-          </a:p>
-        </p:txBody>
-      </p:sp>
-      <p:sp>
-        <p:nvSpPr>
-          <p:cNvPr id="297" name="Shape 297"/>
           <p:cNvSpPr>
             <a:spLocks noGrp="1" noRot="1" noChangeAspect="1"/>
           </p:cNvSpPr>
@@ -6972,631 +6054,6 @@
 
 <file path=ppt/slideLayouts/slideLayout10.xml><?xml version="1.0" encoding="utf-8"?>
 <p:sldLayout xmlns:a="http://schemas.openxmlformats.org/drawingml/2006/main" xmlns:r="http://schemas.openxmlformats.org/officeDocument/2006/relationships" xmlns:p="http://schemas.openxmlformats.org/presentationml/2006/main">
-  <p:cSld name="Quote">
-    <p:spTree>
-      <p:nvGrpSpPr>
-        <p:cNvPr id="1" name="Shape 46"/>
-        <p:cNvGrpSpPr/>
-        <p:nvPr/>
-      </p:nvGrpSpPr>
-      <p:grpSpPr>
-        <a:xfrm>
-          <a:off x="0" y="0"/>
-          <a:ext cx="0" cy="0"/>
-          <a:chOff x="0" y="0"/>
-          <a:chExt cx="0" cy="0"/>
-        </a:xfrm>
-      </p:grpSpPr>
-      <p:sp>
-        <p:nvSpPr>
-          <p:cNvPr id="47" name="Shape 47"/>
-          <p:cNvSpPr txBox="1">
-            <a:spLocks noGrp="1"/>
-          </p:cNvSpPr>
-          <p:nvPr>
-            <p:ph type="body" idx="1"/>
-          </p:nvPr>
-        </p:nvSpPr>
-        <p:spPr>
-          <a:xfrm>
-            <a:off x="892968" y="3355330"/>
-            <a:ext cx="7358100" cy="247800"/>
-          </a:xfrm>
-          <a:prstGeom prst="rect">
-            <a:avLst/>
-          </a:prstGeom>
-          <a:noFill/>
-          <a:ln>
-            <a:noFill/>
-          </a:ln>
-        </p:spPr>
-        <p:txBody>
-          <a:bodyPr lIns="58925" tIns="58925" rIns="58925" bIns="58925" anchor="t" anchorCtr="0"/>
-          <a:lstStyle>
-            <a:lvl1pPr marL="0" marR="0" lvl="0" indent="0" algn="ctr" rtl="0">
-              <a:lnSpc>
-                <a:spcPct val="100000"/>
-              </a:lnSpc>
-              <a:spcBef>
-                <a:spcPts val="0"/>
-              </a:spcBef>
-              <a:spcAft>
-                <a:spcPts val="0"/>
-              </a:spcAft>
-              <a:buClr>
-                <a:srgbClr val="FFFFFF"/>
-              </a:buClr>
-              <a:buFont typeface="Helvetica Neue"/>
-              <a:buNone/>
-              <a:defRPr sz="1500" b="0" i="1" u="none" strike="noStrike" cap="none">
-                <a:solidFill>
-                  <a:srgbClr val="FFFFFF"/>
-                </a:solidFill>
-                <a:latin typeface="Helvetica Neue"/>
-                <a:ea typeface="Helvetica Neue"/>
-                <a:cs typeface="Helvetica Neue"/>
-                <a:sym typeface="Helvetica Neue"/>
-              </a:defRPr>
-            </a:lvl1pPr>
-            <a:lvl2pPr marL="571500" marR="0" lvl="1" indent="-165100" algn="l" rtl="0">
-              <a:lnSpc>
-                <a:spcPct val="100000"/>
-              </a:lnSpc>
-              <a:spcBef>
-                <a:spcPts val="2700"/>
-              </a:spcBef>
-              <a:spcAft>
-                <a:spcPts val="0"/>
-              </a:spcAft>
-              <a:buClr>
-                <a:srgbClr val="FFFFFF"/>
-              </a:buClr>
-              <a:buSzPct val="75000"/>
-              <a:buFont typeface="Helvetica Neue"/>
-              <a:buChar char="•"/>
-              <a:defRPr sz="2400" b="0" i="0" u="none" strike="noStrike" cap="none">
-                <a:solidFill>
-                  <a:srgbClr val="FFFFFF"/>
-                </a:solidFill>
-                <a:latin typeface="Helvetica Neue"/>
-                <a:ea typeface="Helvetica Neue"/>
-                <a:cs typeface="Helvetica Neue"/>
-                <a:sym typeface="Helvetica Neue"/>
-              </a:defRPr>
-            </a:lvl2pPr>
-            <a:lvl3pPr marL="863600" marR="0" lvl="2" indent="-177800" algn="l" rtl="0">
-              <a:lnSpc>
-                <a:spcPct val="100000"/>
-              </a:lnSpc>
-              <a:spcBef>
-                <a:spcPts val="2700"/>
-              </a:spcBef>
-              <a:spcAft>
-                <a:spcPts val="0"/>
-              </a:spcAft>
-              <a:buClr>
-                <a:srgbClr val="FFFFFF"/>
-              </a:buClr>
-              <a:buSzPct val="75000"/>
-              <a:buFont typeface="Helvetica Neue"/>
-              <a:buChar char="•"/>
-              <a:defRPr sz="2400" b="0" i="0" u="none" strike="noStrike" cap="none">
-                <a:solidFill>
-                  <a:srgbClr val="FFFFFF"/>
-                </a:solidFill>
-                <a:latin typeface="Helvetica Neue"/>
-                <a:ea typeface="Helvetica Neue"/>
-                <a:cs typeface="Helvetica Neue"/>
-                <a:sym typeface="Helvetica Neue"/>
-              </a:defRPr>
-            </a:lvl3pPr>
-            <a:lvl4pPr marL="1143000" marR="0" lvl="3" indent="-165100" algn="l" rtl="0">
-              <a:lnSpc>
-                <a:spcPct val="100000"/>
-              </a:lnSpc>
-              <a:spcBef>
-                <a:spcPts val="2700"/>
-              </a:spcBef>
-              <a:spcAft>
-                <a:spcPts val="0"/>
-              </a:spcAft>
-              <a:buClr>
-                <a:srgbClr val="FFFFFF"/>
-              </a:buClr>
-              <a:buSzPct val="75000"/>
-              <a:buFont typeface="Helvetica Neue"/>
-              <a:buChar char="•"/>
-              <a:defRPr sz="2400" b="0" i="0" u="none" strike="noStrike" cap="none">
-                <a:solidFill>
-                  <a:srgbClr val="FFFFFF"/>
-                </a:solidFill>
-                <a:latin typeface="Helvetica Neue"/>
-                <a:ea typeface="Helvetica Neue"/>
-                <a:cs typeface="Helvetica Neue"/>
-                <a:sym typeface="Helvetica Neue"/>
-              </a:defRPr>
-            </a:lvl4pPr>
-            <a:lvl5pPr marL="1435100" marR="0" lvl="4" indent="-177800" algn="l" rtl="0">
-              <a:lnSpc>
-                <a:spcPct val="100000"/>
-              </a:lnSpc>
-              <a:spcBef>
-                <a:spcPts val="2700"/>
-              </a:spcBef>
-              <a:spcAft>
-                <a:spcPts val="0"/>
-              </a:spcAft>
-              <a:buClr>
-                <a:srgbClr val="FFFFFF"/>
-              </a:buClr>
-              <a:buSzPct val="75000"/>
-              <a:buFont typeface="Helvetica Neue"/>
-              <a:buChar char="•"/>
-              <a:defRPr sz="2400" b="0" i="0" u="none" strike="noStrike" cap="none">
-                <a:solidFill>
-                  <a:srgbClr val="FFFFFF"/>
-                </a:solidFill>
-                <a:latin typeface="Helvetica Neue"/>
-                <a:ea typeface="Helvetica Neue"/>
-                <a:cs typeface="Helvetica Neue"/>
-                <a:sym typeface="Helvetica Neue"/>
-              </a:defRPr>
-            </a:lvl5pPr>
-            <a:lvl6pPr marL="1714500" marR="0" lvl="5" indent="-165100" algn="l" rtl="0">
-              <a:lnSpc>
-                <a:spcPct val="100000"/>
-              </a:lnSpc>
-              <a:spcBef>
-                <a:spcPts val="2700"/>
-              </a:spcBef>
-              <a:spcAft>
-                <a:spcPts val="0"/>
-              </a:spcAft>
-              <a:buClr>
-                <a:srgbClr val="FFFFFF"/>
-              </a:buClr>
-              <a:buSzPct val="75000"/>
-              <a:buFont typeface="Helvetica Neue"/>
-              <a:buChar char="•"/>
-              <a:defRPr sz="2400" b="0" i="0" u="none" strike="noStrike" cap="none">
-                <a:solidFill>
-                  <a:srgbClr val="FFFFFF"/>
-                </a:solidFill>
-                <a:latin typeface="Helvetica Neue"/>
-                <a:ea typeface="Helvetica Neue"/>
-                <a:cs typeface="Helvetica Neue"/>
-                <a:sym typeface="Helvetica Neue"/>
-              </a:defRPr>
-            </a:lvl6pPr>
-            <a:lvl7pPr marL="2006600" marR="0" lvl="6" indent="-165100" algn="l" rtl="0">
-              <a:lnSpc>
-                <a:spcPct val="100000"/>
-              </a:lnSpc>
-              <a:spcBef>
-                <a:spcPts val="2700"/>
-              </a:spcBef>
-              <a:spcAft>
-                <a:spcPts val="0"/>
-              </a:spcAft>
-              <a:buClr>
-                <a:srgbClr val="FFFFFF"/>
-              </a:buClr>
-              <a:buSzPct val="75000"/>
-              <a:buFont typeface="Helvetica Neue"/>
-              <a:buChar char="•"/>
-              <a:defRPr sz="2400" b="0" i="0" u="none" strike="noStrike" cap="none">
-                <a:solidFill>
-                  <a:srgbClr val="FFFFFF"/>
-                </a:solidFill>
-                <a:latin typeface="Helvetica Neue"/>
-                <a:ea typeface="Helvetica Neue"/>
-                <a:cs typeface="Helvetica Neue"/>
-                <a:sym typeface="Helvetica Neue"/>
-              </a:defRPr>
-            </a:lvl7pPr>
-            <a:lvl8pPr marL="2286000" marR="0" lvl="7" indent="-165100" algn="l" rtl="0">
-              <a:lnSpc>
-                <a:spcPct val="100000"/>
-              </a:lnSpc>
-              <a:spcBef>
-                <a:spcPts val="2700"/>
-              </a:spcBef>
-              <a:spcAft>
-                <a:spcPts val="0"/>
-              </a:spcAft>
-              <a:buClr>
-                <a:srgbClr val="FFFFFF"/>
-              </a:buClr>
-              <a:buSzPct val="75000"/>
-              <a:buFont typeface="Helvetica Neue"/>
-              <a:buChar char="•"/>
-              <a:defRPr sz="2400" b="0" i="0" u="none" strike="noStrike" cap="none">
-                <a:solidFill>
-                  <a:srgbClr val="FFFFFF"/>
-                </a:solidFill>
-                <a:latin typeface="Helvetica Neue"/>
-                <a:ea typeface="Helvetica Neue"/>
-                <a:cs typeface="Helvetica Neue"/>
-                <a:sym typeface="Helvetica Neue"/>
-              </a:defRPr>
-            </a:lvl8pPr>
-            <a:lvl9pPr marL="2578100" marR="0" lvl="8" indent="-165100" algn="l" rtl="0">
-              <a:lnSpc>
-                <a:spcPct val="100000"/>
-              </a:lnSpc>
-              <a:spcBef>
-                <a:spcPts val="2700"/>
-              </a:spcBef>
-              <a:spcAft>
-                <a:spcPts val="0"/>
-              </a:spcAft>
-              <a:buClr>
-                <a:srgbClr val="FFFFFF"/>
-              </a:buClr>
-              <a:buSzPct val="75000"/>
-              <a:buFont typeface="Helvetica Neue"/>
-              <a:buChar char="•"/>
-              <a:defRPr sz="2400" b="0" i="0" u="none" strike="noStrike" cap="none">
-                <a:solidFill>
-                  <a:srgbClr val="FFFFFF"/>
-                </a:solidFill>
-                <a:latin typeface="Helvetica Neue"/>
-                <a:ea typeface="Helvetica Neue"/>
-                <a:cs typeface="Helvetica Neue"/>
-                <a:sym typeface="Helvetica Neue"/>
-              </a:defRPr>
-            </a:lvl9pPr>
-          </a:lstStyle>
-          <a:p>
-            <a:endParaRPr/>
-          </a:p>
-        </p:txBody>
-      </p:sp>
-      <p:sp>
-        <p:nvSpPr>
-          <p:cNvPr id="48" name="Shape 48"/>
-          <p:cNvSpPr txBox="1">
-            <a:spLocks noGrp="1"/>
-          </p:cNvSpPr>
-          <p:nvPr>
-            <p:ph type="body" idx="2"/>
-          </p:nvPr>
-        </p:nvSpPr>
-        <p:spPr>
-          <a:xfrm>
-            <a:off x="892968" y="2250281"/>
-            <a:ext cx="7358100" cy="361800"/>
-          </a:xfrm>
-          <a:prstGeom prst="rect">
-            <a:avLst/>
-          </a:prstGeom>
-          <a:noFill/>
-          <a:ln>
-            <a:noFill/>
-          </a:ln>
-        </p:spPr>
-        <p:txBody>
-          <a:bodyPr lIns="58925" tIns="58925" rIns="58925" bIns="58925" anchor="ctr" anchorCtr="0"/>
-          <a:lstStyle>
-            <a:lvl1pPr marL="0" marR="0" lvl="0" indent="0" algn="ctr" rtl="0">
-              <a:lnSpc>
-                <a:spcPct val="100000"/>
-              </a:lnSpc>
-              <a:spcBef>
-                <a:spcPts val="0"/>
-              </a:spcBef>
-              <a:spcAft>
-                <a:spcPts val="0"/>
-              </a:spcAft>
-              <a:buClr>
-                <a:srgbClr val="FFFFFF"/>
-              </a:buClr>
-              <a:buFont typeface="Helvetica Neue"/>
-              <a:buNone/>
-              <a:defRPr sz="2400" b="0" i="0" u="none" strike="noStrike" cap="none">
-                <a:solidFill>
-                  <a:srgbClr val="FFFFFF"/>
-                </a:solidFill>
-                <a:latin typeface="Helvetica Neue"/>
-                <a:ea typeface="Helvetica Neue"/>
-                <a:cs typeface="Helvetica Neue"/>
-                <a:sym typeface="Helvetica Neue"/>
-              </a:defRPr>
-            </a:lvl1pPr>
-            <a:lvl2pPr marL="571500" marR="0" lvl="1" indent="-165100" algn="l" rtl="0">
-              <a:lnSpc>
-                <a:spcPct val="100000"/>
-              </a:lnSpc>
-              <a:spcBef>
-                <a:spcPts val="2700"/>
-              </a:spcBef>
-              <a:spcAft>
-                <a:spcPts val="0"/>
-              </a:spcAft>
-              <a:buClr>
-                <a:srgbClr val="FFFFFF"/>
-              </a:buClr>
-              <a:buSzPct val="75000"/>
-              <a:buFont typeface="Helvetica Neue"/>
-              <a:buChar char="•"/>
-              <a:defRPr sz="2400" b="0" i="0" u="none" strike="noStrike" cap="none">
-                <a:solidFill>
-                  <a:srgbClr val="FFFFFF"/>
-                </a:solidFill>
-                <a:latin typeface="Helvetica Neue"/>
-                <a:ea typeface="Helvetica Neue"/>
-                <a:cs typeface="Helvetica Neue"/>
-                <a:sym typeface="Helvetica Neue"/>
-              </a:defRPr>
-            </a:lvl2pPr>
-            <a:lvl3pPr marL="863600" marR="0" lvl="2" indent="-177800" algn="l" rtl="0">
-              <a:lnSpc>
-                <a:spcPct val="100000"/>
-              </a:lnSpc>
-              <a:spcBef>
-                <a:spcPts val="2700"/>
-              </a:spcBef>
-              <a:spcAft>
-                <a:spcPts val="0"/>
-              </a:spcAft>
-              <a:buClr>
-                <a:srgbClr val="FFFFFF"/>
-              </a:buClr>
-              <a:buSzPct val="75000"/>
-              <a:buFont typeface="Helvetica Neue"/>
-              <a:buChar char="•"/>
-              <a:defRPr sz="2400" b="0" i="0" u="none" strike="noStrike" cap="none">
-                <a:solidFill>
-                  <a:srgbClr val="FFFFFF"/>
-                </a:solidFill>
-                <a:latin typeface="Helvetica Neue"/>
-                <a:ea typeface="Helvetica Neue"/>
-                <a:cs typeface="Helvetica Neue"/>
-                <a:sym typeface="Helvetica Neue"/>
-              </a:defRPr>
-            </a:lvl3pPr>
-            <a:lvl4pPr marL="1143000" marR="0" lvl="3" indent="-165100" algn="l" rtl="0">
-              <a:lnSpc>
-                <a:spcPct val="100000"/>
-              </a:lnSpc>
-              <a:spcBef>
-                <a:spcPts val="2700"/>
-              </a:spcBef>
-              <a:spcAft>
-                <a:spcPts val="0"/>
-              </a:spcAft>
-              <a:buClr>
-                <a:srgbClr val="FFFFFF"/>
-              </a:buClr>
-              <a:buSzPct val="75000"/>
-              <a:buFont typeface="Helvetica Neue"/>
-              <a:buChar char="•"/>
-              <a:defRPr sz="2400" b="0" i="0" u="none" strike="noStrike" cap="none">
-                <a:solidFill>
-                  <a:srgbClr val="FFFFFF"/>
-                </a:solidFill>
-                <a:latin typeface="Helvetica Neue"/>
-                <a:ea typeface="Helvetica Neue"/>
-                <a:cs typeface="Helvetica Neue"/>
-                <a:sym typeface="Helvetica Neue"/>
-              </a:defRPr>
-            </a:lvl4pPr>
-            <a:lvl5pPr marL="1435100" marR="0" lvl="4" indent="-177800" algn="l" rtl="0">
-              <a:lnSpc>
-                <a:spcPct val="100000"/>
-              </a:lnSpc>
-              <a:spcBef>
-                <a:spcPts val="2700"/>
-              </a:spcBef>
-              <a:spcAft>
-                <a:spcPts val="0"/>
-              </a:spcAft>
-              <a:buClr>
-                <a:srgbClr val="FFFFFF"/>
-              </a:buClr>
-              <a:buSzPct val="75000"/>
-              <a:buFont typeface="Helvetica Neue"/>
-              <a:buChar char="•"/>
-              <a:defRPr sz="2400" b="0" i="0" u="none" strike="noStrike" cap="none">
-                <a:solidFill>
-                  <a:srgbClr val="FFFFFF"/>
-                </a:solidFill>
-                <a:latin typeface="Helvetica Neue"/>
-                <a:ea typeface="Helvetica Neue"/>
-                <a:cs typeface="Helvetica Neue"/>
-                <a:sym typeface="Helvetica Neue"/>
-              </a:defRPr>
-            </a:lvl5pPr>
-            <a:lvl6pPr marL="1714500" marR="0" lvl="5" indent="-165100" algn="l" rtl="0">
-              <a:lnSpc>
-                <a:spcPct val="100000"/>
-              </a:lnSpc>
-              <a:spcBef>
-                <a:spcPts val="2700"/>
-              </a:spcBef>
-              <a:spcAft>
-                <a:spcPts val="0"/>
-              </a:spcAft>
-              <a:buClr>
-                <a:srgbClr val="FFFFFF"/>
-              </a:buClr>
-              <a:buSzPct val="75000"/>
-              <a:buFont typeface="Helvetica Neue"/>
-              <a:buChar char="•"/>
-              <a:defRPr sz="2400" b="0" i="0" u="none" strike="noStrike" cap="none">
-                <a:solidFill>
-                  <a:srgbClr val="FFFFFF"/>
-                </a:solidFill>
-                <a:latin typeface="Helvetica Neue"/>
-                <a:ea typeface="Helvetica Neue"/>
-                <a:cs typeface="Helvetica Neue"/>
-                <a:sym typeface="Helvetica Neue"/>
-              </a:defRPr>
-            </a:lvl6pPr>
-            <a:lvl7pPr marL="2006600" marR="0" lvl="6" indent="-165100" algn="l" rtl="0">
-              <a:lnSpc>
-                <a:spcPct val="100000"/>
-              </a:lnSpc>
-              <a:spcBef>
-                <a:spcPts val="2700"/>
-              </a:spcBef>
-              <a:spcAft>
-                <a:spcPts val="0"/>
-              </a:spcAft>
-              <a:buClr>
-                <a:srgbClr val="FFFFFF"/>
-              </a:buClr>
-              <a:buSzPct val="75000"/>
-              <a:buFont typeface="Helvetica Neue"/>
-              <a:buChar char="•"/>
-              <a:defRPr sz="2400" b="0" i="0" u="none" strike="noStrike" cap="none">
-                <a:solidFill>
-                  <a:srgbClr val="FFFFFF"/>
-                </a:solidFill>
-                <a:latin typeface="Helvetica Neue"/>
-                <a:ea typeface="Helvetica Neue"/>
-                <a:cs typeface="Helvetica Neue"/>
-                <a:sym typeface="Helvetica Neue"/>
-              </a:defRPr>
-            </a:lvl7pPr>
-            <a:lvl8pPr marL="2286000" marR="0" lvl="7" indent="-165100" algn="l" rtl="0">
-              <a:lnSpc>
-                <a:spcPct val="100000"/>
-              </a:lnSpc>
-              <a:spcBef>
-                <a:spcPts val="2700"/>
-              </a:spcBef>
-              <a:spcAft>
-                <a:spcPts val="0"/>
-              </a:spcAft>
-              <a:buClr>
-                <a:srgbClr val="FFFFFF"/>
-              </a:buClr>
-              <a:buSzPct val="75000"/>
-              <a:buFont typeface="Helvetica Neue"/>
-              <a:buChar char="•"/>
-              <a:defRPr sz="2400" b="0" i="0" u="none" strike="noStrike" cap="none">
-                <a:solidFill>
-                  <a:srgbClr val="FFFFFF"/>
-                </a:solidFill>
-                <a:latin typeface="Helvetica Neue"/>
-                <a:ea typeface="Helvetica Neue"/>
-                <a:cs typeface="Helvetica Neue"/>
-                <a:sym typeface="Helvetica Neue"/>
-              </a:defRPr>
-            </a:lvl8pPr>
-            <a:lvl9pPr marL="2578100" marR="0" lvl="8" indent="-165100" algn="l" rtl="0">
-              <a:lnSpc>
-                <a:spcPct val="100000"/>
-              </a:lnSpc>
-              <a:spcBef>
-                <a:spcPts val="2700"/>
-              </a:spcBef>
-              <a:spcAft>
-                <a:spcPts val="0"/>
-              </a:spcAft>
-              <a:buClr>
-                <a:srgbClr val="FFFFFF"/>
-              </a:buClr>
-              <a:buSzPct val="75000"/>
-              <a:buFont typeface="Helvetica Neue"/>
-              <a:buChar char="•"/>
-              <a:defRPr sz="2400" b="0" i="0" u="none" strike="noStrike" cap="none">
-                <a:solidFill>
-                  <a:srgbClr val="FFFFFF"/>
-                </a:solidFill>
-                <a:latin typeface="Helvetica Neue"/>
-                <a:ea typeface="Helvetica Neue"/>
-                <a:cs typeface="Helvetica Neue"/>
-                <a:sym typeface="Helvetica Neue"/>
-              </a:defRPr>
-            </a:lvl9pPr>
-          </a:lstStyle>
-          <a:p>
-            <a:endParaRPr/>
-          </a:p>
-        </p:txBody>
-      </p:sp>
-      <p:sp>
-        <p:nvSpPr>
-          <p:cNvPr id="49" name="Shape 49"/>
-          <p:cNvSpPr txBox="1">
-            <a:spLocks noGrp="1"/>
-          </p:cNvSpPr>
-          <p:nvPr>
-            <p:ph type="sldNum" idx="12"/>
-          </p:nvPr>
-        </p:nvSpPr>
-        <p:spPr>
-          <a:xfrm>
-            <a:off x="4437983" y="4882306"/>
-            <a:ext cx="259200" cy="201000"/>
-          </a:xfrm>
-          <a:prstGeom prst="rect">
-            <a:avLst/>
-          </a:prstGeom>
-          <a:noFill/>
-          <a:ln>
-            <a:noFill/>
-          </a:ln>
-        </p:spPr>
-        <p:txBody>
-          <a:bodyPr lIns="32750" tIns="32750" rIns="32750" bIns="32750" anchor="t" anchorCtr="0">
-            <a:noAutofit/>
-          </a:bodyPr>
-          <a:lstStyle/>
-          <a:p>
-            <a:pPr marL="0" marR="0" lvl="0" indent="0" algn="ctr" rtl="0">
-              <a:lnSpc>
-                <a:spcPct val="100000"/>
-              </a:lnSpc>
-              <a:spcBef>
-                <a:spcPts val="0"/>
-              </a:spcBef>
-              <a:spcAft>
-                <a:spcPts val="0"/>
-              </a:spcAft>
-              <a:buClr>
-                <a:srgbClr val="FFFFFF"/>
-              </a:buClr>
-              <a:buSzPct val="25000"/>
-              <a:buFont typeface="Helvetica Neue"/>
-              <a:buNone/>
-            </a:pPr>
-            <a:fld id="{00000000-1234-1234-1234-123412341234}" type="slidenum">
-              <a:rPr lang="en-US" sz="1200" b="0" i="0" u="none" strike="noStrike" cap="none">
-                <a:solidFill>
-                  <a:srgbClr val="FFFFFF"/>
-                </a:solidFill>
-                <a:latin typeface="Helvetica Neue"/>
-                <a:ea typeface="Helvetica Neue"/>
-                <a:cs typeface="Helvetica Neue"/>
-                <a:sym typeface="Helvetica Neue"/>
-              </a:rPr>
-              <a:t>‹#›</a:t>
-            </a:fld>
-            <a:endParaRPr lang="en-US" sz="1200" b="0" i="0" u="none" strike="noStrike" cap="none">
-              <a:solidFill>
-                <a:srgbClr val="FFFFFF"/>
-              </a:solidFill>
-              <a:latin typeface="Helvetica Neue"/>
-              <a:ea typeface="Helvetica Neue"/>
-              <a:cs typeface="Helvetica Neue"/>
-              <a:sym typeface="Helvetica Neue"/>
-            </a:endParaRPr>
-          </a:p>
-        </p:txBody>
-      </p:sp>
-    </p:spTree>
-  </p:cSld>
-  <p:clrMapOvr>
-    <a:masterClrMapping/>
-  </p:clrMapOvr>
-</p:sldLayout>
-</file>
-
-<file path=ppt/slideLayouts/slideLayout11.xml><?xml version="1.0" encoding="utf-8"?>
-<p:sldLayout xmlns:a="http://schemas.openxmlformats.org/drawingml/2006/main" xmlns:r="http://schemas.openxmlformats.org/officeDocument/2006/relationships" xmlns:p="http://schemas.openxmlformats.org/presentationml/2006/main">
   <p:cSld name="Photo">
     <p:spTree>
       <p:nvGrpSpPr>
@@ -7956,7 +6413,7 @@
 </p:sldLayout>
 </file>
 
-<file path=ppt/slideLayouts/slideLayout12.xml><?xml version="1.0" encoding="utf-8"?>
+<file path=ppt/slideLayouts/slideLayout11.xml><?xml version="1.0" encoding="utf-8"?>
 <p:sldLayout xmlns:a="http://schemas.openxmlformats.org/drawingml/2006/main" xmlns:r="http://schemas.openxmlformats.org/officeDocument/2006/relationships" xmlns:p="http://schemas.openxmlformats.org/presentationml/2006/main">
   <p:cSld name="Blank">
     <p:spTree>
@@ -8051,7 +6508,7 @@
 </p:sldLayout>
 </file>
 
-<file path=ppt/slideLayouts/slideLayout13.xml><?xml version="1.0" encoding="utf-8"?>
+<file path=ppt/slideLayouts/slideLayout12.xml><?xml version="1.0" encoding="utf-8"?>
 <p:sldLayout xmlns:a="http://schemas.openxmlformats.org/drawingml/2006/main" xmlns:r="http://schemas.openxmlformats.org/officeDocument/2006/relationships" xmlns:p="http://schemas.openxmlformats.org/presentationml/2006/main" type="obj">
   <p:cSld name="Titel en object">
     <p:spTree>
@@ -8168,7 +6625,7 @@
           <a:p>
             <a:fld id="{35F65C51-E4BF-4FAD-97FA-C994B8CE38B5}" type="datetimeFigureOut">
               <a:rPr lang="nl-NL" smtClean="0"/>
-              <a:t>30-04-18</a:t>
+              <a:t>08-07-18</a:t>
             </a:fld>
             <a:endParaRPr lang="nl-NL"/>
           </a:p>
@@ -9209,367 +7666,6 @@
 
 <file path=ppt/slideLayouts/slideLayout4.xml><?xml version="1.0" encoding="utf-8"?>
 <p:sldLayout xmlns:a="http://schemas.openxmlformats.org/drawingml/2006/main" xmlns:r="http://schemas.openxmlformats.org/officeDocument/2006/relationships" xmlns:p="http://schemas.openxmlformats.org/presentationml/2006/main">
-  <p:cSld name="Bullets">
-    <p:spTree>
-      <p:nvGrpSpPr>
-        <p:cNvPr id="1" name="Shape 20"/>
-        <p:cNvGrpSpPr/>
-        <p:nvPr/>
-      </p:nvGrpSpPr>
-      <p:grpSpPr>
-        <a:xfrm>
-          <a:off x="0" y="0"/>
-          <a:ext cx="0" cy="0"/>
-          <a:chOff x="0" y="0"/>
-          <a:chExt cx="0" cy="0"/>
-        </a:xfrm>
-      </p:grpSpPr>
-      <p:sp>
-        <p:nvSpPr>
-          <p:cNvPr id="21" name="Shape 21"/>
-          <p:cNvSpPr txBox="1">
-            <a:spLocks noGrp="1"/>
-          </p:cNvSpPr>
-          <p:nvPr>
-            <p:ph type="body" idx="1"/>
-          </p:nvPr>
-        </p:nvSpPr>
-        <p:spPr>
-          <a:xfrm>
-            <a:off x="669726" y="669726"/>
-            <a:ext cx="7804500" cy="3804000"/>
-          </a:xfrm>
-          <a:prstGeom prst="rect">
-            <a:avLst/>
-          </a:prstGeom>
-          <a:noFill/>
-          <a:ln>
-            <a:noFill/>
-          </a:ln>
-        </p:spPr>
-        <p:txBody>
-          <a:bodyPr lIns="58925" tIns="58925" rIns="58925" bIns="58925" anchor="ctr" anchorCtr="0"/>
-          <a:lstStyle>
-            <a:lvl1pPr marL="292100" marR="0" lvl="0" indent="-177800" algn="l" rtl="0">
-              <a:lnSpc>
-                <a:spcPct val="100000"/>
-              </a:lnSpc>
-              <a:spcBef>
-                <a:spcPts val="2700"/>
-              </a:spcBef>
-              <a:spcAft>
-                <a:spcPts val="0"/>
-              </a:spcAft>
-              <a:buClr>
-                <a:srgbClr val="FFFFFF"/>
-              </a:buClr>
-              <a:buSzPct val="75000"/>
-              <a:buFont typeface="Helvetica Neue"/>
-              <a:buChar char="•"/>
-              <a:defRPr sz="2400" b="0" i="0" u="none" strike="noStrike" cap="none">
-                <a:solidFill>
-                  <a:srgbClr val="FFFFFF"/>
-                </a:solidFill>
-                <a:latin typeface="Helvetica Neue"/>
-                <a:ea typeface="Helvetica Neue"/>
-                <a:cs typeface="Helvetica Neue"/>
-                <a:sym typeface="Helvetica Neue"/>
-              </a:defRPr>
-            </a:lvl1pPr>
-            <a:lvl2pPr marL="571500" marR="0" lvl="1" indent="-165100" algn="l" rtl="0">
-              <a:lnSpc>
-                <a:spcPct val="100000"/>
-              </a:lnSpc>
-              <a:spcBef>
-                <a:spcPts val="2700"/>
-              </a:spcBef>
-              <a:spcAft>
-                <a:spcPts val="0"/>
-              </a:spcAft>
-              <a:buClr>
-                <a:srgbClr val="FFFFFF"/>
-              </a:buClr>
-              <a:buSzPct val="75000"/>
-              <a:buFont typeface="Helvetica Neue"/>
-              <a:buChar char="•"/>
-              <a:defRPr sz="2400" b="0" i="0" u="none" strike="noStrike" cap="none">
-                <a:solidFill>
-                  <a:srgbClr val="FFFFFF"/>
-                </a:solidFill>
-                <a:latin typeface="Helvetica Neue"/>
-                <a:ea typeface="Helvetica Neue"/>
-                <a:cs typeface="Helvetica Neue"/>
-                <a:sym typeface="Helvetica Neue"/>
-              </a:defRPr>
-            </a:lvl2pPr>
-            <a:lvl3pPr marL="863600" marR="0" lvl="2" indent="-177800" algn="l" rtl="0">
-              <a:lnSpc>
-                <a:spcPct val="100000"/>
-              </a:lnSpc>
-              <a:spcBef>
-                <a:spcPts val="2700"/>
-              </a:spcBef>
-              <a:spcAft>
-                <a:spcPts val="0"/>
-              </a:spcAft>
-              <a:buClr>
-                <a:srgbClr val="FFFFFF"/>
-              </a:buClr>
-              <a:buSzPct val="75000"/>
-              <a:buFont typeface="Helvetica Neue"/>
-              <a:buChar char="•"/>
-              <a:defRPr sz="2400" b="0" i="0" u="none" strike="noStrike" cap="none">
-                <a:solidFill>
-                  <a:srgbClr val="FFFFFF"/>
-                </a:solidFill>
-                <a:latin typeface="Helvetica Neue"/>
-                <a:ea typeface="Helvetica Neue"/>
-                <a:cs typeface="Helvetica Neue"/>
-                <a:sym typeface="Helvetica Neue"/>
-              </a:defRPr>
-            </a:lvl3pPr>
-            <a:lvl4pPr marL="1143000" marR="0" lvl="3" indent="-165100" algn="l" rtl="0">
-              <a:lnSpc>
-                <a:spcPct val="100000"/>
-              </a:lnSpc>
-              <a:spcBef>
-                <a:spcPts val="2700"/>
-              </a:spcBef>
-              <a:spcAft>
-                <a:spcPts val="0"/>
-              </a:spcAft>
-              <a:buClr>
-                <a:srgbClr val="FFFFFF"/>
-              </a:buClr>
-              <a:buSzPct val="75000"/>
-              <a:buFont typeface="Helvetica Neue"/>
-              <a:buChar char="•"/>
-              <a:defRPr sz="2400" b="0" i="0" u="none" strike="noStrike" cap="none">
-                <a:solidFill>
-                  <a:srgbClr val="FFFFFF"/>
-                </a:solidFill>
-                <a:latin typeface="Helvetica Neue"/>
-                <a:ea typeface="Helvetica Neue"/>
-                <a:cs typeface="Helvetica Neue"/>
-                <a:sym typeface="Helvetica Neue"/>
-              </a:defRPr>
-            </a:lvl4pPr>
-            <a:lvl5pPr marL="1435100" marR="0" lvl="4" indent="-177800" algn="l" rtl="0">
-              <a:lnSpc>
-                <a:spcPct val="100000"/>
-              </a:lnSpc>
-              <a:spcBef>
-                <a:spcPts val="2700"/>
-              </a:spcBef>
-              <a:spcAft>
-                <a:spcPts val="0"/>
-              </a:spcAft>
-              <a:buClr>
-                <a:srgbClr val="FFFFFF"/>
-              </a:buClr>
-              <a:buSzPct val="75000"/>
-              <a:buFont typeface="Helvetica Neue"/>
-              <a:buChar char="•"/>
-              <a:defRPr sz="2400" b="0" i="0" u="none" strike="noStrike" cap="none">
-                <a:solidFill>
-                  <a:srgbClr val="FFFFFF"/>
-                </a:solidFill>
-                <a:latin typeface="Helvetica Neue"/>
-                <a:ea typeface="Helvetica Neue"/>
-                <a:cs typeface="Helvetica Neue"/>
-                <a:sym typeface="Helvetica Neue"/>
-              </a:defRPr>
-            </a:lvl5pPr>
-            <a:lvl6pPr marL="1714500" marR="0" lvl="5" indent="-165100" algn="l" rtl="0">
-              <a:lnSpc>
-                <a:spcPct val="100000"/>
-              </a:lnSpc>
-              <a:spcBef>
-                <a:spcPts val="2700"/>
-              </a:spcBef>
-              <a:spcAft>
-                <a:spcPts val="0"/>
-              </a:spcAft>
-              <a:buClr>
-                <a:srgbClr val="FFFFFF"/>
-              </a:buClr>
-              <a:buSzPct val="75000"/>
-              <a:buFont typeface="Helvetica Neue"/>
-              <a:buChar char="•"/>
-              <a:defRPr sz="2400" b="0" i="0" u="none" strike="noStrike" cap="none">
-                <a:solidFill>
-                  <a:srgbClr val="FFFFFF"/>
-                </a:solidFill>
-                <a:latin typeface="Helvetica Neue"/>
-                <a:ea typeface="Helvetica Neue"/>
-                <a:cs typeface="Helvetica Neue"/>
-                <a:sym typeface="Helvetica Neue"/>
-              </a:defRPr>
-            </a:lvl6pPr>
-            <a:lvl7pPr marL="2006600" marR="0" lvl="6" indent="-165100" algn="l" rtl="0">
-              <a:lnSpc>
-                <a:spcPct val="100000"/>
-              </a:lnSpc>
-              <a:spcBef>
-                <a:spcPts val="2700"/>
-              </a:spcBef>
-              <a:spcAft>
-                <a:spcPts val="0"/>
-              </a:spcAft>
-              <a:buClr>
-                <a:srgbClr val="FFFFFF"/>
-              </a:buClr>
-              <a:buSzPct val="75000"/>
-              <a:buFont typeface="Helvetica Neue"/>
-              <a:buChar char="•"/>
-              <a:defRPr sz="2400" b="0" i="0" u="none" strike="noStrike" cap="none">
-                <a:solidFill>
-                  <a:srgbClr val="FFFFFF"/>
-                </a:solidFill>
-                <a:latin typeface="Helvetica Neue"/>
-                <a:ea typeface="Helvetica Neue"/>
-                <a:cs typeface="Helvetica Neue"/>
-                <a:sym typeface="Helvetica Neue"/>
-              </a:defRPr>
-            </a:lvl7pPr>
-            <a:lvl8pPr marL="2286000" marR="0" lvl="7" indent="-165100" algn="l" rtl="0">
-              <a:lnSpc>
-                <a:spcPct val="100000"/>
-              </a:lnSpc>
-              <a:spcBef>
-                <a:spcPts val="2700"/>
-              </a:spcBef>
-              <a:spcAft>
-                <a:spcPts val="0"/>
-              </a:spcAft>
-              <a:buClr>
-                <a:srgbClr val="FFFFFF"/>
-              </a:buClr>
-              <a:buSzPct val="75000"/>
-              <a:buFont typeface="Helvetica Neue"/>
-              <a:buChar char="•"/>
-              <a:defRPr sz="2400" b="0" i="0" u="none" strike="noStrike" cap="none">
-                <a:solidFill>
-                  <a:srgbClr val="FFFFFF"/>
-                </a:solidFill>
-                <a:latin typeface="Helvetica Neue"/>
-                <a:ea typeface="Helvetica Neue"/>
-                <a:cs typeface="Helvetica Neue"/>
-                <a:sym typeface="Helvetica Neue"/>
-              </a:defRPr>
-            </a:lvl8pPr>
-            <a:lvl9pPr marL="2578100" marR="0" lvl="8" indent="-165100" algn="l" rtl="0">
-              <a:lnSpc>
-                <a:spcPct val="100000"/>
-              </a:lnSpc>
-              <a:spcBef>
-                <a:spcPts val="2700"/>
-              </a:spcBef>
-              <a:spcAft>
-                <a:spcPts val="0"/>
-              </a:spcAft>
-              <a:buClr>
-                <a:srgbClr val="FFFFFF"/>
-              </a:buClr>
-              <a:buSzPct val="75000"/>
-              <a:buFont typeface="Helvetica Neue"/>
-              <a:buChar char="•"/>
-              <a:defRPr sz="2400" b="0" i="0" u="none" strike="noStrike" cap="none">
-                <a:solidFill>
-                  <a:srgbClr val="FFFFFF"/>
-                </a:solidFill>
-                <a:latin typeface="Helvetica Neue"/>
-                <a:ea typeface="Helvetica Neue"/>
-                <a:cs typeface="Helvetica Neue"/>
-                <a:sym typeface="Helvetica Neue"/>
-              </a:defRPr>
-            </a:lvl9pPr>
-          </a:lstStyle>
-          <a:p>
-            <a:endParaRPr/>
-          </a:p>
-        </p:txBody>
-      </p:sp>
-      <p:sp>
-        <p:nvSpPr>
-          <p:cNvPr id="22" name="Shape 22"/>
-          <p:cNvSpPr txBox="1">
-            <a:spLocks noGrp="1"/>
-          </p:cNvSpPr>
-          <p:nvPr>
-            <p:ph type="sldNum" idx="12"/>
-          </p:nvPr>
-        </p:nvSpPr>
-        <p:spPr>
-          <a:xfrm>
-            <a:off x="4437983" y="4882306"/>
-            <a:ext cx="259200" cy="201000"/>
-          </a:xfrm>
-          <a:prstGeom prst="rect">
-            <a:avLst/>
-          </a:prstGeom>
-          <a:noFill/>
-          <a:ln>
-            <a:noFill/>
-          </a:ln>
-        </p:spPr>
-        <p:txBody>
-          <a:bodyPr lIns="32750" tIns="32750" rIns="32750" bIns="32750" anchor="t" anchorCtr="0">
-            <a:noAutofit/>
-          </a:bodyPr>
-          <a:lstStyle/>
-          <a:p>
-            <a:pPr marL="0" marR="0" lvl="0" indent="0" algn="ctr" rtl="0">
-              <a:lnSpc>
-                <a:spcPct val="100000"/>
-              </a:lnSpc>
-              <a:spcBef>
-                <a:spcPts val="0"/>
-              </a:spcBef>
-              <a:spcAft>
-                <a:spcPts val="0"/>
-              </a:spcAft>
-              <a:buClr>
-                <a:srgbClr val="FFFFFF"/>
-              </a:buClr>
-              <a:buSzPct val="25000"/>
-              <a:buFont typeface="Helvetica Neue"/>
-              <a:buNone/>
-            </a:pPr>
-            <a:fld id="{00000000-1234-1234-1234-123412341234}" type="slidenum">
-              <a:rPr lang="en-US" sz="1200" b="0" i="0" u="none" strike="noStrike" cap="none">
-                <a:solidFill>
-                  <a:srgbClr val="FFFFFF"/>
-                </a:solidFill>
-                <a:latin typeface="Helvetica Neue"/>
-                <a:ea typeface="Helvetica Neue"/>
-                <a:cs typeface="Helvetica Neue"/>
-                <a:sym typeface="Helvetica Neue"/>
-              </a:rPr>
-              <a:t>‹#›</a:t>
-            </a:fld>
-            <a:endParaRPr lang="en-US" sz="1200" b="0" i="0" u="none" strike="noStrike" cap="none">
-              <a:solidFill>
-                <a:srgbClr val="FFFFFF"/>
-              </a:solidFill>
-              <a:latin typeface="Helvetica Neue"/>
-              <a:ea typeface="Helvetica Neue"/>
-              <a:cs typeface="Helvetica Neue"/>
-              <a:sym typeface="Helvetica Neue"/>
-            </a:endParaRPr>
-          </a:p>
-        </p:txBody>
-      </p:sp>
-    </p:spTree>
-  </p:cSld>
-  <p:clrMapOvr>
-    <a:masterClrMapping/>
-  </p:clrMapOvr>
-</p:sldLayout>
-</file>
-
-<file path=ppt/slideLayouts/slideLayout5.xml><?xml version="1.0" encoding="utf-8"?>
-<p:sldLayout xmlns:a="http://schemas.openxmlformats.org/drawingml/2006/main" xmlns:r="http://schemas.openxmlformats.org/officeDocument/2006/relationships" xmlns:p="http://schemas.openxmlformats.org/presentationml/2006/main">
   <p:cSld name="Photo - Horizontal">
     <p:spTree>
       <p:nvGrpSpPr>
@@ -10447,7 +8543,7 @@
 </p:sldLayout>
 </file>
 
-<file path=ppt/slideLayouts/slideLayout6.xml><?xml version="1.0" encoding="utf-8"?>
+<file path=ppt/slideLayouts/slideLayout5.xml><?xml version="1.0" encoding="utf-8"?>
 <p:sldLayout xmlns:a="http://schemas.openxmlformats.org/drawingml/2006/main" xmlns:r="http://schemas.openxmlformats.org/officeDocument/2006/relationships" xmlns:p="http://schemas.openxmlformats.org/presentationml/2006/main">
   <p:cSld name="Photo - Vertical">
     <p:spTree>
@@ -11326,7 +9422,7 @@
 </p:sldLayout>
 </file>
 
-<file path=ppt/slideLayouts/slideLayout7.xml><?xml version="1.0" encoding="utf-8"?>
+<file path=ppt/slideLayouts/slideLayout6.xml><?xml version="1.0" encoding="utf-8"?>
 <p:sldLayout xmlns:a="http://schemas.openxmlformats.org/drawingml/2006/main" xmlns:r="http://schemas.openxmlformats.org/officeDocument/2006/relationships" xmlns:p="http://schemas.openxmlformats.org/presentationml/2006/main">
   <p:cSld name="Title - Top">
     <p:spTree>
@@ -11678,7 +9774,7 @@
 </p:sldLayout>
 </file>
 
-<file path=ppt/slideLayouts/slideLayout8.xml><?xml version="1.0" encoding="utf-8"?>
+<file path=ppt/slideLayouts/slideLayout7.xml><?xml version="1.0" encoding="utf-8"?>
 <p:sldLayout xmlns:a="http://schemas.openxmlformats.org/drawingml/2006/main" xmlns:r="http://schemas.openxmlformats.org/officeDocument/2006/relationships" xmlns:p="http://schemas.openxmlformats.org/presentationml/2006/main">
   <p:cSld name="Title, Bullets &amp; Photo">
     <p:spTree>
@@ -12562,7 +10658,7 @@
 </p:sldLayout>
 </file>
 
-<file path=ppt/slideLayouts/slideLayout9.xml><?xml version="1.0" encoding="utf-8"?>
+<file path=ppt/slideLayouts/slideLayout8.xml><?xml version="1.0" encoding="utf-8"?>
 <p:sldLayout xmlns:a="http://schemas.openxmlformats.org/drawingml/2006/main" xmlns:r="http://schemas.openxmlformats.org/officeDocument/2006/relationships" xmlns:p="http://schemas.openxmlformats.org/presentationml/2006/main">
   <p:cSld name="Photo - 3 Up">
     <p:spTree>
@@ -13380,6 +11476,631 @@
       <p:sp>
         <p:nvSpPr>
           <p:cNvPr id="45" name="Shape 45"/>
+          <p:cNvSpPr txBox="1">
+            <a:spLocks noGrp="1"/>
+          </p:cNvSpPr>
+          <p:nvPr>
+            <p:ph type="sldNum" idx="12"/>
+          </p:nvPr>
+        </p:nvSpPr>
+        <p:spPr>
+          <a:xfrm>
+            <a:off x="4437983" y="4882306"/>
+            <a:ext cx="259200" cy="201000"/>
+          </a:xfrm>
+          <a:prstGeom prst="rect">
+            <a:avLst/>
+          </a:prstGeom>
+          <a:noFill/>
+          <a:ln>
+            <a:noFill/>
+          </a:ln>
+        </p:spPr>
+        <p:txBody>
+          <a:bodyPr lIns="32750" tIns="32750" rIns="32750" bIns="32750" anchor="t" anchorCtr="0">
+            <a:noAutofit/>
+          </a:bodyPr>
+          <a:lstStyle/>
+          <a:p>
+            <a:pPr marL="0" marR="0" lvl="0" indent="0" algn="ctr" rtl="0">
+              <a:lnSpc>
+                <a:spcPct val="100000"/>
+              </a:lnSpc>
+              <a:spcBef>
+                <a:spcPts val="0"/>
+              </a:spcBef>
+              <a:spcAft>
+                <a:spcPts val="0"/>
+              </a:spcAft>
+              <a:buClr>
+                <a:srgbClr val="FFFFFF"/>
+              </a:buClr>
+              <a:buSzPct val="25000"/>
+              <a:buFont typeface="Helvetica Neue"/>
+              <a:buNone/>
+            </a:pPr>
+            <a:fld id="{00000000-1234-1234-1234-123412341234}" type="slidenum">
+              <a:rPr lang="en-US" sz="1200" b="0" i="0" u="none" strike="noStrike" cap="none">
+                <a:solidFill>
+                  <a:srgbClr val="FFFFFF"/>
+                </a:solidFill>
+                <a:latin typeface="Helvetica Neue"/>
+                <a:ea typeface="Helvetica Neue"/>
+                <a:cs typeface="Helvetica Neue"/>
+                <a:sym typeface="Helvetica Neue"/>
+              </a:rPr>
+              <a:t>‹#›</a:t>
+            </a:fld>
+            <a:endParaRPr lang="en-US" sz="1200" b="0" i="0" u="none" strike="noStrike" cap="none">
+              <a:solidFill>
+                <a:srgbClr val="FFFFFF"/>
+              </a:solidFill>
+              <a:latin typeface="Helvetica Neue"/>
+              <a:ea typeface="Helvetica Neue"/>
+              <a:cs typeface="Helvetica Neue"/>
+              <a:sym typeface="Helvetica Neue"/>
+            </a:endParaRPr>
+          </a:p>
+        </p:txBody>
+      </p:sp>
+    </p:spTree>
+  </p:cSld>
+  <p:clrMapOvr>
+    <a:masterClrMapping/>
+  </p:clrMapOvr>
+</p:sldLayout>
+</file>
+
+<file path=ppt/slideLayouts/slideLayout9.xml><?xml version="1.0" encoding="utf-8"?>
+<p:sldLayout xmlns:a="http://schemas.openxmlformats.org/drawingml/2006/main" xmlns:r="http://schemas.openxmlformats.org/officeDocument/2006/relationships" xmlns:p="http://schemas.openxmlformats.org/presentationml/2006/main">
+  <p:cSld name="Quote">
+    <p:spTree>
+      <p:nvGrpSpPr>
+        <p:cNvPr id="1" name="Shape 46"/>
+        <p:cNvGrpSpPr/>
+        <p:nvPr/>
+      </p:nvGrpSpPr>
+      <p:grpSpPr>
+        <a:xfrm>
+          <a:off x="0" y="0"/>
+          <a:ext cx="0" cy="0"/>
+          <a:chOff x="0" y="0"/>
+          <a:chExt cx="0" cy="0"/>
+        </a:xfrm>
+      </p:grpSpPr>
+      <p:sp>
+        <p:nvSpPr>
+          <p:cNvPr id="47" name="Shape 47"/>
+          <p:cNvSpPr txBox="1">
+            <a:spLocks noGrp="1"/>
+          </p:cNvSpPr>
+          <p:nvPr>
+            <p:ph type="body" idx="1"/>
+          </p:nvPr>
+        </p:nvSpPr>
+        <p:spPr>
+          <a:xfrm>
+            <a:off x="892968" y="3355330"/>
+            <a:ext cx="7358100" cy="247800"/>
+          </a:xfrm>
+          <a:prstGeom prst="rect">
+            <a:avLst/>
+          </a:prstGeom>
+          <a:noFill/>
+          <a:ln>
+            <a:noFill/>
+          </a:ln>
+        </p:spPr>
+        <p:txBody>
+          <a:bodyPr lIns="58925" tIns="58925" rIns="58925" bIns="58925" anchor="t" anchorCtr="0"/>
+          <a:lstStyle>
+            <a:lvl1pPr marL="0" marR="0" lvl="0" indent="0" algn="ctr" rtl="0">
+              <a:lnSpc>
+                <a:spcPct val="100000"/>
+              </a:lnSpc>
+              <a:spcBef>
+                <a:spcPts val="0"/>
+              </a:spcBef>
+              <a:spcAft>
+                <a:spcPts val="0"/>
+              </a:spcAft>
+              <a:buClr>
+                <a:srgbClr val="FFFFFF"/>
+              </a:buClr>
+              <a:buFont typeface="Helvetica Neue"/>
+              <a:buNone/>
+              <a:defRPr sz="1500" b="0" i="1" u="none" strike="noStrike" cap="none">
+                <a:solidFill>
+                  <a:srgbClr val="FFFFFF"/>
+                </a:solidFill>
+                <a:latin typeface="Helvetica Neue"/>
+                <a:ea typeface="Helvetica Neue"/>
+                <a:cs typeface="Helvetica Neue"/>
+                <a:sym typeface="Helvetica Neue"/>
+              </a:defRPr>
+            </a:lvl1pPr>
+            <a:lvl2pPr marL="571500" marR="0" lvl="1" indent="-165100" algn="l" rtl="0">
+              <a:lnSpc>
+                <a:spcPct val="100000"/>
+              </a:lnSpc>
+              <a:spcBef>
+                <a:spcPts val="2700"/>
+              </a:spcBef>
+              <a:spcAft>
+                <a:spcPts val="0"/>
+              </a:spcAft>
+              <a:buClr>
+                <a:srgbClr val="FFFFFF"/>
+              </a:buClr>
+              <a:buSzPct val="75000"/>
+              <a:buFont typeface="Helvetica Neue"/>
+              <a:buChar char="•"/>
+              <a:defRPr sz="2400" b="0" i="0" u="none" strike="noStrike" cap="none">
+                <a:solidFill>
+                  <a:srgbClr val="FFFFFF"/>
+                </a:solidFill>
+                <a:latin typeface="Helvetica Neue"/>
+                <a:ea typeface="Helvetica Neue"/>
+                <a:cs typeface="Helvetica Neue"/>
+                <a:sym typeface="Helvetica Neue"/>
+              </a:defRPr>
+            </a:lvl2pPr>
+            <a:lvl3pPr marL="863600" marR="0" lvl="2" indent="-177800" algn="l" rtl="0">
+              <a:lnSpc>
+                <a:spcPct val="100000"/>
+              </a:lnSpc>
+              <a:spcBef>
+                <a:spcPts val="2700"/>
+              </a:spcBef>
+              <a:spcAft>
+                <a:spcPts val="0"/>
+              </a:spcAft>
+              <a:buClr>
+                <a:srgbClr val="FFFFFF"/>
+              </a:buClr>
+              <a:buSzPct val="75000"/>
+              <a:buFont typeface="Helvetica Neue"/>
+              <a:buChar char="•"/>
+              <a:defRPr sz="2400" b="0" i="0" u="none" strike="noStrike" cap="none">
+                <a:solidFill>
+                  <a:srgbClr val="FFFFFF"/>
+                </a:solidFill>
+                <a:latin typeface="Helvetica Neue"/>
+                <a:ea typeface="Helvetica Neue"/>
+                <a:cs typeface="Helvetica Neue"/>
+                <a:sym typeface="Helvetica Neue"/>
+              </a:defRPr>
+            </a:lvl3pPr>
+            <a:lvl4pPr marL="1143000" marR="0" lvl="3" indent="-165100" algn="l" rtl="0">
+              <a:lnSpc>
+                <a:spcPct val="100000"/>
+              </a:lnSpc>
+              <a:spcBef>
+                <a:spcPts val="2700"/>
+              </a:spcBef>
+              <a:spcAft>
+                <a:spcPts val="0"/>
+              </a:spcAft>
+              <a:buClr>
+                <a:srgbClr val="FFFFFF"/>
+              </a:buClr>
+              <a:buSzPct val="75000"/>
+              <a:buFont typeface="Helvetica Neue"/>
+              <a:buChar char="•"/>
+              <a:defRPr sz="2400" b="0" i="0" u="none" strike="noStrike" cap="none">
+                <a:solidFill>
+                  <a:srgbClr val="FFFFFF"/>
+                </a:solidFill>
+                <a:latin typeface="Helvetica Neue"/>
+                <a:ea typeface="Helvetica Neue"/>
+                <a:cs typeface="Helvetica Neue"/>
+                <a:sym typeface="Helvetica Neue"/>
+              </a:defRPr>
+            </a:lvl4pPr>
+            <a:lvl5pPr marL="1435100" marR="0" lvl="4" indent="-177800" algn="l" rtl="0">
+              <a:lnSpc>
+                <a:spcPct val="100000"/>
+              </a:lnSpc>
+              <a:spcBef>
+                <a:spcPts val="2700"/>
+              </a:spcBef>
+              <a:spcAft>
+                <a:spcPts val="0"/>
+              </a:spcAft>
+              <a:buClr>
+                <a:srgbClr val="FFFFFF"/>
+              </a:buClr>
+              <a:buSzPct val="75000"/>
+              <a:buFont typeface="Helvetica Neue"/>
+              <a:buChar char="•"/>
+              <a:defRPr sz="2400" b="0" i="0" u="none" strike="noStrike" cap="none">
+                <a:solidFill>
+                  <a:srgbClr val="FFFFFF"/>
+                </a:solidFill>
+                <a:latin typeface="Helvetica Neue"/>
+                <a:ea typeface="Helvetica Neue"/>
+                <a:cs typeface="Helvetica Neue"/>
+                <a:sym typeface="Helvetica Neue"/>
+              </a:defRPr>
+            </a:lvl5pPr>
+            <a:lvl6pPr marL="1714500" marR="0" lvl="5" indent="-165100" algn="l" rtl="0">
+              <a:lnSpc>
+                <a:spcPct val="100000"/>
+              </a:lnSpc>
+              <a:spcBef>
+                <a:spcPts val="2700"/>
+              </a:spcBef>
+              <a:spcAft>
+                <a:spcPts val="0"/>
+              </a:spcAft>
+              <a:buClr>
+                <a:srgbClr val="FFFFFF"/>
+              </a:buClr>
+              <a:buSzPct val="75000"/>
+              <a:buFont typeface="Helvetica Neue"/>
+              <a:buChar char="•"/>
+              <a:defRPr sz="2400" b="0" i="0" u="none" strike="noStrike" cap="none">
+                <a:solidFill>
+                  <a:srgbClr val="FFFFFF"/>
+                </a:solidFill>
+                <a:latin typeface="Helvetica Neue"/>
+                <a:ea typeface="Helvetica Neue"/>
+                <a:cs typeface="Helvetica Neue"/>
+                <a:sym typeface="Helvetica Neue"/>
+              </a:defRPr>
+            </a:lvl6pPr>
+            <a:lvl7pPr marL="2006600" marR="0" lvl="6" indent="-165100" algn="l" rtl="0">
+              <a:lnSpc>
+                <a:spcPct val="100000"/>
+              </a:lnSpc>
+              <a:spcBef>
+                <a:spcPts val="2700"/>
+              </a:spcBef>
+              <a:spcAft>
+                <a:spcPts val="0"/>
+              </a:spcAft>
+              <a:buClr>
+                <a:srgbClr val="FFFFFF"/>
+              </a:buClr>
+              <a:buSzPct val="75000"/>
+              <a:buFont typeface="Helvetica Neue"/>
+              <a:buChar char="•"/>
+              <a:defRPr sz="2400" b="0" i="0" u="none" strike="noStrike" cap="none">
+                <a:solidFill>
+                  <a:srgbClr val="FFFFFF"/>
+                </a:solidFill>
+                <a:latin typeface="Helvetica Neue"/>
+                <a:ea typeface="Helvetica Neue"/>
+                <a:cs typeface="Helvetica Neue"/>
+                <a:sym typeface="Helvetica Neue"/>
+              </a:defRPr>
+            </a:lvl7pPr>
+            <a:lvl8pPr marL="2286000" marR="0" lvl="7" indent="-165100" algn="l" rtl="0">
+              <a:lnSpc>
+                <a:spcPct val="100000"/>
+              </a:lnSpc>
+              <a:spcBef>
+                <a:spcPts val="2700"/>
+              </a:spcBef>
+              <a:spcAft>
+                <a:spcPts val="0"/>
+              </a:spcAft>
+              <a:buClr>
+                <a:srgbClr val="FFFFFF"/>
+              </a:buClr>
+              <a:buSzPct val="75000"/>
+              <a:buFont typeface="Helvetica Neue"/>
+              <a:buChar char="•"/>
+              <a:defRPr sz="2400" b="0" i="0" u="none" strike="noStrike" cap="none">
+                <a:solidFill>
+                  <a:srgbClr val="FFFFFF"/>
+                </a:solidFill>
+                <a:latin typeface="Helvetica Neue"/>
+                <a:ea typeface="Helvetica Neue"/>
+                <a:cs typeface="Helvetica Neue"/>
+                <a:sym typeface="Helvetica Neue"/>
+              </a:defRPr>
+            </a:lvl8pPr>
+            <a:lvl9pPr marL="2578100" marR="0" lvl="8" indent="-165100" algn="l" rtl="0">
+              <a:lnSpc>
+                <a:spcPct val="100000"/>
+              </a:lnSpc>
+              <a:spcBef>
+                <a:spcPts val="2700"/>
+              </a:spcBef>
+              <a:spcAft>
+                <a:spcPts val="0"/>
+              </a:spcAft>
+              <a:buClr>
+                <a:srgbClr val="FFFFFF"/>
+              </a:buClr>
+              <a:buSzPct val="75000"/>
+              <a:buFont typeface="Helvetica Neue"/>
+              <a:buChar char="•"/>
+              <a:defRPr sz="2400" b="0" i="0" u="none" strike="noStrike" cap="none">
+                <a:solidFill>
+                  <a:srgbClr val="FFFFFF"/>
+                </a:solidFill>
+                <a:latin typeface="Helvetica Neue"/>
+                <a:ea typeface="Helvetica Neue"/>
+                <a:cs typeface="Helvetica Neue"/>
+                <a:sym typeface="Helvetica Neue"/>
+              </a:defRPr>
+            </a:lvl9pPr>
+          </a:lstStyle>
+          <a:p>
+            <a:endParaRPr/>
+          </a:p>
+        </p:txBody>
+      </p:sp>
+      <p:sp>
+        <p:nvSpPr>
+          <p:cNvPr id="48" name="Shape 48"/>
+          <p:cNvSpPr txBox="1">
+            <a:spLocks noGrp="1"/>
+          </p:cNvSpPr>
+          <p:nvPr>
+            <p:ph type="body" idx="2"/>
+          </p:nvPr>
+        </p:nvSpPr>
+        <p:spPr>
+          <a:xfrm>
+            <a:off x="892968" y="2250281"/>
+            <a:ext cx="7358100" cy="361800"/>
+          </a:xfrm>
+          <a:prstGeom prst="rect">
+            <a:avLst/>
+          </a:prstGeom>
+          <a:noFill/>
+          <a:ln>
+            <a:noFill/>
+          </a:ln>
+        </p:spPr>
+        <p:txBody>
+          <a:bodyPr lIns="58925" tIns="58925" rIns="58925" bIns="58925" anchor="ctr" anchorCtr="0"/>
+          <a:lstStyle>
+            <a:lvl1pPr marL="0" marR="0" lvl="0" indent="0" algn="ctr" rtl="0">
+              <a:lnSpc>
+                <a:spcPct val="100000"/>
+              </a:lnSpc>
+              <a:spcBef>
+                <a:spcPts val="0"/>
+              </a:spcBef>
+              <a:spcAft>
+                <a:spcPts val="0"/>
+              </a:spcAft>
+              <a:buClr>
+                <a:srgbClr val="FFFFFF"/>
+              </a:buClr>
+              <a:buFont typeface="Helvetica Neue"/>
+              <a:buNone/>
+              <a:defRPr sz="2400" b="0" i="0" u="none" strike="noStrike" cap="none">
+                <a:solidFill>
+                  <a:srgbClr val="FFFFFF"/>
+                </a:solidFill>
+                <a:latin typeface="Helvetica Neue"/>
+                <a:ea typeface="Helvetica Neue"/>
+                <a:cs typeface="Helvetica Neue"/>
+                <a:sym typeface="Helvetica Neue"/>
+              </a:defRPr>
+            </a:lvl1pPr>
+            <a:lvl2pPr marL="571500" marR="0" lvl="1" indent="-165100" algn="l" rtl="0">
+              <a:lnSpc>
+                <a:spcPct val="100000"/>
+              </a:lnSpc>
+              <a:spcBef>
+                <a:spcPts val="2700"/>
+              </a:spcBef>
+              <a:spcAft>
+                <a:spcPts val="0"/>
+              </a:spcAft>
+              <a:buClr>
+                <a:srgbClr val="FFFFFF"/>
+              </a:buClr>
+              <a:buSzPct val="75000"/>
+              <a:buFont typeface="Helvetica Neue"/>
+              <a:buChar char="•"/>
+              <a:defRPr sz="2400" b="0" i="0" u="none" strike="noStrike" cap="none">
+                <a:solidFill>
+                  <a:srgbClr val="FFFFFF"/>
+                </a:solidFill>
+                <a:latin typeface="Helvetica Neue"/>
+                <a:ea typeface="Helvetica Neue"/>
+                <a:cs typeface="Helvetica Neue"/>
+                <a:sym typeface="Helvetica Neue"/>
+              </a:defRPr>
+            </a:lvl2pPr>
+            <a:lvl3pPr marL="863600" marR="0" lvl="2" indent="-177800" algn="l" rtl="0">
+              <a:lnSpc>
+                <a:spcPct val="100000"/>
+              </a:lnSpc>
+              <a:spcBef>
+                <a:spcPts val="2700"/>
+              </a:spcBef>
+              <a:spcAft>
+                <a:spcPts val="0"/>
+              </a:spcAft>
+              <a:buClr>
+                <a:srgbClr val="FFFFFF"/>
+              </a:buClr>
+              <a:buSzPct val="75000"/>
+              <a:buFont typeface="Helvetica Neue"/>
+              <a:buChar char="•"/>
+              <a:defRPr sz="2400" b="0" i="0" u="none" strike="noStrike" cap="none">
+                <a:solidFill>
+                  <a:srgbClr val="FFFFFF"/>
+                </a:solidFill>
+                <a:latin typeface="Helvetica Neue"/>
+                <a:ea typeface="Helvetica Neue"/>
+                <a:cs typeface="Helvetica Neue"/>
+                <a:sym typeface="Helvetica Neue"/>
+              </a:defRPr>
+            </a:lvl3pPr>
+            <a:lvl4pPr marL="1143000" marR="0" lvl="3" indent="-165100" algn="l" rtl="0">
+              <a:lnSpc>
+                <a:spcPct val="100000"/>
+              </a:lnSpc>
+              <a:spcBef>
+                <a:spcPts val="2700"/>
+              </a:spcBef>
+              <a:spcAft>
+                <a:spcPts val="0"/>
+              </a:spcAft>
+              <a:buClr>
+                <a:srgbClr val="FFFFFF"/>
+              </a:buClr>
+              <a:buSzPct val="75000"/>
+              <a:buFont typeface="Helvetica Neue"/>
+              <a:buChar char="•"/>
+              <a:defRPr sz="2400" b="0" i="0" u="none" strike="noStrike" cap="none">
+                <a:solidFill>
+                  <a:srgbClr val="FFFFFF"/>
+                </a:solidFill>
+                <a:latin typeface="Helvetica Neue"/>
+                <a:ea typeface="Helvetica Neue"/>
+                <a:cs typeface="Helvetica Neue"/>
+                <a:sym typeface="Helvetica Neue"/>
+              </a:defRPr>
+            </a:lvl4pPr>
+            <a:lvl5pPr marL="1435100" marR="0" lvl="4" indent="-177800" algn="l" rtl="0">
+              <a:lnSpc>
+                <a:spcPct val="100000"/>
+              </a:lnSpc>
+              <a:spcBef>
+                <a:spcPts val="2700"/>
+              </a:spcBef>
+              <a:spcAft>
+                <a:spcPts val="0"/>
+              </a:spcAft>
+              <a:buClr>
+                <a:srgbClr val="FFFFFF"/>
+              </a:buClr>
+              <a:buSzPct val="75000"/>
+              <a:buFont typeface="Helvetica Neue"/>
+              <a:buChar char="•"/>
+              <a:defRPr sz="2400" b="0" i="0" u="none" strike="noStrike" cap="none">
+                <a:solidFill>
+                  <a:srgbClr val="FFFFFF"/>
+                </a:solidFill>
+                <a:latin typeface="Helvetica Neue"/>
+                <a:ea typeface="Helvetica Neue"/>
+                <a:cs typeface="Helvetica Neue"/>
+                <a:sym typeface="Helvetica Neue"/>
+              </a:defRPr>
+            </a:lvl5pPr>
+            <a:lvl6pPr marL="1714500" marR="0" lvl="5" indent="-165100" algn="l" rtl="0">
+              <a:lnSpc>
+                <a:spcPct val="100000"/>
+              </a:lnSpc>
+              <a:spcBef>
+                <a:spcPts val="2700"/>
+              </a:spcBef>
+              <a:spcAft>
+                <a:spcPts val="0"/>
+              </a:spcAft>
+              <a:buClr>
+                <a:srgbClr val="FFFFFF"/>
+              </a:buClr>
+              <a:buSzPct val="75000"/>
+              <a:buFont typeface="Helvetica Neue"/>
+              <a:buChar char="•"/>
+              <a:defRPr sz="2400" b="0" i="0" u="none" strike="noStrike" cap="none">
+                <a:solidFill>
+                  <a:srgbClr val="FFFFFF"/>
+                </a:solidFill>
+                <a:latin typeface="Helvetica Neue"/>
+                <a:ea typeface="Helvetica Neue"/>
+                <a:cs typeface="Helvetica Neue"/>
+                <a:sym typeface="Helvetica Neue"/>
+              </a:defRPr>
+            </a:lvl6pPr>
+            <a:lvl7pPr marL="2006600" marR="0" lvl="6" indent="-165100" algn="l" rtl="0">
+              <a:lnSpc>
+                <a:spcPct val="100000"/>
+              </a:lnSpc>
+              <a:spcBef>
+                <a:spcPts val="2700"/>
+              </a:spcBef>
+              <a:spcAft>
+                <a:spcPts val="0"/>
+              </a:spcAft>
+              <a:buClr>
+                <a:srgbClr val="FFFFFF"/>
+              </a:buClr>
+              <a:buSzPct val="75000"/>
+              <a:buFont typeface="Helvetica Neue"/>
+              <a:buChar char="•"/>
+              <a:defRPr sz="2400" b="0" i="0" u="none" strike="noStrike" cap="none">
+                <a:solidFill>
+                  <a:srgbClr val="FFFFFF"/>
+                </a:solidFill>
+                <a:latin typeface="Helvetica Neue"/>
+                <a:ea typeface="Helvetica Neue"/>
+                <a:cs typeface="Helvetica Neue"/>
+                <a:sym typeface="Helvetica Neue"/>
+              </a:defRPr>
+            </a:lvl7pPr>
+            <a:lvl8pPr marL="2286000" marR="0" lvl="7" indent="-165100" algn="l" rtl="0">
+              <a:lnSpc>
+                <a:spcPct val="100000"/>
+              </a:lnSpc>
+              <a:spcBef>
+                <a:spcPts val="2700"/>
+              </a:spcBef>
+              <a:spcAft>
+                <a:spcPts val="0"/>
+              </a:spcAft>
+              <a:buClr>
+                <a:srgbClr val="FFFFFF"/>
+              </a:buClr>
+              <a:buSzPct val="75000"/>
+              <a:buFont typeface="Helvetica Neue"/>
+              <a:buChar char="•"/>
+              <a:defRPr sz="2400" b="0" i="0" u="none" strike="noStrike" cap="none">
+                <a:solidFill>
+                  <a:srgbClr val="FFFFFF"/>
+                </a:solidFill>
+                <a:latin typeface="Helvetica Neue"/>
+                <a:ea typeface="Helvetica Neue"/>
+                <a:cs typeface="Helvetica Neue"/>
+                <a:sym typeface="Helvetica Neue"/>
+              </a:defRPr>
+            </a:lvl8pPr>
+            <a:lvl9pPr marL="2578100" marR="0" lvl="8" indent="-165100" algn="l" rtl="0">
+              <a:lnSpc>
+                <a:spcPct val="100000"/>
+              </a:lnSpc>
+              <a:spcBef>
+                <a:spcPts val="2700"/>
+              </a:spcBef>
+              <a:spcAft>
+                <a:spcPts val="0"/>
+              </a:spcAft>
+              <a:buClr>
+                <a:srgbClr val="FFFFFF"/>
+              </a:buClr>
+              <a:buSzPct val="75000"/>
+              <a:buFont typeface="Helvetica Neue"/>
+              <a:buChar char="•"/>
+              <a:defRPr sz="2400" b="0" i="0" u="none" strike="noStrike" cap="none">
+                <a:solidFill>
+                  <a:srgbClr val="FFFFFF"/>
+                </a:solidFill>
+                <a:latin typeface="Helvetica Neue"/>
+                <a:ea typeface="Helvetica Neue"/>
+                <a:cs typeface="Helvetica Neue"/>
+                <a:sym typeface="Helvetica Neue"/>
+              </a:defRPr>
+            </a:lvl9pPr>
+          </a:lstStyle>
+          <a:p>
+            <a:endParaRPr/>
+          </a:p>
+        </p:txBody>
+      </p:sp>
+      <p:sp>
+        <p:nvSpPr>
+          <p:cNvPr id="49" name="Shape 49"/>
           <p:cNvSpPr txBox="1">
             <a:spLocks noGrp="1"/>
           </p:cNvSpPr>
@@ -14089,16 +12810,15 @@
     <p:sldLayoutId id="2147483648" r:id="rId1"/>
     <p:sldLayoutId id="2147483649" r:id="rId2"/>
     <p:sldLayoutId id="2147483650" r:id="rId3"/>
-    <p:sldLayoutId id="2147483651" r:id="rId4"/>
-    <p:sldLayoutId id="2147483652" r:id="rId5"/>
-    <p:sldLayoutId id="2147483653" r:id="rId6"/>
-    <p:sldLayoutId id="2147483654" r:id="rId7"/>
-    <p:sldLayoutId id="2147483655" r:id="rId8"/>
-    <p:sldLayoutId id="2147483656" r:id="rId9"/>
-    <p:sldLayoutId id="2147483657" r:id="rId10"/>
-    <p:sldLayoutId id="2147483658" r:id="rId11"/>
-    <p:sldLayoutId id="2147483659" r:id="rId12"/>
-    <p:sldLayoutId id="2147483661" r:id="rId13"/>
+    <p:sldLayoutId id="2147483652" r:id="rId4"/>
+    <p:sldLayoutId id="2147483653" r:id="rId5"/>
+    <p:sldLayoutId id="2147483654" r:id="rId6"/>
+    <p:sldLayoutId id="2147483655" r:id="rId7"/>
+    <p:sldLayoutId id="2147483656" r:id="rId8"/>
+    <p:sldLayoutId id="2147483657" r:id="rId9"/>
+    <p:sldLayoutId id="2147483658" r:id="rId10"/>
+    <p:sldLayoutId id="2147483659" r:id="rId11"/>
+    <p:sldLayoutId id="2147483661" r:id="rId12"/>
   </p:sldLayoutIdLst>
   <p:hf sldNum="0" hdr="0" ftr="0" dt="0"/>
   <p:txStyles>
@@ -27888,15 +26608,7 @@
                   <a:srgbClr val="C00000"/>
                 </a:solidFill>
               </a:rPr>
-              <a:t>Set</a:t>
-            </a:r>
-            <a:r>
-              <a:rPr lang="en-US" dirty="0" smtClean="0">
-                <a:solidFill>
-                  <a:srgbClr val="C00000"/>
-                </a:solidFill>
-              </a:rPr>
-              <a:t>( )</a:t>
+              <a:t>Set( )</a:t>
             </a:r>
             <a:r>
               <a:rPr lang="en-US" dirty="0" smtClean="0"/>
@@ -28869,590 +27581,6 @@
 </p:sld>
 </file>
 
-<file path=ppt/slides/slide36.xml><?xml version="1.0" encoding="utf-8"?>
-<p:sld xmlns:a="http://schemas.openxmlformats.org/drawingml/2006/main" xmlns:r="http://schemas.openxmlformats.org/officeDocument/2006/relationships" xmlns:p="http://schemas.openxmlformats.org/presentationml/2006/main">
-  <p:cSld>
-    <p:spTree>
-      <p:nvGrpSpPr>
-        <p:cNvPr id="1" name="Shape 252"/>
-        <p:cNvGrpSpPr/>
-        <p:nvPr/>
-      </p:nvGrpSpPr>
-      <p:grpSpPr>
-        <a:xfrm>
-          <a:off x="0" y="0"/>
-          <a:ext cx="0" cy="0"/>
-          <a:chOff x="0" y="0"/>
-          <a:chExt cx="0" cy="0"/>
-        </a:xfrm>
-      </p:grpSpPr>
-      <p:pic>
-        <p:nvPicPr>
-          <p:cNvPr id="253" name="Shape 253"/>
-          <p:cNvPicPr preferRelativeResize="0"/>
-          <p:nvPr/>
-        </p:nvPicPr>
-        <p:blipFill rotWithShape="1">
-          <a:blip r:embed="rId3">
-            <a:alphaModFix/>
-          </a:blip>
-          <a:srcRect/>
-          <a:stretch/>
-        </p:blipFill>
-        <p:spPr>
-          <a:xfrm>
-            <a:off x="1714500" y="1500187"/>
-            <a:ext cx="5715000" cy="2143200"/>
-          </a:xfrm>
-          <a:prstGeom prst="rect">
-            <a:avLst/>
-          </a:prstGeom>
-          <a:noFill/>
-          <a:ln>
-            <a:noFill/>
-          </a:ln>
-        </p:spPr>
-      </p:pic>
-    </p:spTree>
-  </p:cSld>
-  <p:clrMapOvr>
-    <a:masterClrMapping/>
-  </p:clrMapOvr>
-  <p:timing>
-    <p:tnLst>
-      <p:par>
-        <p:cTn id="1" dur="indefinite" restart="never" nodeType="tmRoot"/>
-      </p:par>
-    </p:tnLst>
-  </p:timing>
-</p:sld>
-</file>
-
-<file path=ppt/slides/slide37.xml><?xml version="1.0" encoding="utf-8"?>
-<p:sld xmlns:a="http://schemas.openxmlformats.org/drawingml/2006/main" xmlns:r="http://schemas.openxmlformats.org/officeDocument/2006/relationships" xmlns:p="http://schemas.openxmlformats.org/presentationml/2006/main">
-  <p:cSld>
-    <p:spTree>
-      <p:nvGrpSpPr>
-        <p:cNvPr id="1" name="Shape 257"/>
-        <p:cNvGrpSpPr/>
-        <p:nvPr/>
-      </p:nvGrpSpPr>
-      <p:grpSpPr>
-        <a:xfrm>
-          <a:off x="0" y="0"/>
-          <a:ext cx="0" cy="0"/>
-          <a:chOff x="0" y="0"/>
-          <a:chExt cx="0" cy="0"/>
-        </a:xfrm>
-      </p:grpSpPr>
-      <p:sp>
-        <p:nvSpPr>
-          <p:cNvPr id="258" name="Shape 258"/>
-          <p:cNvSpPr txBox="1">
-            <a:spLocks noGrp="1"/>
-          </p:cNvSpPr>
-          <p:nvPr>
-            <p:ph type="title"/>
-          </p:nvPr>
-        </p:nvSpPr>
-        <p:spPr>
-          <a:xfrm>
-            <a:off x="892968" y="1701105"/>
-            <a:ext cx="7358100" cy="1741200"/>
-          </a:xfrm>
-          <a:prstGeom prst="rect">
-            <a:avLst/>
-          </a:prstGeom>
-          <a:noFill/>
-          <a:ln>
-            <a:noFill/>
-          </a:ln>
-        </p:spPr>
-        <p:txBody>
-          <a:bodyPr lIns="32750" tIns="32750" rIns="32750" bIns="32750" anchor="ctr" anchorCtr="0">
-            <a:noAutofit/>
-          </a:bodyPr>
-          <a:lstStyle/>
-          <a:p>
-            <a:pPr marL="0" marR="0" lvl="0" indent="0" algn="ctr" rtl="0">
-              <a:lnSpc>
-                <a:spcPct val="100000"/>
-              </a:lnSpc>
-              <a:spcBef>
-                <a:spcPts val="0"/>
-              </a:spcBef>
-              <a:spcAft>
-                <a:spcPts val="0"/>
-              </a:spcAft>
-              <a:buClr>
-                <a:srgbClr val="FFFFFF"/>
-              </a:buClr>
-              <a:buSzPct val="25000"/>
-              <a:buFont typeface="Helvetica Neue"/>
-              <a:buNone/>
-            </a:pPr>
-            <a:r>
-              <a:rPr lang="en-US" sz="4500" b="0" i="0" u="none" strike="noStrike" cap="none">
-                <a:solidFill>
-                  <a:srgbClr val="FFFFFF"/>
-                </a:solidFill>
-                <a:latin typeface="Helvetica Neue"/>
-                <a:ea typeface="Helvetica Neue"/>
-                <a:cs typeface="Helvetica Neue"/>
-                <a:sym typeface="Helvetica Neue"/>
-              </a:rPr>
-              <a:t>Node.js provides a JavaScript runtime environment </a:t>
-            </a:r>
-          </a:p>
-        </p:txBody>
-      </p:sp>
-    </p:spTree>
-  </p:cSld>
-  <p:clrMapOvr>
-    <a:masterClrMapping/>
-  </p:clrMapOvr>
-  <p:timing>
-    <p:tnLst>
-      <p:par>
-        <p:cTn id="1" dur="indefinite" restart="never" nodeType="tmRoot"/>
-      </p:par>
-    </p:tnLst>
-  </p:timing>
-</p:sld>
-</file>
-
-<file path=ppt/slides/slide38.xml><?xml version="1.0" encoding="utf-8"?>
-<p:sld xmlns:a="http://schemas.openxmlformats.org/drawingml/2006/main" xmlns:r="http://schemas.openxmlformats.org/officeDocument/2006/relationships" xmlns:p="http://schemas.openxmlformats.org/presentationml/2006/main">
-  <p:cSld>
-    <p:spTree>
-      <p:nvGrpSpPr>
-        <p:cNvPr id="1" name="Shape 262"/>
-        <p:cNvGrpSpPr/>
-        <p:nvPr/>
-      </p:nvGrpSpPr>
-      <p:grpSpPr>
-        <a:xfrm>
-          <a:off x="0" y="0"/>
-          <a:ext cx="0" cy="0"/>
-          <a:chOff x="0" y="0"/>
-          <a:chExt cx="0" cy="0"/>
-        </a:xfrm>
-      </p:grpSpPr>
-      <p:sp>
-        <p:nvSpPr>
-          <p:cNvPr id="263" name="Shape 263"/>
-          <p:cNvSpPr txBox="1">
-            <a:spLocks noGrp="1"/>
-          </p:cNvSpPr>
-          <p:nvPr>
-            <p:ph type="title"/>
-          </p:nvPr>
-        </p:nvSpPr>
-        <p:spPr>
-          <a:xfrm>
-            <a:off x="669726" y="133945"/>
-            <a:ext cx="7804500" cy="1138500"/>
-          </a:xfrm>
-          <a:prstGeom prst="rect">
-            <a:avLst/>
-          </a:prstGeom>
-          <a:noFill/>
-          <a:ln>
-            <a:noFill/>
-          </a:ln>
-        </p:spPr>
-        <p:txBody>
-          <a:bodyPr lIns="32750" tIns="32750" rIns="32750" bIns="32750" anchor="ctr" anchorCtr="0">
-            <a:noAutofit/>
-          </a:bodyPr>
-          <a:lstStyle/>
-          <a:p>
-            <a:pPr marL="0" marR="0" lvl="0" indent="0" algn="ctr" rtl="0">
-              <a:lnSpc>
-                <a:spcPct val="100000"/>
-              </a:lnSpc>
-              <a:spcBef>
-                <a:spcPts val="0"/>
-              </a:spcBef>
-              <a:spcAft>
-                <a:spcPts val="0"/>
-              </a:spcAft>
-              <a:buClr>
-                <a:srgbClr val="FFFFFF"/>
-              </a:buClr>
-              <a:buSzPct val="25000"/>
-              <a:buFont typeface="Helvetica Neue"/>
-              <a:buNone/>
-            </a:pPr>
-            <a:r>
-              <a:rPr lang="en-US" sz="5200" b="0" i="0" u="none" strike="noStrike" cap="none">
-                <a:solidFill>
-                  <a:srgbClr val="FFFFFF"/>
-                </a:solidFill>
-                <a:latin typeface="Helvetica Neue"/>
-                <a:ea typeface="Helvetica Neue"/>
-                <a:cs typeface="Helvetica Neue"/>
-                <a:sym typeface="Helvetica Neue"/>
-              </a:rPr>
-              <a:t>Goals</a:t>
-            </a:r>
-          </a:p>
-        </p:txBody>
-      </p:sp>
-      <p:sp>
-        <p:nvSpPr>
-          <p:cNvPr id="264" name="Shape 264"/>
-          <p:cNvSpPr txBox="1">
-            <a:spLocks noGrp="1"/>
-          </p:cNvSpPr>
-          <p:nvPr>
-            <p:ph type="body" idx="1"/>
-          </p:nvPr>
-        </p:nvSpPr>
-        <p:spPr>
-          <a:xfrm>
-            <a:off x="669726" y="1366242"/>
-            <a:ext cx="7804500" cy="3315000"/>
-          </a:xfrm>
-          <a:prstGeom prst="rect">
-            <a:avLst/>
-          </a:prstGeom>
-          <a:noFill/>
-          <a:ln>
-            <a:noFill/>
-          </a:ln>
-        </p:spPr>
-        <p:txBody>
-          <a:bodyPr lIns="32750" tIns="32750" rIns="32750" bIns="32750" anchor="ctr" anchorCtr="0">
-            <a:noAutofit/>
-          </a:bodyPr>
-          <a:lstStyle/>
-          <a:p>
-            <a:pPr marL="292100" marR="0" lvl="0" indent="-292100" algn="l" rtl="0">
-              <a:lnSpc>
-                <a:spcPct val="100000"/>
-              </a:lnSpc>
-              <a:spcBef>
-                <a:spcPts val="0"/>
-              </a:spcBef>
-              <a:spcAft>
-                <a:spcPts val="0"/>
-              </a:spcAft>
-              <a:buClr>
-                <a:srgbClr val="FFFFFF"/>
-              </a:buClr>
-              <a:buSzPct val="75000"/>
-              <a:buFont typeface="Helvetica Neue"/>
-              <a:buChar char="•"/>
-            </a:pPr>
-            <a:r>
-              <a:rPr lang="en-US" sz="2400" b="0" i="0" u="none" strike="noStrike" cap="none">
-                <a:solidFill>
-                  <a:srgbClr val="FFFFFF"/>
-                </a:solidFill>
-                <a:latin typeface="Helvetica Neue"/>
-                <a:ea typeface="Helvetica Neue"/>
-                <a:cs typeface="Helvetica Neue"/>
-                <a:sym typeface="Helvetica Neue"/>
-              </a:rPr>
-              <a:t>Provide a JavaScript runtime environment</a:t>
-            </a:r>
-          </a:p>
-          <a:p>
-            <a:pPr marL="292100" marR="0" lvl="0" indent="-292100" algn="l" rtl="0">
-              <a:lnSpc>
-                <a:spcPct val="100000"/>
-              </a:lnSpc>
-              <a:spcBef>
-                <a:spcPts val="2700"/>
-              </a:spcBef>
-              <a:spcAft>
-                <a:spcPts val="0"/>
-              </a:spcAft>
-              <a:buClr>
-                <a:srgbClr val="FFFFFF"/>
-              </a:buClr>
-              <a:buSzPct val="75000"/>
-              <a:buFont typeface="Helvetica Neue"/>
-              <a:buChar char="•"/>
-            </a:pPr>
-            <a:r>
-              <a:rPr lang="en-US" sz="2400" b="0" i="0" u="none" strike="noStrike" cap="none">
-                <a:solidFill>
-                  <a:srgbClr val="FFFFFF"/>
-                </a:solidFill>
-                <a:latin typeface="Helvetica Neue"/>
-                <a:ea typeface="Helvetica Neue"/>
-                <a:cs typeface="Helvetica Neue"/>
-                <a:sym typeface="Helvetica Neue"/>
-              </a:rPr>
-              <a:t>Event-driven, non-blocking I/O</a:t>
-            </a:r>
-          </a:p>
-          <a:p>
-            <a:pPr marL="292100" marR="0" lvl="0" indent="-292100" algn="l" rtl="0">
-              <a:lnSpc>
-                <a:spcPct val="100000"/>
-              </a:lnSpc>
-              <a:spcBef>
-                <a:spcPts val="2700"/>
-              </a:spcBef>
-              <a:spcAft>
-                <a:spcPts val="0"/>
-              </a:spcAft>
-              <a:buClr>
-                <a:srgbClr val="FFFFFF"/>
-              </a:buClr>
-              <a:buSzPct val="75000"/>
-              <a:buFont typeface="Helvetica Neue"/>
-              <a:buChar char="•"/>
-            </a:pPr>
-            <a:r>
-              <a:rPr lang="en-US" sz="2400" b="0" i="0" u="none" strike="noStrike" cap="none">
-                <a:solidFill>
-                  <a:srgbClr val="FFFFFF"/>
-                </a:solidFill>
-                <a:latin typeface="Helvetica Neue"/>
-                <a:ea typeface="Helvetica Neue"/>
-                <a:cs typeface="Helvetica Neue"/>
-                <a:sym typeface="Helvetica Neue"/>
-              </a:rPr>
-              <a:t>fast/lightweight</a:t>
-            </a:r>
-          </a:p>
-        </p:txBody>
-      </p:sp>
-    </p:spTree>
-  </p:cSld>
-  <p:clrMapOvr>
-    <a:masterClrMapping/>
-  </p:clrMapOvr>
-  <p:timing>
-    <p:tnLst>
-      <p:par>
-        <p:cTn id="1" dur="indefinite" restart="never" nodeType="tmRoot"/>
-      </p:par>
-    </p:tnLst>
-  </p:timing>
-</p:sld>
-</file>
-
-<file path=ppt/slides/slide39.xml><?xml version="1.0" encoding="utf-8"?>
-<p:sld xmlns:a="http://schemas.openxmlformats.org/drawingml/2006/main" xmlns:r="http://schemas.openxmlformats.org/officeDocument/2006/relationships" xmlns:p="http://schemas.openxmlformats.org/presentationml/2006/main">
-  <p:cSld>
-    <p:spTree>
-      <p:nvGrpSpPr>
-        <p:cNvPr id="1" name="Shape 268"/>
-        <p:cNvGrpSpPr/>
-        <p:nvPr/>
-      </p:nvGrpSpPr>
-      <p:grpSpPr>
-        <a:xfrm>
-          <a:off x="0" y="0"/>
-          <a:ext cx="0" cy="0"/>
-          <a:chOff x="0" y="0"/>
-          <a:chExt cx="0" cy="0"/>
-        </a:xfrm>
-      </p:grpSpPr>
-      <p:sp>
-        <p:nvSpPr>
-          <p:cNvPr id="269" name="Shape 269"/>
-          <p:cNvSpPr txBox="1">
-            <a:spLocks noGrp="1"/>
-          </p:cNvSpPr>
-          <p:nvPr>
-            <p:ph type="title"/>
-          </p:nvPr>
-        </p:nvSpPr>
-        <p:spPr>
-          <a:xfrm>
-            <a:off x="669726" y="133945"/>
-            <a:ext cx="7804500" cy="1138500"/>
-          </a:xfrm>
-          <a:prstGeom prst="rect">
-            <a:avLst/>
-          </a:prstGeom>
-          <a:noFill/>
-          <a:ln>
-            <a:noFill/>
-          </a:ln>
-        </p:spPr>
-        <p:txBody>
-          <a:bodyPr lIns="32750" tIns="32750" rIns="32750" bIns="32750" anchor="ctr" anchorCtr="0">
-            <a:noAutofit/>
-          </a:bodyPr>
-          <a:lstStyle/>
-          <a:p>
-            <a:pPr marL="0" marR="0" lvl="0" indent="0" algn="ctr" rtl="0">
-              <a:lnSpc>
-                <a:spcPct val="100000"/>
-              </a:lnSpc>
-              <a:spcBef>
-                <a:spcPts val="0"/>
-              </a:spcBef>
-              <a:spcAft>
-                <a:spcPts val="0"/>
-              </a:spcAft>
-              <a:buClr>
-                <a:srgbClr val="FFFFFF"/>
-              </a:buClr>
-              <a:buSzPct val="25000"/>
-              <a:buFont typeface="Helvetica Neue"/>
-              <a:buNone/>
-            </a:pPr>
-            <a:r>
-              <a:rPr lang="en-US" sz="5200" b="0" i="0" u="none" strike="noStrike" cap="none">
-                <a:solidFill>
-                  <a:srgbClr val="FFFFFF"/>
-                </a:solidFill>
-                <a:latin typeface="Helvetica Neue"/>
-                <a:ea typeface="Helvetica Neue"/>
-                <a:cs typeface="Helvetica Neue"/>
-                <a:sym typeface="Helvetica Neue"/>
-              </a:rPr>
-              <a:t>Applications</a:t>
-            </a:r>
-          </a:p>
-        </p:txBody>
-      </p:sp>
-      <p:sp>
-        <p:nvSpPr>
-          <p:cNvPr id="270" name="Shape 270"/>
-          <p:cNvSpPr txBox="1">
-            <a:spLocks noGrp="1"/>
-          </p:cNvSpPr>
-          <p:nvPr>
-            <p:ph type="body" idx="1"/>
-          </p:nvPr>
-        </p:nvSpPr>
-        <p:spPr>
-          <a:xfrm>
-            <a:off x="669726" y="1366242"/>
-            <a:ext cx="7804500" cy="3315000"/>
-          </a:xfrm>
-          <a:prstGeom prst="rect">
-            <a:avLst/>
-          </a:prstGeom>
-          <a:noFill/>
-          <a:ln>
-            <a:noFill/>
-          </a:ln>
-        </p:spPr>
-        <p:txBody>
-          <a:bodyPr lIns="32750" tIns="32750" rIns="32750" bIns="32750" anchor="ctr" anchorCtr="0">
-            <a:noAutofit/>
-          </a:bodyPr>
-          <a:lstStyle/>
-          <a:p>
-            <a:pPr marL="292100" marR="0" lvl="0" indent="-292100" algn="l" rtl="0">
-              <a:lnSpc>
-                <a:spcPct val="100000"/>
-              </a:lnSpc>
-              <a:spcBef>
-                <a:spcPts val="0"/>
-              </a:spcBef>
-              <a:spcAft>
-                <a:spcPts val="0"/>
-              </a:spcAft>
-              <a:buClr>
-                <a:srgbClr val="FFFFFF"/>
-              </a:buClr>
-              <a:buSzPct val="75000"/>
-              <a:buFont typeface="Helvetica Neue"/>
-              <a:buChar char="•"/>
-            </a:pPr>
-            <a:r>
-              <a:rPr lang="en-US" sz="2400" b="0" i="0" u="none" strike="noStrike" cap="none">
-                <a:solidFill>
-                  <a:srgbClr val="FFFFFF"/>
-                </a:solidFill>
-                <a:latin typeface="Helvetica Neue"/>
-                <a:ea typeface="Helvetica Neue"/>
-                <a:cs typeface="Helvetica Neue"/>
-                <a:sym typeface="Helvetica Neue"/>
-              </a:rPr>
-              <a:t>Can be used to create Tools, applications or services</a:t>
-            </a:r>
-          </a:p>
-          <a:p>
-            <a:pPr marL="292100" marR="0" lvl="0" indent="-292100" algn="l" rtl="0">
-              <a:lnSpc>
-                <a:spcPct val="100000"/>
-              </a:lnSpc>
-              <a:spcBef>
-                <a:spcPts val="2700"/>
-              </a:spcBef>
-              <a:spcAft>
-                <a:spcPts val="0"/>
-              </a:spcAft>
-              <a:buClr>
-                <a:srgbClr val="FFFFFF"/>
-              </a:buClr>
-              <a:buSzPct val="75000"/>
-              <a:buFont typeface="Helvetica Neue"/>
-              <a:buChar char="•"/>
-            </a:pPr>
-            <a:r>
-              <a:rPr lang="en-US" sz="2400" b="0" i="0" u="none" strike="noStrike" cap="none">
-                <a:solidFill>
-                  <a:srgbClr val="FFFFFF"/>
-                </a:solidFill>
-                <a:latin typeface="Helvetica Neue"/>
-                <a:ea typeface="Helvetica Neue"/>
-                <a:cs typeface="Helvetica Neue"/>
-                <a:sym typeface="Helvetica Neue"/>
-              </a:rPr>
-              <a:t>Powered by Chrome’s V8 JavaScript engine</a:t>
-            </a:r>
-          </a:p>
-          <a:p>
-            <a:pPr marL="292100" marR="0" lvl="0" indent="-292100" algn="l" rtl="0">
-              <a:lnSpc>
-                <a:spcPct val="100000"/>
-              </a:lnSpc>
-              <a:spcBef>
-                <a:spcPts val="2700"/>
-              </a:spcBef>
-              <a:spcAft>
-                <a:spcPts val="0"/>
-              </a:spcAft>
-              <a:buClr>
-                <a:srgbClr val="FFFFFF"/>
-              </a:buClr>
-              <a:buSzPct val="75000"/>
-              <a:buFont typeface="Helvetica Neue"/>
-              <a:buChar char="•"/>
-            </a:pPr>
-            <a:r>
-              <a:rPr lang="en-US" sz="2400" b="0" i="0" u="none" strike="noStrike" cap="none">
-                <a:solidFill>
-                  <a:srgbClr val="FFFFFF"/>
-                </a:solidFill>
-                <a:latin typeface="Helvetica Neue"/>
-                <a:ea typeface="Helvetica Neue"/>
-                <a:cs typeface="Helvetica Neue"/>
-                <a:sym typeface="Helvetica Neue"/>
-              </a:rPr>
-              <a:t>npm, package ecosystem</a:t>
-            </a:r>
-          </a:p>
-        </p:txBody>
-      </p:sp>
-    </p:spTree>
-  </p:cSld>
-  <p:clrMapOvr>
-    <a:masterClrMapping/>
-  </p:clrMapOvr>
-  <p:timing>
-    <p:tnLst>
-      <p:par>
-        <p:cTn id="1" dur="indefinite" restart="never" nodeType="tmRoot"/>
-      </p:par>
-    </p:tnLst>
-  </p:timing>
-</p:sld>
-</file>
-
 <file path=ppt/slides/slide4.xml><?xml version="1.0" encoding="utf-8"?>
 <p:sld xmlns:a="http://schemas.openxmlformats.org/drawingml/2006/main" xmlns:r="http://schemas.openxmlformats.org/officeDocument/2006/relationships" xmlns:p="http://schemas.openxmlformats.org/presentationml/2006/main">
   <p:cSld>
@@ -29681,1085 +27809,6 @@
                 <a:sym typeface="Helvetica Neue"/>
               </a:rPr>
               <a:t>Can be transpiled back to ES5</a:t>
-            </a:r>
-          </a:p>
-        </p:txBody>
-      </p:sp>
-    </p:spTree>
-  </p:cSld>
-  <p:clrMapOvr>
-    <a:masterClrMapping/>
-  </p:clrMapOvr>
-  <p:timing>
-    <p:tnLst>
-      <p:par>
-        <p:cTn id="1" dur="indefinite" restart="never" nodeType="tmRoot"/>
-      </p:par>
-    </p:tnLst>
-  </p:timing>
-</p:sld>
-</file>
-
-<file path=ppt/slides/slide40.xml><?xml version="1.0" encoding="utf-8"?>
-<p:sld xmlns:a="http://schemas.openxmlformats.org/drawingml/2006/main" xmlns:r="http://schemas.openxmlformats.org/officeDocument/2006/relationships" xmlns:p="http://schemas.openxmlformats.org/presentationml/2006/main">
-  <p:cSld>
-    <p:spTree>
-      <p:nvGrpSpPr>
-        <p:cNvPr id="1" name="Shape 274"/>
-        <p:cNvGrpSpPr/>
-        <p:nvPr/>
-      </p:nvGrpSpPr>
-      <p:grpSpPr>
-        <a:xfrm>
-          <a:off x="0" y="0"/>
-          <a:ext cx="0" cy="0"/>
-          <a:chOff x="0" y="0"/>
-          <a:chExt cx="0" cy="0"/>
-        </a:xfrm>
-      </p:grpSpPr>
-      <p:sp>
-        <p:nvSpPr>
-          <p:cNvPr id="275" name="Shape 275"/>
-          <p:cNvSpPr txBox="1">
-            <a:spLocks noGrp="1"/>
-          </p:cNvSpPr>
-          <p:nvPr>
-            <p:ph type="title"/>
-          </p:nvPr>
-        </p:nvSpPr>
-        <p:spPr>
-          <a:xfrm>
-            <a:off x="669726" y="133945"/>
-            <a:ext cx="7804500" cy="1138500"/>
-          </a:xfrm>
-          <a:prstGeom prst="rect">
-            <a:avLst/>
-          </a:prstGeom>
-          <a:noFill/>
-          <a:ln>
-            <a:noFill/>
-          </a:ln>
-        </p:spPr>
-        <p:txBody>
-          <a:bodyPr lIns="32750" tIns="32750" rIns="32750" bIns="32750" anchor="ctr" anchorCtr="0">
-            <a:noAutofit/>
-          </a:bodyPr>
-          <a:lstStyle/>
-          <a:p>
-            <a:pPr marL="0" marR="0" lvl="0" indent="0" algn="ctr" rtl="0">
-              <a:lnSpc>
-                <a:spcPct val="100000"/>
-              </a:lnSpc>
-              <a:spcBef>
-                <a:spcPts val="0"/>
-              </a:spcBef>
-              <a:spcAft>
-                <a:spcPts val="0"/>
-              </a:spcAft>
-              <a:buClr>
-                <a:srgbClr val="FFFFFF"/>
-              </a:buClr>
-              <a:buSzPct val="25000"/>
-              <a:buFont typeface="Helvetica Neue"/>
-              <a:buNone/>
-            </a:pPr>
-            <a:r>
-              <a:rPr lang="en-US" sz="5200" b="0" i="0" u="none" strike="noStrike" cap="none">
-                <a:solidFill>
-                  <a:srgbClr val="FFFFFF"/>
-                </a:solidFill>
-                <a:latin typeface="Helvetica Neue"/>
-                <a:ea typeface="Helvetica Neue"/>
-                <a:cs typeface="Helvetica Neue"/>
-                <a:sym typeface="Helvetica Neue"/>
-              </a:rPr>
-              <a:t>History</a:t>
-            </a:r>
-          </a:p>
-        </p:txBody>
-      </p:sp>
-      <p:sp>
-        <p:nvSpPr>
-          <p:cNvPr id="276" name="Shape 276"/>
-          <p:cNvSpPr txBox="1">
-            <a:spLocks noGrp="1"/>
-          </p:cNvSpPr>
-          <p:nvPr>
-            <p:ph type="body" idx="1"/>
-          </p:nvPr>
-        </p:nvSpPr>
-        <p:spPr>
-          <a:xfrm>
-            <a:off x="669726" y="1366242"/>
-            <a:ext cx="7804500" cy="3315000"/>
-          </a:xfrm>
-          <a:prstGeom prst="rect">
-            <a:avLst/>
-          </a:prstGeom>
-          <a:noFill/>
-          <a:ln>
-            <a:noFill/>
-          </a:ln>
-        </p:spPr>
-        <p:txBody>
-          <a:bodyPr lIns="32750" tIns="32750" rIns="32750" bIns="32750" anchor="ctr" anchorCtr="0">
-            <a:noAutofit/>
-          </a:bodyPr>
-          <a:lstStyle/>
-          <a:p>
-            <a:pPr marL="292100" marR="0" lvl="0" indent="-292100" algn="l" rtl="0">
-              <a:lnSpc>
-                <a:spcPct val="100000"/>
-              </a:lnSpc>
-              <a:spcBef>
-                <a:spcPts val="0"/>
-              </a:spcBef>
-              <a:spcAft>
-                <a:spcPts val="0"/>
-              </a:spcAft>
-              <a:buClr>
-                <a:srgbClr val="FFFFFF"/>
-              </a:buClr>
-              <a:buSzPct val="75000"/>
-              <a:buFont typeface="Helvetica Neue"/>
-              <a:buChar char="•"/>
-            </a:pPr>
-            <a:r>
-              <a:rPr lang="en-US" sz="2400" b="0" i="0" u="none" strike="noStrike" cap="none">
-                <a:solidFill>
-                  <a:srgbClr val="FFFFFF"/>
-                </a:solidFill>
-                <a:latin typeface="Helvetica Neue"/>
-                <a:ea typeface="Helvetica Neue"/>
-                <a:cs typeface="Helvetica Neue"/>
-                <a:sym typeface="Helvetica Neue"/>
-              </a:rPr>
-              <a:t>First written in 2009</a:t>
-            </a:r>
-          </a:p>
-          <a:p>
-            <a:pPr marL="863600" marR="0" lvl="2" indent="-292100" algn="l" rtl="0">
-              <a:lnSpc>
-                <a:spcPct val="100000"/>
-              </a:lnSpc>
-              <a:spcBef>
-                <a:spcPts val="2700"/>
-              </a:spcBef>
-              <a:spcAft>
-                <a:spcPts val="0"/>
-              </a:spcAft>
-              <a:buClr>
-                <a:srgbClr val="FFFFFF"/>
-              </a:buClr>
-              <a:buSzPct val="75000"/>
-              <a:buFont typeface="Helvetica Neue"/>
-              <a:buChar char="•"/>
-            </a:pPr>
-            <a:r>
-              <a:rPr lang="en-US" sz="2400" b="0" i="0" u="none" strike="noStrike" cap="none">
-                <a:solidFill>
-                  <a:srgbClr val="FFFFFF"/>
-                </a:solidFill>
-                <a:latin typeface="Helvetica Neue"/>
-                <a:ea typeface="Helvetica Neue"/>
-                <a:cs typeface="Helvetica Neue"/>
-                <a:sym typeface="Helvetica Neue"/>
-              </a:rPr>
-              <a:t>By Ryan Dahl</a:t>
-            </a:r>
-          </a:p>
-          <a:p>
-            <a:pPr marL="292100" marR="0" lvl="0" indent="-292100" algn="l" rtl="0">
-              <a:lnSpc>
-                <a:spcPct val="100000"/>
-              </a:lnSpc>
-              <a:spcBef>
-                <a:spcPts val="2700"/>
-              </a:spcBef>
-              <a:spcAft>
-                <a:spcPts val="0"/>
-              </a:spcAft>
-              <a:buClr>
-                <a:srgbClr val="FFFFFF"/>
-              </a:buClr>
-              <a:buSzPct val="75000"/>
-              <a:buFont typeface="Helvetica Neue"/>
-              <a:buChar char="•"/>
-            </a:pPr>
-            <a:r>
-              <a:rPr lang="en-US" sz="2400" b="0" i="0" u="none" strike="noStrike" cap="none">
-                <a:solidFill>
-                  <a:srgbClr val="FFFFFF"/>
-                </a:solidFill>
-                <a:latin typeface="Helvetica Neue"/>
-                <a:ea typeface="Helvetica Neue"/>
-                <a:cs typeface="Helvetica Neue"/>
-                <a:sym typeface="Helvetica Neue"/>
-              </a:rPr>
-              <a:t>2010 package manager npm</a:t>
-            </a:r>
-          </a:p>
-          <a:p>
-            <a:pPr marL="292100" marR="0" lvl="0" indent="-292100" algn="l" rtl="0">
-              <a:lnSpc>
-                <a:spcPct val="100000"/>
-              </a:lnSpc>
-              <a:spcBef>
-                <a:spcPts val="2700"/>
-              </a:spcBef>
-              <a:spcAft>
-                <a:spcPts val="0"/>
-              </a:spcAft>
-              <a:buClr>
-                <a:srgbClr val="FFFFFF"/>
-              </a:buClr>
-              <a:buSzPct val="75000"/>
-              <a:buFont typeface="Helvetica Neue"/>
-              <a:buChar char="•"/>
-            </a:pPr>
-            <a:r>
-              <a:rPr lang="en-US" sz="2400" b="0" i="0" u="none" strike="noStrike" cap="none">
-                <a:solidFill>
-                  <a:srgbClr val="FFFFFF"/>
-                </a:solidFill>
-                <a:latin typeface="Helvetica Neue"/>
-                <a:ea typeface="Helvetica Neue"/>
-                <a:cs typeface="Helvetica Neue"/>
-                <a:sym typeface="Helvetica Neue"/>
-              </a:rPr>
-              <a:t>2011 native Windows version</a:t>
-            </a:r>
-          </a:p>
-        </p:txBody>
-      </p:sp>
-      <p:pic>
-        <p:nvPicPr>
-          <p:cNvPr id="277" name="Shape 277"/>
-          <p:cNvPicPr preferRelativeResize="0"/>
-          <p:nvPr/>
-        </p:nvPicPr>
-        <p:blipFill rotWithShape="1">
-          <a:blip r:embed="rId3">
-            <a:alphaModFix/>
-          </a:blip>
-          <a:srcRect/>
-          <a:stretch/>
-        </p:blipFill>
-        <p:spPr>
-          <a:xfrm flipH="1">
-            <a:off x="7433754" y="1879969"/>
-            <a:ext cx="1713600" cy="1927800"/>
-          </a:xfrm>
-          <a:prstGeom prst="rect">
-            <a:avLst/>
-          </a:prstGeom>
-          <a:noFill/>
-          <a:ln>
-            <a:noFill/>
-          </a:ln>
-        </p:spPr>
-      </p:pic>
-    </p:spTree>
-  </p:cSld>
-  <p:clrMapOvr>
-    <a:masterClrMapping/>
-  </p:clrMapOvr>
-  <p:timing>
-    <p:tnLst>
-      <p:par>
-        <p:cTn id="1" dur="indefinite" restart="never" nodeType="tmRoot"/>
-      </p:par>
-    </p:tnLst>
-  </p:timing>
-</p:sld>
-</file>
-
-<file path=ppt/slides/slide41.xml><?xml version="1.0" encoding="utf-8"?>
-<p:sld xmlns:a="http://schemas.openxmlformats.org/drawingml/2006/main" xmlns:r="http://schemas.openxmlformats.org/officeDocument/2006/relationships" xmlns:p="http://schemas.openxmlformats.org/presentationml/2006/main">
-  <p:cSld>
-    <p:spTree>
-      <p:nvGrpSpPr>
-        <p:cNvPr id="1" name="Shape 281"/>
-        <p:cNvGrpSpPr/>
-        <p:nvPr/>
-      </p:nvGrpSpPr>
-      <p:grpSpPr>
-        <a:xfrm>
-          <a:off x="0" y="0"/>
-          <a:ext cx="0" cy="0"/>
-          <a:chOff x="0" y="0"/>
-          <a:chExt cx="0" cy="0"/>
-        </a:xfrm>
-      </p:grpSpPr>
-      <p:sp>
-        <p:nvSpPr>
-          <p:cNvPr id="282" name="Shape 282"/>
-          <p:cNvSpPr txBox="1">
-            <a:spLocks noGrp="1"/>
-          </p:cNvSpPr>
-          <p:nvPr>
-            <p:ph type="title"/>
-          </p:nvPr>
-        </p:nvSpPr>
-        <p:spPr>
-          <a:xfrm>
-            <a:off x="669726" y="133945"/>
-            <a:ext cx="7804500" cy="1138500"/>
-          </a:xfrm>
-          <a:prstGeom prst="rect">
-            <a:avLst/>
-          </a:prstGeom>
-          <a:noFill/>
-          <a:ln>
-            <a:noFill/>
-          </a:ln>
-        </p:spPr>
-        <p:txBody>
-          <a:bodyPr lIns="32750" tIns="32750" rIns="32750" bIns="32750" anchor="ctr" anchorCtr="0">
-            <a:noAutofit/>
-          </a:bodyPr>
-          <a:lstStyle/>
-          <a:p>
-            <a:pPr marL="0" marR="0" lvl="0" indent="0" algn="ctr" rtl="0">
-              <a:lnSpc>
-                <a:spcPct val="100000"/>
-              </a:lnSpc>
-              <a:spcBef>
-                <a:spcPts val="0"/>
-              </a:spcBef>
-              <a:spcAft>
-                <a:spcPts val="0"/>
-              </a:spcAft>
-              <a:buClr>
-                <a:srgbClr val="FFFFFF"/>
-              </a:buClr>
-              <a:buSzPct val="25000"/>
-              <a:buFont typeface="Helvetica Neue"/>
-              <a:buNone/>
-            </a:pPr>
-            <a:r>
-              <a:rPr lang="en-US" sz="5200" b="0" i="0" u="none" strike="noStrike" cap="none">
-                <a:solidFill>
-                  <a:srgbClr val="FFFFFF"/>
-                </a:solidFill>
-                <a:latin typeface="Helvetica Neue"/>
-                <a:ea typeface="Helvetica Neue"/>
-                <a:cs typeface="Helvetica Neue"/>
-                <a:sym typeface="Helvetica Neue"/>
-              </a:rPr>
-              <a:t>Utilities</a:t>
-            </a:r>
-          </a:p>
-        </p:txBody>
-      </p:sp>
-      <p:sp>
-        <p:nvSpPr>
-          <p:cNvPr id="283" name="Shape 283"/>
-          <p:cNvSpPr txBox="1">
-            <a:spLocks noGrp="1"/>
-          </p:cNvSpPr>
-          <p:nvPr>
-            <p:ph type="body" idx="1"/>
-          </p:nvPr>
-        </p:nvSpPr>
-        <p:spPr>
-          <a:xfrm>
-            <a:off x="669726" y="1369590"/>
-            <a:ext cx="7804500" cy="3315000"/>
-          </a:xfrm>
-          <a:prstGeom prst="rect">
-            <a:avLst/>
-          </a:prstGeom>
-          <a:noFill/>
-          <a:ln>
-            <a:noFill/>
-          </a:ln>
-        </p:spPr>
-        <p:txBody>
-          <a:bodyPr lIns="32750" tIns="32750" rIns="32750" bIns="32750" anchor="ctr" anchorCtr="0">
-            <a:noAutofit/>
-          </a:bodyPr>
-          <a:lstStyle/>
-          <a:p>
-            <a:pPr marL="292100" marR="0" lvl="0" indent="-292100" algn="l" rtl="0">
-              <a:lnSpc>
-                <a:spcPct val="100000"/>
-              </a:lnSpc>
-              <a:spcBef>
-                <a:spcPts val="0"/>
-              </a:spcBef>
-              <a:spcAft>
-                <a:spcPts val="0"/>
-              </a:spcAft>
-              <a:buClr>
-                <a:srgbClr val="FFFFFF"/>
-              </a:buClr>
-              <a:buSzPct val="75000"/>
-              <a:buFont typeface="Helvetica Neue"/>
-              <a:buChar char="•"/>
-            </a:pPr>
-            <a:r>
-              <a:rPr lang="en-US" sz="2400" b="0" i="0" u="none" strike="noStrike" cap="none">
-                <a:solidFill>
-                  <a:srgbClr val="FFFFFF"/>
-                </a:solidFill>
-                <a:latin typeface="Helvetica Neue"/>
-                <a:ea typeface="Helvetica Neue"/>
-                <a:cs typeface="Helvetica Neue"/>
-                <a:sym typeface="Helvetica Neue"/>
-              </a:rPr>
-              <a:t>Node comes with the following:</a:t>
-            </a:r>
-          </a:p>
-          <a:p>
-            <a:pPr marL="571500" marR="0" lvl="1" indent="-279400" algn="l" rtl="0">
-              <a:lnSpc>
-                <a:spcPct val="100000"/>
-              </a:lnSpc>
-              <a:spcBef>
-                <a:spcPts val="2700"/>
-              </a:spcBef>
-              <a:spcAft>
-                <a:spcPts val="0"/>
-              </a:spcAft>
-              <a:buClr>
-                <a:srgbClr val="FFFFFF"/>
-              </a:buClr>
-              <a:buSzPct val="75000"/>
-              <a:buFont typeface="Helvetica Neue"/>
-              <a:buChar char="•"/>
-            </a:pPr>
-            <a:r>
-              <a:rPr lang="en-US" sz="2400" b="0" i="0" u="none" strike="noStrike" cap="none">
-                <a:solidFill>
-                  <a:srgbClr val="FFFFFF"/>
-                </a:solidFill>
-                <a:latin typeface="Helvetica Neue"/>
-                <a:ea typeface="Helvetica Neue"/>
-                <a:cs typeface="Helvetica Neue"/>
-                <a:sym typeface="Helvetica Neue"/>
-              </a:rPr>
-              <a:t>I/O, Sockets(http/dns/udp/etc), crypto functions, data streams</a:t>
-            </a:r>
-          </a:p>
-          <a:p>
-            <a:pPr marL="292100" marR="0" lvl="0" indent="-292100" algn="l" rtl="0">
-              <a:lnSpc>
-                <a:spcPct val="100000"/>
-              </a:lnSpc>
-              <a:spcBef>
-                <a:spcPts val="2700"/>
-              </a:spcBef>
-              <a:spcAft>
-                <a:spcPts val="0"/>
-              </a:spcAft>
-              <a:buClr>
-                <a:srgbClr val="FFFFFF"/>
-              </a:buClr>
-              <a:buSzPct val="75000"/>
-              <a:buFont typeface="Helvetica Neue"/>
-              <a:buChar char="•"/>
-            </a:pPr>
-            <a:r>
-              <a:rPr lang="en-US" sz="2400" b="0" i="0" u="none" strike="noStrike" cap="none">
-                <a:solidFill>
-                  <a:srgbClr val="FFFFFF"/>
-                </a:solidFill>
-                <a:latin typeface="Helvetica Neue"/>
-                <a:ea typeface="Helvetica Neue"/>
-                <a:cs typeface="Helvetica Neue"/>
-                <a:sym typeface="Helvetica Neue"/>
-              </a:rPr>
-              <a:t>Runs on Linux, Mac, Windows</a:t>
-            </a:r>
-          </a:p>
-        </p:txBody>
-      </p:sp>
-    </p:spTree>
-  </p:cSld>
-  <p:clrMapOvr>
-    <a:masterClrMapping/>
-  </p:clrMapOvr>
-  <p:timing>
-    <p:tnLst>
-      <p:par>
-        <p:cTn id="1" dur="indefinite" restart="never" nodeType="tmRoot"/>
-      </p:par>
-    </p:tnLst>
-  </p:timing>
-</p:sld>
-</file>
-
-<file path=ppt/slides/slide42.xml><?xml version="1.0" encoding="utf-8"?>
-<p:sld xmlns:a="http://schemas.openxmlformats.org/drawingml/2006/main" xmlns:r="http://schemas.openxmlformats.org/officeDocument/2006/relationships" xmlns:p="http://schemas.openxmlformats.org/presentationml/2006/main">
-  <p:cSld>
-    <p:spTree>
-      <p:nvGrpSpPr>
-        <p:cNvPr id="1" name="Shape 287"/>
-        <p:cNvGrpSpPr/>
-        <p:nvPr/>
-      </p:nvGrpSpPr>
-      <p:grpSpPr>
-        <a:xfrm>
-          <a:off x="0" y="0"/>
-          <a:ext cx="0" cy="0"/>
-          <a:chOff x="0" y="0"/>
-          <a:chExt cx="0" cy="0"/>
-        </a:xfrm>
-      </p:grpSpPr>
-      <p:sp>
-        <p:nvSpPr>
-          <p:cNvPr id="288" name="Shape 288"/>
-          <p:cNvSpPr txBox="1">
-            <a:spLocks noGrp="1"/>
-          </p:cNvSpPr>
-          <p:nvPr>
-            <p:ph type="title"/>
-          </p:nvPr>
-        </p:nvSpPr>
-        <p:spPr>
-          <a:xfrm>
-            <a:off x="669726" y="133945"/>
-            <a:ext cx="7804500" cy="1138500"/>
-          </a:xfrm>
-          <a:prstGeom prst="rect">
-            <a:avLst/>
-          </a:prstGeom>
-          <a:noFill/>
-          <a:ln>
-            <a:noFill/>
-          </a:ln>
-        </p:spPr>
-        <p:txBody>
-          <a:bodyPr lIns="32750" tIns="32750" rIns="32750" bIns="32750" anchor="ctr" anchorCtr="0">
-            <a:noAutofit/>
-          </a:bodyPr>
-          <a:lstStyle/>
-          <a:p>
-            <a:pPr marL="0" marR="0" lvl="0" indent="0" algn="ctr" rtl="0">
-              <a:lnSpc>
-                <a:spcPct val="100000"/>
-              </a:lnSpc>
-              <a:spcBef>
-                <a:spcPts val="0"/>
-              </a:spcBef>
-              <a:spcAft>
-                <a:spcPts val="0"/>
-              </a:spcAft>
-              <a:buClr>
-                <a:srgbClr val="FFFFFF"/>
-              </a:buClr>
-              <a:buSzPct val="25000"/>
-              <a:buFont typeface="Helvetica Neue"/>
-              <a:buNone/>
-            </a:pPr>
-            <a:r>
-              <a:rPr lang="en-US" sz="5200" b="0" i="0" u="none" strike="noStrike" cap="none" dirty="0" err="1" smtClean="0">
-                <a:solidFill>
-                  <a:srgbClr val="FFFFFF"/>
-                </a:solidFill>
-                <a:latin typeface="Helvetica Neue"/>
-                <a:ea typeface="Helvetica Neue"/>
-                <a:cs typeface="Helvetica Neue"/>
-                <a:sym typeface="Helvetica Neue"/>
-              </a:rPr>
-              <a:t>Opdracht</a:t>
-            </a:r>
-            <a:r>
-              <a:rPr lang="en-US" dirty="0"/>
-              <a:t> </a:t>
-            </a:r>
-            <a:r>
-              <a:rPr lang="en-US" dirty="0" smtClean="0"/>
-              <a:t>Node</a:t>
-            </a:r>
-            <a:endParaRPr lang="en-US" sz="5200" b="0" i="0" u="none" strike="noStrike" cap="none" dirty="0">
-              <a:solidFill>
-                <a:srgbClr val="FFFFFF"/>
-              </a:solidFill>
-              <a:latin typeface="Helvetica Neue"/>
-              <a:ea typeface="Helvetica Neue"/>
-              <a:cs typeface="Helvetica Neue"/>
-              <a:sym typeface="Helvetica Neue"/>
-            </a:endParaRPr>
-          </a:p>
-        </p:txBody>
-      </p:sp>
-      <p:sp>
-        <p:nvSpPr>
-          <p:cNvPr id="289" name="Shape 289"/>
-          <p:cNvSpPr txBox="1">
-            <a:spLocks noGrp="1"/>
-          </p:cNvSpPr>
-          <p:nvPr>
-            <p:ph type="body" idx="1"/>
-          </p:nvPr>
-        </p:nvSpPr>
-        <p:spPr>
-          <a:xfrm>
-            <a:off x="669726" y="1369590"/>
-            <a:ext cx="7804500" cy="3315000"/>
-          </a:xfrm>
-          <a:prstGeom prst="rect">
-            <a:avLst/>
-          </a:prstGeom>
-          <a:noFill/>
-          <a:ln>
-            <a:noFill/>
-          </a:ln>
-        </p:spPr>
-        <p:txBody>
-          <a:bodyPr lIns="32750" tIns="32750" rIns="32750" bIns="32750" anchor="ctr" anchorCtr="0">
-            <a:noAutofit/>
-          </a:bodyPr>
-          <a:lstStyle/>
-          <a:p>
-            <a:pPr marL="0" lvl="0" indent="0" algn="ctr">
-              <a:spcBef>
-                <a:spcPts val="0"/>
-              </a:spcBef>
-              <a:buNone/>
-            </a:pPr>
-            <a:r>
-              <a:rPr lang="en-US" sz="2400" b="0" i="0" u="sng" strike="noStrike" cap="none" dirty="0" smtClean="0">
-                <a:solidFill>
-                  <a:srgbClr val="FFC000"/>
-                </a:solidFill>
-                <a:sym typeface="Helvetica Neue"/>
-              </a:rPr>
-              <a:t>Open map:</a:t>
-            </a:r>
-            <a:r>
-              <a:rPr lang="en-US" u="sng" dirty="0" smtClean="0">
-                <a:solidFill>
-                  <a:srgbClr val="FFC000"/>
-                </a:solidFill>
-              </a:rPr>
-              <a:t> </a:t>
-            </a:r>
-          </a:p>
-          <a:p>
-            <a:pPr marL="0" lvl="0" indent="0" algn="ctr">
-              <a:spcBef>
-                <a:spcPts val="0"/>
-              </a:spcBef>
-              <a:buNone/>
-            </a:pPr>
-            <a:r>
-              <a:rPr lang="en-US" dirty="0" smtClean="0"/>
-              <a:t>3 </a:t>
-            </a:r>
-            <a:r>
-              <a:rPr lang="en-US" dirty="0"/>
-              <a:t>- </a:t>
-            </a:r>
-            <a:r>
-              <a:rPr lang="en-US" dirty="0" err="1"/>
-              <a:t>Javascript</a:t>
-            </a:r>
-            <a:r>
-              <a:rPr lang="en-US" dirty="0"/>
-              <a:t> + ECMAScript </a:t>
-            </a:r>
-            <a:r>
-              <a:rPr lang="en-US" dirty="0" smtClean="0"/>
-              <a:t>6/ECMAScript 6</a:t>
-            </a:r>
-            <a:r>
-              <a:rPr lang="en-US" sz="2400" b="0" i="0" u="none" strike="noStrike" cap="none" dirty="0" smtClean="0">
-                <a:solidFill>
-                  <a:srgbClr val="FFFFFF"/>
-                </a:solidFill>
-                <a:latin typeface="Helvetica Neue"/>
-                <a:ea typeface="Helvetica Neue"/>
-                <a:cs typeface="Helvetica Neue"/>
-                <a:sym typeface="Helvetica Neue"/>
-              </a:rPr>
-              <a:t>/</a:t>
-            </a:r>
-            <a:r>
-              <a:rPr lang="en-US" dirty="0" err="1" smtClean="0"/>
-              <a:t>Readme</a:t>
-            </a:r>
-            <a:r>
-              <a:rPr lang="en-US" sz="2400" b="0" i="0" u="none" strike="noStrike" cap="none" dirty="0" err="1" smtClean="0">
-                <a:solidFill>
-                  <a:srgbClr val="FFFFFF"/>
-                </a:solidFill>
-                <a:latin typeface="Helvetica Neue"/>
-                <a:ea typeface="Helvetica Neue"/>
-                <a:cs typeface="Helvetica Neue"/>
-                <a:sym typeface="Helvetica Neue"/>
-              </a:rPr>
-              <a:t>.</a:t>
-            </a:r>
-            <a:r>
-              <a:rPr lang="en-US" dirty="0" err="1" smtClean="0"/>
-              <a:t>md</a:t>
-            </a:r>
-            <a:endParaRPr lang="en-US" dirty="0"/>
-          </a:p>
-          <a:p>
-            <a:pPr marL="292100" marR="0" lvl="1" indent="0" algn="ctr" rtl="0">
-              <a:lnSpc>
-                <a:spcPct val="100000"/>
-              </a:lnSpc>
-              <a:spcBef>
-                <a:spcPts val="2700"/>
-              </a:spcBef>
-              <a:spcAft>
-                <a:spcPts val="0"/>
-              </a:spcAft>
-              <a:buClr>
-                <a:srgbClr val="FFFFFF"/>
-              </a:buClr>
-              <a:buSzPct val="75000"/>
-              <a:buNone/>
-            </a:pPr>
-            <a:r>
-              <a:rPr lang="en-US" sz="2400" b="0" i="0" u="none" strike="noStrike" cap="none" dirty="0" err="1" smtClean="0">
-                <a:solidFill>
-                  <a:srgbClr val="FFC000"/>
-                </a:solidFill>
-                <a:latin typeface="Helvetica Neue"/>
-                <a:ea typeface="Helvetica Neue"/>
-                <a:cs typeface="Helvetica Neue"/>
-                <a:sym typeface="Helvetica Neue"/>
-              </a:rPr>
-              <a:t>Opdracht</a:t>
-            </a:r>
-            <a:r>
-              <a:rPr lang="en-US" sz="2400" b="0" i="0" u="none" strike="noStrike" cap="none" dirty="0" smtClean="0">
-                <a:solidFill>
-                  <a:srgbClr val="FFC000"/>
-                </a:solidFill>
-                <a:latin typeface="Helvetica Neue"/>
-                <a:ea typeface="Helvetica Neue"/>
-                <a:cs typeface="Helvetica Neue"/>
-                <a:sym typeface="Helvetica Neue"/>
-              </a:rPr>
-              <a:t>: </a:t>
-            </a:r>
-          </a:p>
-          <a:p>
-            <a:pPr marL="292100" marR="0" lvl="1" indent="0" algn="ctr" rtl="0">
-              <a:lnSpc>
-                <a:spcPct val="100000"/>
-              </a:lnSpc>
-              <a:spcBef>
-                <a:spcPts val="2700"/>
-              </a:spcBef>
-              <a:spcAft>
-                <a:spcPts val="0"/>
-              </a:spcAft>
-              <a:buClr>
-                <a:srgbClr val="FFFFFF"/>
-              </a:buClr>
-              <a:buSzPct val="75000"/>
-              <a:buNone/>
-            </a:pPr>
-            <a:r>
-              <a:rPr lang="en-US" sz="2400" b="0" i="0" u="none" strike="noStrike" cap="none" dirty="0" smtClean="0">
-                <a:solidFill>
-                  <a:srgbClr val="FFFFFF"/>
-                </a:solidFill>
-                <a:latin typeface="Helvetica Neue"/>
-                <a:ea typeface="Helvetica Neue"/>
-                <a:cs typeface="Helvetica Neue"/>
-                <a:sym typeface="Helvetica Neue"/>
-              </a:rPr>
-              <a:t>Implement </a:t>
-            </a:r>
-            <a:r>
-              <a:rPr lang="en-US" sz="2400" b="0" i="0" u="none" strike="noStrike" cap="none" dirty="0">
-                <a:solidFill>
-                  <a:srgbClr val="FFFFFF"/>
-                </a:solidFill>
-                <a:latin typeface="Helvetica Neue"/>
-                <a:ea typeface="Helvetica Neue"/>
-                <a:cs typeface="Helvetica Neue"/>
-                <a:sym typeface="Helvetica Neue"/>
-              </a:rPr>
-              <a:t>a directory walker</a:t>
-            </a:r>
-          </a:p>
-        </p:txBody>
-      </p:sp>
-    </p:spTree>
-  </p:cSld>
-  <p:clrMapOvr>
-    <a:masterClrMapping/>
-  </p:clrMapOvr>
-  <p:timing>
-    <p:tnLst>
-      <p:par>
-        <p:cTn id="1" dur="indefinite" restart="never" nodeType="tmRoot"/>
-      </p:par>
-    </p:tnLst>
-  </p:timing>
-</p:sld>
-</file>
-
-<file path=ppt/slides/slide43.xml><?xml version="1.0" encoding="utf-8"?>
-<p:sld xmlns:a="http://schemas.openxmlformats.org/drawingml/2006/main" xmlns:r="http://schemas.openxmlformats.org/officeDocument/2006/relationships" xmlns:p="http://schemas.openxmlformats.org/presentationml/2006/main">
-  <p:cSld>
-    <p:spTree>
-      <p:nvGrpSpPr>
-        <p:cNvPr id="1" name="Shape 293"/>
-        <p:cNvGrpSpPr/>
-        <p:nvPr/>
-      </p:nvGrpSpPr>
-      <p:grpSpPr>
-        <a:xfrm>
-          <a:off x="0" y="0"/>
-          <a:ext cx="0" cy="0"/>
-          <a:chOff x="0" y="0"/>
-          <a:chExt cx="0" cy="0"/>
-        </a:xfrm>
-      </p:grpSpPr>
-      <p:sp>
-        <p:nvSpPr>
-          <p:cNvPr id="294" name="Shape 294"/>
-          <p:cNvSpPr txBox="1">
-            <a:spLocks noGrp="1"/>
-          </p:cNvSpPr>
-          <p:nvPr>
-            <p:ph type="title"/>
-          </p:nvPr>
-        </p:nvSpPr>
-        <p:spPr>
-          <a:xfrm>
-            <a:off x="892968" y="1701105"/>
-            <a:ext cx="7358100" cy="1741200"/>
-          </a:xfrm>
-          <a:prstGeom prst="rect">
-            <a:avLst/>
-          </a:prstGeom>
-          <a:noFill/>
-          <a:ln>
-            <a:noFill/>
-          </a:ln>
-        </p:spPr>
-        <p:txBody>
-          <a:bodyPr lIns="32750" tIns="32750" rIns="32750" bIns="32750" anchor="ctr" anchorCtr="0">
-            <a:noAutofit/>
-          </a:bodyPr>
-          <a:lstStyle/>
-          <a:p>
-            <a:pPr marL="0" marR="0" lvl="0" indent="0" algn="ctr" rtl="0">
-              <a:lnSpc>
-                <a:spcPct val="100000"/>
-              </a:lnSpc>
-              <a:spcBef>
-                <a:spcPts val="0"/>
-              </a:spcBef>
-              <a:spcAft>
-                <a:spcPts val="0"/>
-              </a:spcAft>
-              <a:buClr>
-                <a:srgbClr val="FFFFFF"/>
-              </a:buClr>
-              <a:buSzPct val="25000"/>
-              <a:buFont typeface="Helvetica Neue"/>
-              <a:buNone/>
-            </a:pPr>
-            <a:r>
-              <a:rPr lang="en-US" sz="5200" b="0" i="0" u="none" strike="noStrike" cap="none">
-                <a:solidFill>
-                  <a:srgbClr val="FFFFFF"/>
-                </a:solidFill>
-                <a:latin typeface="Helvetica Neue"/>
-                <a:ea typeface="Helvetica Neue"/>
-                <a:cs typeface="Helvetica Neue"/>
-                <a:sym typeface="Helvetica Neue"/>
-              </a:rPr>
-              <a:t>To Conclude</a:t>
-            </a:r>
-          </a:p>
-        </p:txBody>
-      </p:sp>
-    </p:spTree>
-  </p:cSld>
-  <p:clrMapOvr>
-    <a:masterClrMapping/>
-  </p:clrMapOvr>
-  <p:timing>
-    <p:tnLst>
-      <p:par>
-        <p:cTn id="1" dur="indefinite" restart="never" nodeType="tmRoot"/>
-      </p:par>
-    </p:tnLst>
-  </p:timing>
-</p:sld>
-</file>
-
-<file path=ppt/slides/slide44.xml><?xml version="1.0" encoding="utf-8"?>
-<p:sld xmlns:a="http://schemas.openxmlformats.org/drawingml/2006/main" xmlns:r="http://schemas.openxmlformats.org/officeDocument/2006/relationships" xmlns:p="http://schemas.openxmlformats.org/presentationml/2006/main">
-  <p:cSld>
-    <p:spTree>
-      <p:nvGrpSpPr>
-        <p:cNvPr id="1" name="Shape 298"/>
-        <p:cNvGrpSpPr/>
-        <p:nvPr/>
-      </p:nvGrpSpPr>
-      <p:grpSpPr>
-        <a:xfrm>
-          <a:off x="0" y="0"/>
-          <a:ext cx="0" cy="0"/>
-          <a:chOff x="0" y="0"/>
-          <a:chExt cx="0" cy="0"/>
-        </a:xfrm>
-      </p:grpSpPr>
-      <p:sp>
-        <p:nvSpPr>
-          <p:cNvPr id="299" name="Shape 299"/>
-          <p:cNvSpPr txBox="1">
-            <a:spLocks noGrp="1"/>
-          </p:cNvSpPr>
-          <p:nvPr>
-            <p:ph type="body" idx="1"/>
-          </p:nvPr>
-        </p:nvSpPr>
-        <p:spPr>
-          <a:xfrm>
-            <a:off x="669726" y="669726"/>
-            <a:ext cx="7804500" cy="3804000"/>
-          </a:xfrm>
-          <a:prstGeom prst="rect">
-            <a:avLst/>
-          </a:prstGeom>
-          <a:noFill/>
-          <a:ln>
-            <a:noFill/>
-          </a:ln>
-        </p:spPr>
-        <p:txBody>
-          <a:bodyPr lIns="32750" tIns="32750" rIns="32750" bIns="32750" anchor="ctr" anchorCtr="0">
-            <a:noAutofit/>
-          </a:bodyPr>
-          <a:lstStyle/>
-          <a:p>
-            <a:pPr marL="292100" marR="0" lvl="0" indent="-292100" algn="l" rtl="0">
-              <a:lnSpc>
-                <a:spcPct val="100000"/>
-              </a:lnSpc>
-              <a:spcBef>
-                <a:spcPts val="0"/>
-              </a:spcBef>
-              <a:spcAft>
-                <a:spcPts val="0"/>
-              </a:spcAft>
-              <a:buClr>
-                <a:srgbClr val="FFFFFF"/>
-              </a:buClr>
-              <a:buSzPct val="75000"/>
-              <a:buFont typeface="Helvetica Neue"/>
-              <a:buChar char="•"/>
-            </a:pPr>
-            <a:r>
-              <a:rPr lang="en-US" sz="2400" b="0" i="0" u="none" strike="noStrike" cap="none">
-                <a:solidFill>
-                  <a:srgbClr val="FFFFFF"/>
-                </a:solidFill>
-                <a:latin typeface="Helvetica Neue"/>
-                <a:ea typeface="Helvetica Neue"/>
-                <a:cs typeface="Helvetica Neue"/>
-                <a:sym typeface="Helvetica Neue"/>
-              </a:rPr>
-              <a:t>ECMAScript 6</a:t>
-            </a:r>
-          </a:p>
-          <a:p>
-            <a:pPr marL="571500" marR="0" lvl="1" indent="-279400" algn="l" rtl="0">
-              <a:lnSpc>
-                <a:spcPct val="100000"/>
-              </a:lnSpc>
-              <a:spcBef>
-                <a:spcPts val="2700"/>
-              </a:spcBef>
-              <a:spcAft>
-                <a:spcPts val="0"/>
-              </a:spcAft>
-              <a:buClr>
-                <a:srgbClr val="FFFFFF"/>
-              </a:buClr>
-              <a:buSzPct val="75000"/>
-              <a:buFont typeface="Helvetica Neue"/>
-              <a:buChar char="•"/>
-            </a:pPr>
-            <a:r>
-              <a:rPr lang="en-US" sz="2400" b="0" i="0" u="none" strike="noStrike" cap="none">
-                <a:solidFill>
-                  <a:srgbClr val="FFFFFF"/>
-                </a:solidFill>
-                <a:latin typeface="Helvetica Neue"/>
-                <a:ea typeface="Helvetica Neue"/>
-                <a:cs typeface="Helvetica Neue"/>
-                <a:sym typeface="Helvetica Neue"/>
-              </a:rPr>
-              <a:t>Promises, Classes, destructering, let, const, arrow functions, var-args … etc</a:t>
-            </a:r>
-          </a:p>
-          <a:p>
-            <a:pPr marL="292100" marR="0" lvl="0" indent="-292100" algn="l" rtl="0">
-              <a:lnSpc>
-                <a:spcPct val="100000"/>
-              </a:lnSpc>
-              <a:spcBef>
-                <a:spcPts val="2700"/>
-              </a:spcBef>
-              <a:spcAft>
-                <a:spcPts val="0"/>
-              </a:spcAft>
-              <a:buClr>
-                <a:srgbClr val="FFFFFF"/>
-              </a:buClr>
-              <a:buSzPct val="75000"/>
-              <a:buFont typeface="Helvetica Neue"/>
-              <a:buChar char="•"/>
-            </a:pPr>
-            <a:r>
-              <a:rPr lang="en-US" sz="2400" b="0" i="0" u="none" strike="noStrike" cap="none">
-                <a:solidFill>
-                  <a:srgbClr val="FFFFFF"/>
-                </a:solidFill>
-                <a:latin typeface="Helvetica Neue"/>
-                <a:ea typeface="Helvetica Neue"/>
-                <a:cs typeface="Helvetica Neue"/>
-                <a:sym typeface="Helvetica Neue"/>
-              </a:rPr>
-              <a:t>Node.js</a:t>
-            </a:r>
-          </a:p>
-          <a:p>
-            <a:pPr marL="571500" marR="0" lvl="1" indent="-279400" algn="l" rtl="0">
-              <a:lnSpc>
-                <a:spcPct val="100000"/>
-              </a:lnSpc>
-              <a:spcBef>
-                <a:spcPts val="2700"/>
-              </a:spcBef>
-              <a:spcAft>
-                <a:spcPts val="0"/>
-              </a:spcAft>
-              <a:buClr>
-                <a:srgbClr val="FFFFFF"/>
-              </a:buClr>
-              <a:buSzPct val="75000"/>
-              <a:buFont typeface="Helvetica Neue"/>
-              <a:buChar char="•"/>
-            </a:pPr>
-            <a:r>
-              <a:rPr lang="en-US" sz="2400" b="0" i="0" u="none" strike="noStrike" cap="none">
-                <a:solidFill>
-                  <a:srgbClr val="FFFFFF"/>
-                </a:solidFill>
-                <a:latin typeface="Helvetica Neue"/>
-                <a:ea typeface="Helvetica Neue"/>
-                <a:cs typeface="Helvetica Neue"/>
-                <a:sym typeface="Helvetica Neue"/>
-              </a:rPr>
-              <a:t>What/Why/When/How</a:t>
             </a:r>
           </a:p>
         </p:txBody>

</xml_diff>